<commit_message>
Débuter le powerpoint avec l'application console
</commit_message>
<xml_diff>
--- a/Gestion de projet/Présentations/PowerPoint.pptx
+++ b/Gestion de projet/Présentations/PowerPoint.pptx
@@ -3,13 +3,27 @@
 <p:presentation xmlns:a="http://schemas.openxmlformats.org/drawingml/2006/main" xmlns:r="http://schemas.openxmlformats.org/officeDocument/2006/relationships" xmlns:p="http://schemas.openxmlformats.org/presentationml/2006/main" saveSubsetFonts="1">
   <p:sldMasterIdLst>
     <p:sldMasterId id="2147483840" r:id="rId1"/>
-    <p:sldMasterId id="2147483928" r:id="rId2"/>
+    <p:sldMasterId id="2147483940" r:id="rId2"/>
   </p:sldMasterIdLst>
   <p:sldIdLst>
     <p:sldId id="256" r:id="rId3"/>
-    <p:sldId id="257" r:id="rId4"/>
-    <p:sldId id="258" r:id="rId5"/>
-    <p:sldId id="259" r:id="rId6"/>
+    <p:sldId id="259" r:id="rId4"/>
+    <p:sldId id="257" r:id="rId5"/>
+    <p:sldId id="258" r:id="rId6"/>
+    <p:sldId id="260" r:id="rId7"/>
+    <p:sldId id="261" r:id="rId8"/>
+    <p:sldId id="262" r:id="rId9"/>
+    <p:sldId id="263" r:id="rId10"/>
+    <p:sldId id="264" r:id="rId11"/>
+    <p:sldId id="265" r:id="rId12"/>
+    <p:sldId id="266" r:id="rId13"/>
+    <p:sldId id="267" r:id="rId14"/>
+    <p:sldId id="268" r:id="rId15"/>
+    <p:sldId id="269" r:id="rId16"/>
+    <p:sldId id="270" r:id="rId17"/>
+    <p:sldId id="271" r:id="rId18"/>
+    <p:sldId id="272" r:id="rId19"/>
+    <p:sldId id="273" r:id="rId20"/>
   </p:sldIdLst>
   <p:sldSz cx="12192000" cy="6858000"/>
   <p:notesSz cx="6858000" cy="9144000"/>
@@ -957,7 +971,7 @@
     </p:spTree>
     <p:extLst>
       <p:ext uri="{BB962C8B-B14F-4D97-AF65-F5344CB8AC3E}">
-        <p14:creationId xmlns:p14="http://schemas.microsoft.com/office/powerpoint/2010/main" val="3568976690"/>
+        <p14:creationId xmlns:p14="http://schemas.microsoft.com/office/powerpoint/2010/main" val="1487327463"/>
       </p:ext>
     </p:extLst>
   </p:cSld>
@@ -1127,7 +1141,7 @@
     </p:spTree>
     <p:extLst>
       <p:ext uri="{BB962C8B-B14F-4D97-AF65-F5344CB8AC3E}">
-        <p14:creationId xmlns:p14="http://schemas.microsoft.com/office/powerpoint/2010/main" val="232929060"/>
+        <p14:creationId xmlns:p14="http://schemas.microsoft.com/office/powerpoint/2010/main" val="1460867461"/>
       </p:ext>
     </p:extLst>
   </p:cSld>
@@ -1419,7 +1433,7 @@
     </p:spTree>
     <p:extLst>
       <p:ext uri="{BB962C8B-B14F-4D97-AF65-F5344CB8AC3E}">
-        <p14:creationId xmlns:p14="http://schemas.microsoft.com/office/powerpoint/2010/main" val="2877669073"/>
+        <p14:creationId xmlns:p14="http://schemas.microsoft.com/office/powerpoint/2010/main" val="3978065938"/>
       </p:ext>
     </p:extLst>
   </p:cSld>
@@ -1707,7 +1721,7 @@
     </p:spTree>
     <p:extLst>
       <p:ext uri="{BB962C8B-B14F-4D97-AF65-F5344CB8AC3E}">
-        <p14:creationId xmlns:p14="http://schemas.microsoft.com/office/powerpoint/2010/main" val="1729557895"/>
+        <p14:creationId xmlns:p14="http://schemas.microsoft.com/office/powerpoint/2010/main" val="203998639"/>
       </p:ext>
     </p:extLst>
   </p:cSld>
@@ -2158,7 +2172,7 @@
     </p:spTree>
     <p:extLst>
       <p:ext uri="{BB962C8B-B14F-4D97-AF65-F5344CB8AC3E}">
-        <p14:creationId xmlns:p14="http://schemas.microsoft.com/office/powerpoint/2010/main" val="879326411"/>
+        <p14:creationId xmlns:p14="http://schemas.microsoft.com/office/powerpoint/2010/main" val="3967427704"/>
       </p:ext>
     </p:extLst>
   </p:cSld>
@@ -2276,7 +2290,7 @@
     </p:spTree>
     <p:extLst>
       <p:ext uri="{BB962C8B-B14F-4D97-AF65-F5344CB8AC3E}">
-        <p14:creationId xmlns:p14="http://schemas.microsoft.com/office/powerpoint/2010/main" val="632537293"/>
+        <p14:creationId xmlns:p14="http://schemas.microsoft.com/office/powerpoint/2010/main" val="37466018"/>
       </p:ext>
     </p:extLst>
   </p:cSld>
@@ -2371,7 +2385,7 @@
     </p:spTree>
     <p:extLst>
       <p:ext uri="{BB962C8B-B14F-4D97-AF65-F5344CB8AC3E}">
-        <p14:creationId xmlns:p14="http://schemas.microsoft.com/office/powerpoint/2010/main" val="2195730893"/>
+        <p14:creationId xmlns:p14="http://schemas.microsoft.com/office/powerpoint/2010/main" val="2982376658"/>
       </p:ext>
     </p:extLst>
   </p:cSld>
@@ -2658,7 +2672,7 @@
     </p:spTree>
     <p:extLst>
       <p:ext uri="{BB962C8B-B14F-4D97-AF65-F5344CB8AC3E}">
-        <p14:creationId xmlns:p14="http://schemas.microsoft.com/office/powerpoint/2010/main" val="1500024932"/>
+        <p14:creationId xmlns:p14="http://schemas.microsoft.com/office/powerpoint/2010/main" val="755884980"/>
       </p:ext>
     </p:extLst>
   </p:cSld>
@@ -3153,7 +3167,7 @@
     </p:spTree>
     <p:extLst>
       <p:ext uri="{BB962C8B-B14F-4D97-AF65-F5344CB8AC3E}">
-        <p14:creationId xmlns:p14="http://schemas.microsoft.com/office/powerpoint/2010/main" val="3735548430"/>
+        <p14:creationId xmlns:p14="http://schemas.microsoft.com/office/powerpoint/2010/main" val="3679501661"/>
       </p:ext>
     </p:extLst>
   </p:cSld>
@@ -3323,7 +3337,7 @@
     </p:spTree>
     <p:extLst>
       <p:ext uri="{BB962C8B-B14F-4D97-AF65-F5344CB8AC3E}">
-        <p14:creationId xmlns:p14="http://schemas.microsoft.com/office/powerpoint/2010/main" val="1223009173"/>
+        <p14:creationId xmlns:p14="http://schemas.microsoft.com/office/powerpoint/2010/main" val="4146641135"/>
       </p:ext>
     </p:extLst>
   </p:cSld>
@@ -3503,7 +3517,7 @@
     </p:spTree>
     <p:extLst>
       <p:ext uri="{BB962C8B-B14F-4D97-AF65-F5344CB8AC3E}">
-        <p14:creationId xmlns:p14="http://schemas.microsoft.com/office/powerpoint/2010/main" val="1460651177"/>
+        <p14:creationId xmlns:p14="http://schemas.microsoft.com/office/powerpoint/2010/main" val="1847727445"/>
       </p:ext>
     </p:extLst>
   </p:cSld>
@@ -5927,23 +5941,23 @@
     </p:spTree>
     <p:extLst>
       <p:ext uri="{BB962C8B-B14F-4D97-AF65-F5344CB8AC3E}">
-        <p14:creationId xmlns:p14="http://schemas.microsoft.com/office/powerpoint/2010/main" val="1809793113"/>
+        <p14:creationId xmlns:p14="http://schemas.microsoft.com/office/powerpoint/2010/main" val="3096461945"/>
       </p:ext>
     </p:extLst>
   </p:cSld>
   <p:clrMap bg1="lt1" tx1="dk1" bg2="lt2" tx2="dk2" accent1="accent1" accent2="accent2" accent3="accent3" accent4="accent4" accent5="accent5" accent6="accent6" hlink="hlink" folHlink="folHlink"/>
   <p:sldLayoutIdLst>
-    <p:sldLayoutId id="2147483929" r:id="rId1"/>
-    <p:sldLayoutId id="2147483930" r:id="rId2"/>
-    <p:sldLayoutId id="2147483931" r:id="rId3"/>
-    <p:sldLayoutId id="2147483932" r:id="rId4"/>
-    <p:sldLayoutId id="2147483933" r:id="rId5"/>
-    <p:sldLayoutId id="2147483934" r:id="rId6"/>
-    <p:sldLayoutId id="2147483935" r:id="rId7"/>
-    <p:sldLayoutId id="2147483936" r:id="rId8"/>
-    <p:sldLayoutId id="2147483937" r:id="rId9"/>
-    <p:sldLayoutId id="2147483938" r:id="rId10"/>
-    <p:sldLayoutId id="2147483939" r:id="rId11"/>
+    <p:sldLayoutId id="2147483941" r:id="rId1"/>
+    <p:sldLayoutId id="2147483942" r:id="rId2"/>
+    <p:sldLayoutId id="2147483943" r:id="rId3"/>
+    <p:sldLayoutId id="2147483944" r:id="rId4"/>
+    <p:sldLayoutId id="2147483945" r:id="rId5"/>
+    <p:sldLayoutId id="2147483946" r:id="rId6"/>
+    <p:sldLayoutId id="2147483947" r:id="rId7"/>
+    <p:sldLayoutId id="2147483948" r:id="rId8"/>
+    <p:sldLayoutId id="2147483949" r:id="rId9"/>
+    <p:sldLayoutId id="2147483950" r:id="rId10"/>
+    <p:sldLayoutId id="2147483951" r:id="rId11"/>
   </p:sldLayoutIdLst>
   <p:hf sldNum="0" hdr="0" ftr="0" dt="0"/>
   <p:txStyles>
@@ -6337,7 +6351,7 @@
         </p:nvSpPr>
         <p:spPr>
           <a:xfrm>
-            <a:off x="1377202" y="461318"/>
+            <a:off x="1426628" y="601361"/>
             <a:ext cx="9418320" cy="1258330"/>
           </a:xfrm>
         </p:spPr>
@@ -6365,7 +6379,7 @@
         </p:nvSpPr>
         <p:spPr>
           <a:xfrm>
-            <a:off x="1599623" y="2042983"/>
+            <a:off x="1494014" y="2380734"/>
             <a:ext cx="9418320" cy="552759"/>
           </a:xfrm>
         </p:spPr>
@@ -6382,6 +6396,36 @@
           </a:p>
         </p:txBody>
       </p:sp>
+      <p:pic>
+        <p:nvPicPr>
+          <p:cNvPr id="4" name="Image 3"/>
+          <p:cNvPicPr>
+            <a:picLocks noChangeAspect="1"/>
+          </p:cNvPicPr>
+          <p:nvPr/>
+        </p:nvPicPr>
+        <p:blipFill>
+          <a:blip r:embed="rId2">
+            <a:extLst>
+              <a:ext uri="{28A0092B-C50C-407E-A947-70E740481C1C}">
+                <a14:useLocalDpi xmlns:a14="http://schemas.microsoft.com/office/drawing/2010/main" val="0"/>
+              </a:ext>
+            </a:extLst>
+          </a:blip>
+          <a:stretch>
+            <a:fillRect/>
+          </a:stretch>
+        </p:blipFill>
+        <p:spPr>
+          <a:xfrm>
+            <a:off x="5524500" y="3314700"/>
+            <a:ext cx="6667500" cy="3543300"/>
+          </a:xfrm>
+          <a:prstGeom prst="rect">
+            <a:avLst/>
+          </a:prstGeom>
+        </p:spPr>
+      </p:pic>
     </p:spTree>
     <p:extLst>
       <p:ext uri="{BB962C8B-B14F-4D97-AF65-F5344CB8AC3E}">
@@ -6392,6 +6436,897 @@
   <p:clrMapOvr>
     <a:masterClrMapping/>
   </p:clrMapOvr>
+  <p:timing>
+    <p:tnLst>
+      <p:par>
+        <p:cTn id="1" dur="indefinite" restart="never" nodeType="tmRoot"/>
+      </p:par>
+    </p:tnLst>
+  </p:timing>
+</p:sld>
+</file>
+
+<file path=ppt/slides/slide10.xml><?xml version="1.0" encoding="utf-8"?>
+<p:sld xmlns:a="http://schemas.openxmlformats.org/drawingml/2006/main" xmlns:r="http://schemas.openxmlformats.org/officeDocument/2006/relationships" xmlns:p="http://schemas.openxmlformats.org/presentationml/2006/main">
+  <p:cSld>
+    <p:spTree>
+      <p:nvGrpSpPr>
+        <p:cNvPr id="1" name=""/>
+        <p:cNvGrpSpPr/>
+        <p:nvPr/>
+      </p:nvGrpSpPr>
+      <p:grpSpPr>
+        <a:xfrm>
+          <a:off x="0" y="0"/>
+          <a:ext cx="0" cy="0"/>
+          <a:chOff x="0" y="0"/>
+          <a:chExt cx="0" cy="0"/>
+        </a:xfrm>
+      </p:grpSpPr>
+      <p:sp>
+        <p:nvSpPr>
+          <p:cNvPr id="2" name="Titre 1"/>
+          <p:cNvSpPr>
+            <a:spLocks noGrp="1"/>
+          </p:cNvSpPr>
+          <p:nvPr>
+            <p:ph type="title"/>
+          </p:nvPr>
+        </p:nvSpPr>
+        <p:spPr/>
+        <p:txBody>
+          <a:bodyPr>
+            <a:normAutofit/>
+          </a:bodyPr>
+          <a:lstStyle/>
+          <a:p>
+            <a:r>
+              <a:rPr lang="fr-CA" sz="4000" dirty="0" smtClean="0"/>
+              <a:t>Gestion des artistes(Sommaire)</a:t>
+            </a:r>
+            <a:endParaRPr lang="fr-CA" sz="4000" dirty="0"/>
+          </a:p>
+        </p:txBody>
+      </p:sp>
+      <p:pic>
+        <p:nvPicPr>
+          <p:cNvPr id="4" name="Espace réservé du contenu 3"/>
+          <p:cNvPicPr>
+            <a:picLocks noGrp="1" noChangeAspect="1"/>
+          </p:cNvPicPr>
+          <p:nvPr>
+            <p:ph idx="1"/>
+          </p:nvPr>
+        </p:nvPicPr>
+        <p:blipFill>
+          <a:blip r:embed="rId2">
+            <a:extLst>
+              <a:ext uri="{28A0092B-C50C-407E-A947-70E740481C1C}">
+                <a14:useLocalDpi xmlns:a14="http://schemas.microsoft.com/office/drawing/2010/main" val="0"/>
+              </a:ext>
+            </a:extLst>
+          </a:blip>
+          <a:stretch>
+            <a:fillRect/>
+          </a:stretch>
+        </p:blipFill>
+        <p:spPr>
+          <a:xfrm>
+            <a:off x="1138496" y="2020029"/>
+            <a:ext cx="9291959" cy="3622890"/>
+          </a:xfrm>
+        </p:spPr>
+      </p:pic>
+    </p:spTree>
+    <p:extLst>
+      <p:ext uri="{BB962C8B-B14F-4D97-AF65-F5344CB8AC3E}">
+        <p14:creationId xmlns:p14="http://schemas.microsoft.com/office/powerpoint/2010/main" val="3263798583"/>
+      </p:ext>
+    </p:extLst>
+  </p:cSld>
+  <p:clrMapOvr>
+    <a:masterClrMapping/>
+  </p:clrMapOvr>
+  <p:timing>
+    <p:tnLst>
+      <p:par>
+        <p:cTn id="1" dur="indefinite" restart="never" nodeType="tmRoot"/>
+      </p:par>
+    </p:tnLst>
+  </p:timing>
+</p:sld>
+</file>
+
+<file path=ppt/slides/slide11.xml><?xml version="1.0" encoding="utf-8"?>
+<p:sld xmlns:a="http://schemas.openxmlformats.org/drawingml/2006/main" xmlns:r="http://schemas.openxmlformats.org/officeDocument/2006/relationships" xmlns:p="http://schemas.openxmlformats.org/presentationml/2006/main">
+  <p:cSld>
+    <p:spTree>
+      <p:nvGrpSpPr>
+        <p:cNvPr id="1" name=""/>
+        <p:cNvGrpSpPr/>
+        <p:nvPr/>
+      </p:nvGrpSpPr>
+      <p:grpSpPr>
+        <a:xfrm>
+          <a:off x="0" y="0"/>
+          <a:ext cx="0" cy="0"/>
+          <a:chOff x="0" y="0"/>
+          <a:chExt cx="0" cy="0"/>
+        </a:xfrm>
+      </p:grpSpPr>
+      <p:sp>
+        <p:nvSpPr>
+          <p:cNvPr id="2" name="Titre 1"/>
+          <p:cNvSpPr>
+            <a:spLocks noGrp="1"/>
+          </p:cNvSpPr>
+          <p:nvPr>
+            <p:ph type="title"/>
+          </p:nvPr>
+        </p:nvSpPr>
+        <p:spPr/>
+        <p:txBody>
+          <a:bodyPr>
+            <a:normAutofit/>
+          </a:bodyPr>
+          <a:lstStyle/>
+          <a:p>
+            <a:r>
+              <a:rPr lang="fr-CA" sz="4000" dirty="0"/>
+              <a:t>Gestion des </a:t>
+            </a:r>
+            <a:r>
+              <a:rPr lang="fr-CA" sz="4000" dirty="0" smtClean="0"/>
+              <a:t>artistes(Détail)</a:t>
+            </a:r>
+            <a:endParaRPr lang="fr-CA" sz="4000" dirty="0"/>
+          </a:p>
+        </p:txBody>
+      </p:sp>
+      <p:pic>
+        <p:nvPicPr>
+          <p:cNvPr id="6" name="Espace réservé du contenu 5"/>
+          <p:cNvPicPr>
+            <a:picLocks noGrp="1" noChangeAspect="1"/>
+          </p:cNvPicPr>
+          <p:nvPr>
+            <p:ph idx="1"/>
+          </p:nvPr>
+        </p:nvPicPr>
+        <p:blipFill>
+          <a:blip r:embed="rId2">
+            <a:extLst>
+              <a:ext uri="{28A0092B-C50C-407E-A947-70E740481C1C}">
+                <a14:useLocalDpi xmlns:a14="http://schemas.microsoft.com/office/drawing/2010/main" val="0"/>
+              </a:ext>
+            </a:extLst>
+          </a:blip>
+          <a:stretch>
+            <a:fillRect/>
+          </a:stretch>
+        </p:blipFill>
+        <p:spPr>
+          <a:xfrm>
+            <a:off x="2257168" y="1828799"/>
+            <a:ext cx="5994453" cy="4438257"/>
+          </a:xfrm>
+        </p:spPr>
+      </p:pic>
+    </p:spTree>
+    <p:extLst>
+      <p:ext uri="{BB962C8B-B14F-4D97-AF65-F5344CB8AC3E}">
+        <p14:creationId xmlns:p14="http://schemas.microsoft.com/office/powerpoint/2010/main" val="1637175353"/>
+      </p:ext>
+    </p:extLst>
+  </p:cSld>
+  <p:clrMapOvr>
+    <a:masterClrMapping/>
+  </p:clrMapOvr>
+  <p:timing>
+    <p:tnLst>
+      <p:par>
+        <p:cTn id="1" dur="indefinite" restart="never" nodeType="tmRoot"/>
+      </p:par>
+    </p:tnLst>
+  </p:timing>
+</p:sld>
+</file>
+
+<file path=ppt/slides/slide12.xml><?xml version="1.0" encoding="utf-8"?>
+<p:sld xmlns:a="http://schemas.openxmlformats.org/drawingml/2006/main" xmlns:r="http://schemas.openxmlformats.org/officeDocument/2006/relationships" xmlns:p="http://schemas.openxmlformats.org/presentationml/2006/main">
+  <p:cSld>
+    <p:spTree>
+      <p:nvGrpSpPr>
+        <p:cNvPr id="1" name=""/>
+        <p:cNvGrpSpPr/>
+        <p:nvPr/>
+      </p:nvGrpSpPr>
+      <p:grpSpPr>
+        <a:xfrm>
+          <a:off x="0" y="0"/>
+          <a:ext cx="0" cy="0"/>
+          <a:chOff x="0" y="0"/>
+          <a:chExt cx="0" cy="0"/>
+        </a:xfrm>
+      </p:grpSpPr>
+      <p:sp>
+        <p:nvSpPr>
+          <p:cNvPr id="2" name="Titre 1"/>
+          <p:cNvSpPr>
+            <a:spLocks noGrp="1"/>
+          </p:cNvSpPr>
+          <p:nvPr>
+            <p:ph type="title"/>
+          </p:nvPr>
+        </p:nvSpPr>
+        <p:spPr/>
+        <p:txBody>
+          <a:bodyPr>
+            <a:normAutofit/>
+          </a:bodyPr>
+          <a:lstStyle/>
+          <a:p>
+            <a:r>
+              <a:rPr lang="fr-CA" sz="4000" dirty="0" smtClean="0"/>
+              <a:t>Gestion des engagements</a:t>
+            </a:r>
+            <a:endParaRPr lang="fr-CA" sz="4000" dirty="0"/>
+          </a:p>
+        </p:txBody>
+      </p:sp>
+      <p:pic>
+        <p:nvPicPr>
+          <p:cNvPr id="4" name="Espace réservé du contenu 3"/>
+          <p:cNvPicPr>
+            <a:picLocks noGrp="1" noChangeAspect="1"/>
+          </p:cNvPicPr>
+          <p:nvPr>
+            <p:ph idx="1"/>
+          </p:nvPr>
+        </p:nvPicPr>
+        <p:blipFill>
+          <a:blip r:embed="rId2">
+            <a:extLst>
+              <a:ext uri="{28A0092B-C50C-407E-A947-70E740481C1C}">
+                <a14:useLocalDpi xmlns:a14="http://schemas.microsoft.com/office/drawing/2010/main" val="0"/>
+              </a:ext>
+            </a:extLst>
+          </a:blip>
+          <a:stretch>
+            <a:fillRect/>
+          </a:stretch>
+        </p:blipFill>
+        <p:spPr>
+          <a:xfrm>
+            <a:off x="2003540" y="1828800"/>
+            <a:ext cx="7111770" cy="4351338"/>
+          </a:xfrm>
+        </p:spPr>
+      </p:pic>
+    </p:spTree>
+    <p:extLst>
+      <p:ext uri="{BB962C8B-B14F-4D97-AF65-F5344CB8AC3E}">
+        <p14:creationId xmlns:p14="http://schemas.microsoft.com/office/powerpoint/2010/main" val="2516195767"/>
+      </p:ext>
+    </p:extLst>
+  </p:cSld>
+  <p:clrMapOvr>
+    <a:masterClrMapping/>
+  </p:clrMapOvr>
+  <p:timing>
+    <p:tnLst>
+      <p:par>
+        <p:cTn id="1" dur="indefinite" restart="never" nodeType="tmRoot"/>
+      </p:par>
+    </p:tnLst>
+  </p:timing>
+</p:sld>
+</file>
+
+<file path=ppt/slides/slide13.xml><?xml version="1.0" encoding="utf-8"?>
+<p:sld xmlns:a="http://schemas.openxmlformats.org/drawingml/2006/main" xmlns:r="http://schemas.openxmlformats.org/officeDocument/2006/relationships" xmlns:p="http://schemas.openxmlformats.org/presentationml/2006/main">
+  <p:cSld>
+    <p:spTree>
+      <p:nvGrpSpPr>
+        <p:cNvPr id="1" name=""/>
+        <p:cNvGrpSpPr/>
+        <p:nvPr/>
+      </p:nvGrpSpPr>
+      <p:grpSpPr>
+        <a:xfrm>
+          <a:off x="0" y="0"/>
+          <a:ext cx="0" cy="0"/>
+          <a:chOff x="0" y="0"/>
+          <a:chExt cx="0" cy="0"/>
+        </a:xfrm>
+      </p:grpSpPr>
+      <p:sp>
+        <p:nvSpPr>
+          <p:cNvPr id="2" name="Titre 1"/>
+          <p:cNvSpPr>
+            <a:spLocks noGrp="1"/>
+          </p:cNvSpPr>
+          <p:nvPr>
+            <p:ph type="title"/>
+          </p:nvPr>
+        </p:nvSpPr>
+        <p:spPr/>
+        <p:txBody>
+          <a:bodyPr>
+            <a:normAutofit/>
+          </a:bodyPr>
+          <a:lstStyle/>
+          <a:p>
+            <a:r>
+              <a:rPr lang="fr-CA" sz="4000" dirty="0" smtClean="0"/>
+              <a:t>Gestion des exigences</a:t>
+            </a:r>
+            <a:endParaRPr lang="fr-CA" sz="4000" dirty="0"/>
+          </a:p>
+        </p:txBody>
+      </p:sp>
+      <p:pic>
+        <p:nvPicPr>
+          <p:cNvPr id="4" name="Espace réservé du contenu 3"/>
+          <p:cNvPicPr>
+            <a:picLocks noGrp="1" noChangeAspect="1"/>
+          </p:cNvPicPr>
+          <p:nvPr>
+            <p:ph idx="1"/>
+          </p:nvPr>
+        </p:nvPicPr>
+        <p:blipFill>
+          <a:blip r:embed="rId2">
+            <a:extLst>
+              <a:ext uri="{28A0092B-C50C-407E-A947-70E740481C1C}">
+                <a14:useLocalDpi xmlns:a14="http://schemas.microsoft.com/office/drawing/2010/main" val="0"/>
+              </a:ext>
+            </a:extLst>
+          </a:blip>
+          <a:stretch>
+            <a:fillRect/>
+          </a:stretch>
+        </p:blipFill>
+        <p:spPr>
+          <a:xfrm>
+            <a:off x="1734604" y="1956308"/>
+            <a:ext cx="7649643" cy="4096322"/>
+          </a:xfrm>
+        </p:spPr>
+      </p:pic>
+    </p:spTree>
+    <p:extLst>
+      <p:ext uri="{BB962C8B-B14F-4D97-AF65-F5344CB8AC3E}">
+        <p14:creationId xmlns:p14="http://schemas.microsoft.com/office/powerpoint/2010/main" val="1364888058"/>
+      </p:ext>
+    </p:extLst>
+  </p:cSld>
+  <p:clrMapOvr>
+    <a:masterClrMapping/>
+  </p:clrMapOvr>
+  <p:timing>
+    <p:tnLst>
+      <p:par>
+        <p:cTn id="1" dur="indefinite" restart="never" nodeType="tmRoot"/>
+      </p:par>
+    </p:tnLst>
+  </p:timing>
+</p:sld>
+</file>
+
+<file path=ppt/slides/slide14.xml><?xml version="1.0" encoding="utf-8"?>
+<p:sld xmlns:a="http://schemas.openxmlformats.org/drawingml/2006/main" xmlns:r="http://schemas.openxmlformats.org/officeDocument/2006/relationships" xmlns:p="http://schemas.openxmlformats.org/presentationml/2006/main">
+  <p:cSld>
+    <p:spTree>
+      <p:nvGrpSpPr>
+        <p:cNvPr id="1" name=""/>
+        <p:cNvGrpSpPr/>
+        <p:nvPr/>
+      </p:nvGrpSpPr>
+      <p:grpSpPr>
+        <a:xfrm>
+          <a:off x="0" y="0"/>
+          <a:ext cx="0" cy="0"/>
+          <a:chOff x="0" y="0"/>
+          <a:chExt cx="0" cy="0"/>
+        </a:xfrm>
+      </p:grpSpPr>
+      <p:sp>
+        <p:nvSpPr>
+          <p:cNvPr id="2" name="Titre 1"/>
+          <p:cNvSpPr>
+            <a:spLocks noGrp="1"/>
+          </p:cNvSpPr>
+          <p:nvPr>
+            <p:ph type="title"/>
+          </p:nvPr>
+        </p:nvSpPr>
+        <p:spPr/>
+        <p:txBody>
+          <a:bodyPr>
+            <a:normAutofit/>
+          </a:bodyPr>
+          <a:lstStyle/>
+          <a:p>
+            <a:r>
+              <a:rPr lang="fr-CA" sz="4000" dirty="0" smtClean="0"/>
+              <a:t>Gestion des contrats(Sommaire)</a:t>
+            </a:r>
+            <a:endParaRPr lang="fr-CA" sz="4000" dirty="0"/>
+          </a:p>
+        </p:txBody>
+      </p:sp>
+      <p:pic>
+        <p:nvPicPr>
+          <p:cNvPr id="4" name="Espace réservé du contenu 3"/>
+          <p:cNvPicPr>
+            <a:picLocks noGrp="1" noChangeAspect="1"/>
+          </p:cNvPicPr>
+          <p:nvPr>
+            <p:ph idx="1"/>
+          </p:nvPr>
+        </p:nvPicPr>
+        <p:blipFill>
+          <a:blip r:embed="rId2">
+            <a:extLst>
+              <a:ext uri="{28A0092B-C50C-407E-A947-70E740481C1C}">
+                <a14:useLocalDpi xmlns:a14="http://schemas.microsoft.com/office/drawing/2010/main" val="0"/>
+              </a:ext>
+            </a:extLst>
+          </a:blip>
+          <a:stretch>
+            <a:fillRect/>
+          </a:stretch>
+        </p:blipFill>
+        <p:spPr>
+          <a:xfrm>
+            <a:off x="1113782" y="2202352"/>
+            <a:ext cx="8594725" cy="3292286"/>
+          </a:xfrm>
+        </p:spPr>
+      </p:pic>
+    </p:spTree>
+    <p:extLst>
+      <p:ext uri="{BB962C8B-B14F-4D97-AF65-F5344CB8AC3E}">
+        <p14:creationId xmlns:p14="http://schemas.microsoft.com/office/powerpoint/2010/main" val="1389757546"/>
+      </p:ext>
+    </p:extLst>
+  </p:cSld>
+  <p:clrMapOvr>
+    <a:masterClrMapping/>
+  </p:clrMapOvr>
+  <p:timing>
+    <p:tnLst>
+      <p:par>
+        <p:cTn id="1" dur="indefinite" restart="never" nodeType="tmRoot"/>
+      </p:par>
+    </p:tnLst>
+  </p:timing>
+</p:sld>
+</file>
+
+<file path=ppt/slides/slide15.xml><?xml version="1.0" encoding="utf-8"?>
+<p:sld xmlns:a="http://schemas.openxmlformats.org/drawingml/2006/main" xmlns:r="http://schemas.openxmlformats.org/officeDocument/2006/relationships" xmlns:p="http://schemas.openxmlformats.org/presentationml/2006/main">
+  <p:cSld>
+    <p:spTree>
+      <p:nvGrpSpPr>
+        <p:cNvPr id="1" name=""/>
+        <p:cNvGrpSpPr/>
+        <p:nvPr/>
+      </p:nvGrpSpPr>
+      <p:grpSpPr>
+        <a:xfrm>
+          <a:off x="0" y="0"/>
+          <a:ext cx="0" cy="0"/>
+          <a:chOff x="0" y="0"/>
+          <a:chExt cx="0" cy="0"/>
+        </a:xfrm>
+      </p:grpSpPr>
+      <p:sp>
+        <p:nvSpPr>
+          <p:cNvPr id="2" name="Titre 1"/>
+          <p:cNvSpPr>
+            <a:spLocks noGrp="1"/>
+          </p:cNvSpPr>
+          <p:nvPr>
+            <p:ph type="title"/>
+          </p:nvPr>
+        </p:nvSpPr>
+        <p:spPr/>
+        <p:txBody>
+          <a:bodyPr>
+            <a:normAutofit/>
+          </a:bodyPr>
+          <a:lstStyle/>
+          <a:p>
+            <a:r>
+              <a:rPr lang="fr-CA" sz="4000" dirty="0"/>
+              <a:t>Gestion des </a:t>
+            </a:r>
+            <a:r>
+              <a:rPr lang="fr-CA" sz="4000" dirty="0" smtClean="0"/>
+              <a:t>contrats(Détail)</a:t>
+            </a:r>
+            <a:endParaRPr lang="fr-CA" sz="4000" dirty="0"/>
+          </a:p>
+        </p:txBody>
+      </p:sp>
+      <p:pic>
+        <p:nvPicPr>
+          <p:cNvPr id="4" name="Espace réservé du contenu 3"/>
+          <p:cNvPicPr>
+            <a:picLocks noGrp="1" noChangeAspect="1"/>
+          </p:cNvPicPr>
+          <p:nvPr>
+            <p:ph idx="1"/>
+          </p:nvPr>
+        </p:nvPicPr>
+        <p:blipFill>
+          <a:blip r:embed="rId2">
+            <a:extLst>
+              <a:ext uri="{28A0092B-C50C-407E-A947-70E740481C1C}">
+                <a14:useLocalDpi xmlns:a14="http://schemas.microsoft.com/office/drawing/2010/main" val="0"/>
+              </a:ext>
+            </a:extLst>
+          </a:blip>
+          <a:stretch>
+            <a:fillRect/>
+          </a:stretch>
+        </p:blipFill>
+        <p:spPr>
+          <a:xfrm>
+            <a:off x="1056117" y="1909618"/>
+            <a:ext cx="8594725" cy="3510879"/>
+          </a:xfrm>
+        </p:spPr>
+      </p:pic>
+    </p:spTree>
+    <p:extLst>
+      <p:ext uri="{BB962C8B-B14F-4D97-AF65-F5344CB8AC3E}">
+        <p14:creationId xmlns:p14="http://schemas.microsoft.com/office/powerpoint/2010/main" val="1891211013"/>
+      </p:ext>
+    </p:extLst>
+  </p:cSld>
+  <p:clrMapOvr>
+    <a:masterClrMapping/>
+  </p:clrMapOvr>
+  <p:timing>
+    <p:tnLst>
+      <p:par>
+        <p:cTn id="1" dur="indefinite" restart="never" nodeType="tmRoot"/>
+      </p:par>
+    </p:tnLst>
+  </p:timing>
+</p:sld>
+</file>
+
+<file path=ppt/slides/slide16.xml><?xml version="1.0" encoding="utf-8"?>
+<p:sld xmlns:a="http://schemas.openxmlformats.org/drawingml/2006/main" xmlns:r="http://schemas.openxmlformats.org/officeDocument/2006/relationships" xmlns:p="http://schemas.openxmlformats.org/presentationml/2006/main">
+  <p:cSld>
+    <p:spTree>
+      <p:nvGrpSpPr>
+        <p:cNvPr id="1" name=""/>
+        <p:cNvGrpSpPr/>
+        <p:nvPr/>
+      </p:nvGrpSpPr>
+      <p:grpSpPr>
+        <a:xfrm>
+          <a:off x="0" y="0"/>
+          <a:ext cx="0" cy="0"/>
+          <a:chOff x="0" y="0"/>
+          <a:chExt cx="0" cy="0"/>
+        </a:xfrm>
+      </p:grpSpPr>
+      <p:sp>
+        <p:nvSpPr>
+          <p:cNvPr id="2" name="Titre 1"/>
+          <p:cNvSpPr>
+            <a:spLocks noGrp="1"/>
+          </p:cNvSpPr>
+          <p:nvPr>
+            <p:ph type="title"/>
+          </p:nvPr>
+        </p:nvSpPr>
+        <p:spPr/>
+        <p:txBody>
+          <a:bodyPr>
+            <a:normAutofit fontScale="90000"/>
+          </a:bodyPr>
+          <a:lstStyle/>
+          <a:p>
+            <a:r>
+              <a:rPr lang="fr-CA" dirty="0" smtClean="0"/>
+              <a:t/>
+            </a:r>
+            <a:br>
+              <a:rPr lang="fr-CA" dirty="0" smtClean="0"/>
+            </a:br>
+            <a:r>
+              <a:rPr lang="fr-CA" dirty="0"/>
+              <a:t/>
+            </a:r>
+            <a:br>
+              <a:rPr lang="fr-CA" dirty="0"/>
+            </a:br>
+            <a:r>
+              <a:rPr lang="fr-CA" dirty="0" smtClean="0"/>
+              <a:t/>
+            </a:r>
+            <a:br>
+              <a:rPr lang="fr-CA" dirty="0" smtClean="0"/>
+            </a:br>
+            <a:r>
+              <a:rPr lang="fr-CA" dirty="0" smtClean="0"/>
+              <a:t>Démonstration </a:t>
+            </a:r>
+            <a:r>
+              <a:rPr lang="fr-CA" dirty="0"/>
+              <a:t>de l’application </a:t>
+            </a:r>
+            <a:r>
+              <a:rPr lang="fr-CA" dirty="0" smtClean="0"/>
+              <a:t>Web</a:t>
+            </a:r>
+            <a:endParaRPr lang="fr-CA" dirty="0"/>
+          </a:p>
+        </p:txBody>
+      </p:sp>
+      <p:pic>
+        <p:nvPicPr>
+          <p:cNvPr id="6" name="Espace réservé du contenu 5"/>
+          <p:cNvPicPr>
+            <a:picLocks noGrp="1" noChangeAspect="1"/>
+          </p:cNvPicPr>
+          <p:nvPr>
+            <p:ph idx="1"/>
+          </p:nvPr>
+        </p:nvPicPr>
+        <p:blipFill>
+          <a:blip r:embed="rId2">
+            <a:extLst>
+              <a:ext uri="{28A0092B-C50C-407E-A947-70E740481C1C}">
+                <a14:useLocalDpi xmlns:a14="http://schemas.microsoft.com/office/drawing/2010/main" val="0"/>
+              </a:ext>
+            </a:extLst>
+          </a:blip>
+          <a:stretch>
+            <a:fillRect/>
+          </a:stretch>
+        </p:blipFill>
+        <p:spPr>
+          <a:xfrm>
+            <a:off x="1262063" y="2170505"/>
+            <a:ext cx="8850805" cy="3777214"/>
+          </a:xfrm>
+          <a:ln>
+            <a:solidFill>
+              <a:schemeClr val="tx1"/>
+            </a:solidFill>
+          </a:ln>
+        </p:spPr>
+      </p:pic>
+    </p:spTree>
+    <p:extLst>
+      <p:ext uri="{BB962C8B-B14F-4D97-AF65-F5344CB8AC3E}">
+        <p14:creationId xmlns:p14="http://schemas.microsoft.com/office/powerpoint/2010/main" val="856036630"/>
+      </p:ext>
+    </p:extLst>
+  </p:cSld>
+  <p:clrMapOvr>
+    <a:masterClrMapping/>
+  </p:clrMapOvr>
+  <p:timing>
+    <p:tnLst>
+      <p:par>
+        <p:cTn id="1" dur="indefinite" restart="never" nodeType="tmRoot"/>
+      </p:par>
+    </p:tnLst>
+  </p:timing>
+</p:sld>
+</file>
+
+<file path=ppt/slides/slide17.xml><?xml version="1.0" encoding="utf-8"?>
+<p:sld xmlns:a="http://schemas.openxmlformats.org/drawingml/2006/main" xmlns:r="http://schemas.openxmlformats.org/officeDocument/2006/relationships" xmlns:p="http://schemas.openxmlformats.org/presentationml/2006/main">
+  <p:cSld>
+    <p:spTree>
+      <p:nvGrpSpPr>
+        <p:cNvPr id="1" name=""/>
+        <p:cNvGrpSpPr/>
+        <p:nvPr/>
+      </p:nvGrpSpPr>
+      <p:grpSpPr>
+        <a:xfrm>
+          <a:off x="0" y="0"/>
+          <a:ext cx="0" cy="0"/>
+          <a:chOff x="0" y="0"/>
+          <a:chExt cx="0" cy="0"/>
+        </a:xfrm>
+      </p:grpSpPr>
+      <p:sp>
+        <p:nvSpPr>
+          <p:cNvPr id="2" name="Titre 1"/>
+          <p:cNvSpPr>
+            <a:spLocks noGrp="1"/>
+          </p:cNvSpPr>
+          <p:nvPr>
+            <p:ph type="title"/>
+          </p:nvPr>
+        </p:nvSpPr>
+        <p:spPr/>
+        <p:txBody>
+          <a:bodyPr>
+            <a:normAutofit/>
+          </a:bodyPr>
+          <a:lstStyle/>
+          <a:p>
+            <a:r>
+              <a:rPr lang="fr-CA" sz="4000" dirty="0" smtClean="0"/>
+              <a:t>Création d’un évènement au complet</a:t>
+            </a:r>
+            <a:endParaRPr lang="fr-CA" sz="4000" dirty="0"/>
+          </a:p>
+        </p:txBody>
+      </p:sp>
+      <p:pic>
+        <p:nvPicPr>
+          <p:cNvPr id="4" name="Espace réservé du contenu 3"/>
+          <p:cNvPicPr>
+            <a:picLocks noGrp="1" noChangeAspect="1"/>
+          </p:cNvPicPr>
+          <p:nvPr>
+            <p:ph idx="1"/>
+          </p:nvPr>
+        </p:nvPicPr>
+        <p:blipFill>
+          <a:blip r:embed="rId2">
+            <a:extLst>
+              <a:ext uri="{28A0092B-C50C-407E-A947-70E740481C1C}">
+                <a14:useLocalDpi xmlns:a14="http://schemas.microsoft.com/office/drawing/2010/main" val="0"/>
+              </a:ext>
+            </a:extLst>
+          </a:blip>
+          <a:stretch>
+            <a:fillRect/>
+          </a:stretch>
+        </p:blipFill>
+        <p:spPr>
+          <a:xfrm>
+            <a:off x="1506538" y="2504281"/>
+            <a:ext cx="8105775" cy="3000375"/>
+          </a:xfrm>
+        </p:spPr>
+      </p:pic>
+    </p:spTree>
+    <p:extLst>
+      <p:ext uri="{BB962C8B-B14F-4D97-AF65-F5344CB8AC3E}">
+        <p14:creationId xmlns:p14="http://schemas.microsoft.com/office/powerpoint/2010/main" val="4031654824"/>
+      </p:ext>
+    </p:extLst>
+  </p:cSld>
+  <p:clrMapOvr>
+    <a:masterClrMapping/>
+  </p:clrMapOvr>
+  <p:timing>
+    <p:tnLst>
+      <p:par>
+        <p:cTn id="1" dur="indefinite" restart="never" nodeType="tmRoot"/>
+      </p:par>
+    </p:tnLst>
+  </p:timing>
+</p:sld>
+</file>
+
+<file path=ppt/slides/slide18.xml><?xml version="1.0" encoding="utf-8"?>
+<p:sld xmlns:a="http://schemas.openxmlformats.org/drawingml/2006/main" xmlns:r="http://schemas.openxmlformats.org/officeDocument/2006/relationships" xmlns:p="http://schemas.openxmlformats.org/presentationml/2006/main">
+  <p:cSld>
+    <p:spTree>
+      <p:nvGrpSpPr>
+        <p:cNvPr id="1" name=""/>
+        <p:cNvGrpSpPr/>
+        <p:nvPr/>
+      </p:nvGrpSpPr>
+      <p:grpSpPr>
+        <a:xfrm>
+          <a:off x="0" y="0"/>
+          <a:ext cx="0" cy="0"/>
+          <a:chOff x="0" y="0"/>
+          <a:chExt cx="0" cy="0"/>
+        </a:xfrm>
+      </p:grpSpPr>
+      <p:sp>
+        <p:nvSpPr>
+          <p:cNvPr id="2" name="Titre 1"/>
+          <p:cNvSpPr>
+            <a:spLocks noGrp="1"/>
+          </p:cNvSpPr>
+          <p:nvPr>
+            <p:ph type="title"/>
+          </p:nvPr>
+        </p:nvSpPr>
+        <p:spPr/>
+        <p:txBody>
+          <a:bodyPr>
+            <a:normAutofit/>
+          </a:bodyPr>
+          <a:lstStyle/>
+          <a:p>
+            <a:r>
+              <a:rPr lang="fr-CA" sz="4000" dirty="0" smtClean="0"/>
+              <a:t>Conclusion</a:t>
+            </a:r>
+            <a:endParaRPr lang="fr-CA" sz="4000" dirty="0"/>
+          </a:p>
+        </p:txBody>
+      </p:sp>
+      <p:sp>
+        <p:nvSpPr>
+          <p:cNvPr id="3" name="Espace réservé du contenu 2"/>
+          <p:cNvSpPr>
+            <a:spLocks noGrp="1"/>
+          </p:cNvSpPr>
+          <p:nvPr>
+            <p:ph idx="1"/>
+          </p:nvPr>
+        </p:nvSpPr>
+        <p:spPr/>
+        <p:txBody>
+          <a:bodyPr/>
+          <a:lstStyle/>
+          <a:p>
+            <a:r>
+              <a:rPr lang="fr-CA" dirty="0" smtClean="0"/>
+              <a:t>Bons coups de l’équipe</a:t>
+            </a:r>
+          </a:p>
+          <a:p>
+            <a:r>
+              <a:rPr lang="fr-CA" dirty="0" smtClean="0"/>
+              <a:t>Erreurs de l’équipe</a:t>
+            </a:r>
+          </a:p>
+          <a:p>
+            <a:r>
+              <a:rPr lang="fr-CA" dirty="0" smtClean="0"/>
+              <a:t>Bon coups individuels</a:t>
+            </a:r>
+            <a:endParaRPr lang="fr-CA" dirty="0"/>
+          </a:p>
+          <a:p>
+            <a:r>
+              <a:rPr lang="fr-CA" dirty="0"/>
+              <a:t>Erreurs </a:t>
+            </a:r>
+            <a:r>
+              <a:rPr lang="fr-CA" dirty="0" smtClean="0"/>
+              <a:t>individuels</a:t>
+            </a:r>
+          </a:p>
+          <a:p>
+            <a:r>
+              <a:rPr lang="fr-CA" dirty="0" smtClean="0"/>
+              <a:t>Recommandations et suggestions </a:t>
+            </a:r>
+            <a:endParaRPr lang="fr-CA" dirty="0"/>
+          </a:p>
+        </p:txBody>
+      </p:sp>
+    </p:spTree>
+    <p:extLst>
+      <p:ext uri="{BB962C8B-B14F-4D97-AF65-F5344CB8AC3E}">
+        <p14:creationId xmlns:p14="http://schemas.microsoft.com/office/powerpoint/2010/main" val="2435794121"/>
+      </p:ext>
+    </p:extLst>
+  </p:cSld>
+  <p:clrMapOvr>
+    <a:masterClrMapping/>
+  </p:clrMapOvr>
+  <p:timing>
+    <p:tnLst>
+      <p:par>
+        <p:cTn id="1" dur="indefinite" restart="never" nodeType="tmRoot"/>
+      </p:par>
+    </p:tnLst>
+  </p:timing>
 </p:sld>
 </file>
 
@@ -6428,44 +7363,62 @@
           <a:lstStyle/>
           <a:p>
             <a:r>
+              <a:rPr lang="fr-CA" sz="4000" dirty="0" smtClean="0"/>
+              <a:t>Contenu</a:t>
+            </a:r>
+            <a:endParaRPr lang="fr-CA" sz="4000" dirty="0"/>
+          </a:p>
+        </p:txBody>
+      </p:sp>
+      <p:sp>
+        <p:nvSpPr>
+          <p:cNvPr id="3" name="Espace réservé du contenu 2"/>
+          <p:cNvSpPr>
+            <a:spLocks noGrp="1"/>
+          </p:cNvSpPr>
+          <p:nvPr>
+            <p:ph idx="1"/>
+          </p:nvPr>
+        </p:nvSpPr>
+        <p:spPr/>
+        <p:txBody>
+          <a:bodyPr/>
+          <a:lstStyle/>
+          <a:p>
+            <a:r>
               <a:rPr lang="fr-CA" dirty="0" smtClean="0"/>
               <a:t>Introduction</a:t>
             </a:r>
-            <a:endParaRPr lang="fr-CA" dirty="0"/>
-          </a:p>
-        </p:txBody>
-      </p:sp>
-      <p:sp>
-        <p:nvSpPr>
-          <p:cNvPr id="3" name="Espace réservé du contenu 2"/>
-          <p:cNvSpPr>
-            <a:spLocks noGrp="1"/>
-          </p:cNvSpPr>
-          <p:nvPr>
-            <p:ph idx="1"/>
-          </p:nvPr>
-        </p:nvSpPr>
-        <p:spPr/>
-        <p:txBody>
-          <a:bodyPr/>
-          <a:lstStyle/>
+          </a:p>
           <a:p>
             <a:r>
               <a:rPr lang="fr-CA" dirty="0" smtClean="0"/>
-              <a:t>Notre Mandat</a:t>
+              <a:t>Présentation de l’application </a:t>
+            </a:r>
+            <a:r>
+              <a:rPr lang="fr-CA" dirty="0"/>
+              <a:t>console</a:t>
             </a:r>
           </a:p>
           <a:p>
             <a:r>
               <a:rPr lang="fr-CA" dirty="0" smtClean="0"/>
-              <a:t>Contexte du projet</a:t>
+              <a:t>Démonstration de l’application Web</a:t>
             </a:r>
           </a:p>
           <a:p>
             <a:r>
               <a:rPr lang="fr-CA" dirty="0" smtClean="0"/>
-              <a:t>Objectifs du projet</a:t>
-            </a:r>
+              <a:t>Création d’un évènement au complet</a:t>
+            </a:r>
+          </a:p>
+          <a:p>
+            <a:r>
+              <a:rPr lang="fr-CA" dirty="0" smtClean="0"/>
+              <a:t>Conclusion</a:t>
+            </a:r>
+          </a:p>
+          <a:p>
             <a:endParaRPr lang="fr-CA" dirty="0"/>
           </a:p>
         </p:txBody>
@@ -6473,13 +7426,20 @@
     </p:spTree>
     <p:extLst>
       <p:ext uri="{BB962C8B-B14F-4D97-AF65-F5344CB8AC3E}">
-        <p14:creationId xmlns:p14="http://schemas.microsoft.com/office/powerpoint/2010/main" val="683129291"/>
+        <p14:creationId xmlns:p14="http://schemas.microsoft.com/office/powerpoint/2010/main" val="3365026024"/>
       </p:ext>
     </p:extLst>
   </p:cSld>
   <p:clrMapOvr>
     <a:masterClrMapping/>
   </p:clrMapOvr>
+  <p:timing>
+    <p:tnLst>
+      <p:par>
+        <p:cTn id="1" dur="indefinite" restart="never" nodeType="tmRoot"/>
+      </p:par>
+    </p:tnLst>
+  </p:timing>
 </p:sld>
 </file>
 
@@ -6515,7 +7475,11 @@
           <a:bodyPr/>
           <a:lstStyle/>
           <a:p>
-            <a:endParaRPr lang="fr-CA" dirty="0"/>
+            <a:r>
+              <a:rPr lang="fr-CA" sz="4000" dirty="0" smtClean="0"/>
+              <a:t>Introduction</a:t>
+            </a:r>
+            <a:endParaRPr lang="fr-CA" sz="4000" dirty="0"/>
           </a:p>
         </p:txBody>
       </p:sp>
@@ -6534,20 +7498,46 @@
           <a:bodyPr/>
           <a:lstStyle/>
           <a:p>
-            <a:endParaRPr lang="fr-CA" dirty="0"/>
+            <a:r>
+              <a:rPr lang="fr-CA" dirty="0" smtClean="0"/>
+              <a:t>Notre Mandat</a:t>
+            </a:r>
+          </a:p>
+          <a:p>
+            <a:r>
+              <a:rPr lang="fr-CA" dirty="0" smtClean="0"/>
+              <a:t>Contexte du projet</a:t>
+            </a:r>
+          </a:p>
+          <a:p>
+            <a:r>
+              <a:rPr lang="fr-CA" dirty="0" smtClean="0"/>
+              <a:t>Objectifs du </a:t>
+            </a:r>
+            <a:r>
+              <a:rPr lang="fr-CA" dirty="0" smtClean="0"/>
+              <a:t>projet</a:t>
+            </a:r>
           </a:p>
         </p:txBody>
       </p:sp>
     </p:spTree>
     <p:extLst>
       <p:ext uri="{BB962C8B-B14F-4D97-AF65-F5344CB8AC3E}">
-        <p14:creationId xmlns:p14="http://schemas.microsoft.com/office/powerpoint/2010/main" val="2199061193"/>
+        <p14:creationId xmlns:p14="http://schemas.microsoft.com/office/powerpoint/2010/main" val="683129291"/>
       </p:ext>
     </p:extLst>
   </p:cSld>
   <p:clrMapOvr>
     <a:masterClrMapping/>
   </p:clrMapOvr>
+  <p:timing>
+    <p:tnLst>
+      <p:par>
+        <p:cTn id="1" dur="indefinite" restart="never" nodeType="tmRoot"/>
+      </p:par>
+    </p:tnLst>
+  </p:timing>
 </p:sld>
 </file>
 
@@ -6580,10 +7570,16 @@
         </p:nvSpPr>
         <p:spPr/>
         <p:txBody>
-          <a:bodyPr/>
-          <a:lstStyle/>
-          <a:p>
-            <a:endParaRPr lang="fr-CA"/>
+          <a:bodyPr>
+            <a:normAutofit/>
+          </a:bodyPr>
+          <a:lstStyle/>
+          <a:p>
+            <a:r>
+              <a:rPr lang="fr-CA" sz="4000" dirty="0" smtClean="0"/>
+              <a:t>Application console</a:t>
+            </a:r>
+            <a:endParaRPr lang="fr-CA" sz="4000" dirty="0"/>
           </a:p>
         </p:txBody>
       </p:sp>
@@ -6602,20 +7598,539 @@
           <a:bodyPr/>
           <a:lstStyle/>
           <a:p>
-            <a:endParaRPr lang="fr-CA"/>
-          </a:p>
-        </p:txBody>
-      </p:sp>
+            <a:endParaRPr lang="fr-CA" dirty="0" smtClean="0"/>
+          </a:p>
+          <a:p>
+            <a:endParaRPr lang="fr-CA" dirty="0"/>
+          </a:p>
+        </p:txBody>
+      </p:sp>
+      <p:pic>
+        <p:nvPicPr>
+          <p:cNvPr id="4" name="Image 3"/>
+          <p:cNvPicPr>
+            <a:picLocks noChangeAspect="1"/>
+          </p:cNvPicPr>
+          <p:nvPr/>
+        </p:nvPicPr>
+        <p:blipFill>
+          <a:blip r:embed="rId2">
+            <a:extLst>
+              <a:ext uri="{28A0092B-C50C-407E-A947-70E740481C1C}">
+                <a14:useLocalDpi xmlns:a14="http://schemas.microsoft.com/office/drawing/2010/main" val="0"/>
+              </a:ext>
+            </a:extLst>
+          </a:blip>
+          <a:stretch>
+            <a:fillRect/>
+          </a:stretch>
+        </p:blipFill>
+        <p:spPr>
+          <a:xfrm>
+            <a:off x="1518348" y="1828800"/>
+            <a:ext cx="8428654" cy="4102443"/>
+          </a:xfrm>
+          <a:prstGeom prst="rect">
+            <a:avLst/>
+          </a:prstGeom>
+        </p:spPr>
+      </p:pic>
     </p:spTree>
     <p:extLst>
       <p:ext uri="{BB962C8B-B14F-4D97-AF65-F5344CB8AC3E}">
-        <p14:creationId xmlns:p14="http://schemas.microsoft.com/office/powerpoint/2010/main" val="3365026024"/>
+        <p14:creationId xmlns:p14="http://schemas.microsoft.com/office/powerpoint/2010/main" val="2199061193"/>
       </p:ext>
     </p:extLst>
   </p:cSld>
   <p:clrMapOvr>
     <a:masterClrMapping/>
   </p:clrMapOvr>
+  <p:timing>
+    <p:tnLst>
+      <p:par>
+        <p:cTn id="1" dur="indefinite" restart="never" nodeType="tmRoot"/>
+      </p:par>
+    </p:tnLst>
+  </p:timing>
+</p:sld>
+</file>
+
+<file path=ppt/slides/slide5.xml><?xml version="1.0" encoding="utf-8"?>
+<p:sld xmlns:a="http://schemas.openxmlformats.org/drawingml/2006/main" xmlns:r="http://schemas.openxmlformats.org/officeDocument/2006/relationships" xmlns:p="http://schemas.openxmlformats.org/presentationml/2006/main">
+  <p:cSld>
+    <p:spTree>
+      <p:nvGrpSpPr>
+        <p:cNvPr id="1" name=""/>
+        <p:cNvGrpSpPr/>
+        <p:nvPr/>
+      </p:nvGrpSpPr>
+      <p:grpSpPr>
+        <a:xfrm>
+          <a:off x="0" y="0"/>
+          <a:ext cx="0" cy="0"/>
+          <a:chOff x="0" y="0"/>
+          <a:chExt cx="0" cy="0"/>
+        </a:xfrm>
+      </p:grpSpPr>
+      <p:sp>
+        <p:nvSpPr>
+          <p:cNvPr id="2" name="Titre 1"/>
+          <p:cNvSpPr>
+            <a:spLocks noGrp="1"/>
+          </p:cNvSpPr>
+          <p:nvPr>
+            <p:ph type="title"/>
+          </p:nvPr>
+        </p:nvSpPr>
+        <p:spPr/>
+        <p:txBody>
+          <a:bodyPr/>
+          <a:lstStyle/>
+          <a:p>
+            <a:r>
+              <a:rPr lang="fr-CA" sz="4000" dirty="0" smtClean="0"/>
+              <a:t>Menu</a:t>
+            </a:r>
+            <a:endParaRPr lang="fr-CA" sz="4000" dirty="0"/>
+          </a:p>
+        </p:txBody>
+      </p:sp>
+      <p:pic>
+        <p:nvPicPr>
+          <p:cNvPr id="4" name="Espace réservé du contenu 3"/>
+          <p:cNvPicPr>
+            <a:picLocks noGrp="1" noChangeAspect="1"/>
+          </p:cNvPicPr>
+          <p:nvPr>
+            <p:ph idx="1"/>
+          </p:nvPr>
+        </p:nvPicPr>
+        <p:blipFill>
+          <a:blip r:embed="rId2">
+            <a:extLst>
+              <a:ext uri="{28A0092B-C50C-407E-A947-70E740481C1C}">
+                <a14:useLocalDpi xmlns:a14="http://schemas.microsoft.com/office/drawing/2010/main" val="0"/>
+              </a:ext>
+            </a:extLst>
+          </a:blip>
+          <a:stretch>
+            <a:fillRect/>
+          </a:stretch>
+        </p:blipFill>
+        <p:spPr>
+          <a:xfrm>
+            <a:off x="788178" y="2184940"/>
+            <a:ext cx="8622634" cy="3705114"/>
+          </a:xfrm>
+          <a:prstGeom prst="rect">
+            <a:avLst/>
+          </a:prstGeom>
+        </p:spPr>
+      </p:pic>
+    </p:spTree>
+    <p:extLst>
+      <p:ext uri="{BB962C8B-B14F-4D97-AF65-F5344CB8AC3E}">
+        <p14:creationId xmlns:p14="http://schemas.microsoft.com/office/powerpoint/2010/main" val="670016294"/>
+      </p:ext>
+    </p:extLst>
+  </p:cSld>
+  <p:clrMapOvr>
+    <a:masterClrMapping/>
+  </p:clrMapOvr>
+  <p:timing>
+    <p:tnLst>
+      <p:par>
+        <p:cTn id="1" dur="indefinite" restart="never" nodeType="tmRoot"/>
+      </p:par>
+    </p:tnLst>
+  </p:timing>
+</p:sld>
+</file>
+
+<file path=ppt/slides/slide6.xml><?xml version="1.0" encoding="utf-8"?>
+<p:sld xmlns:a="http://schemas.openxmlformats.org/drawingml/2006/main" xmlns:r="http://schemas.openxmlformats.org/officeDocument/2006/relationships" xmlns:p="http://schemas.openxmlformats.org/presentationml/2006/main">
+  <p:cSld>
+    <p:spTree>
+      <p:nvGrpSpPr>
+        <p:cNvPr id="1" name=""/>
+        <p:cNvGrpSpPr/>
+        <p:nvPr/>
+      </p:nvGrpSpPr>
+      <p:grpSpPr>
+        <a:xfrm>
+          <a:off x="0" y="0"/>
+          <a:ext cx="0" cy="0"/>
+          <a:chOff x="0" y="0"/>
+          <a:chExt cx="0" cy="0"/>
+        </a:xfrm>
+      </p:grpSpPr>
+      <p:sp>
+        <p:nvSpPr>
+          <p:cNvPr id="2" name="Titre 1"/>
+          <p:cNvSpPr>
+            <a:spLocks noGrp="1"/>
+          </p:cNvSpPr>
+          <p:nvPr>
+            <p:ph type="title"/>
+          </p:nvPr>
+        </p:nvSpPr>
+        <p:spPr/>
+        <p:txBody>
+          <a:bodyPr>
+            <a:normAutofit/>
+          </a:bodyPr>
+          <a:lstStyle/>
+          <a:p>
+            <a:r>
+              <a:rPr lang="fr-CA" sz="4000" dirty="0"/>
+              <a:t>A</a:t>
+            </a:r>
+            <a:r>
+              <a:rPr lang="fr-CA" sz="4000" dirty="0" smtClean="0"/>
+              <a:t>gences de publicité(Sommaire)</a:t>
+            </a:r>
+            <a:endParaRPr lang="fr-CA" sz="4000" dirty="0"/>
+          </a:p>
+        </p:txBody>
+      </p:sp>
+      <p:pic>
+        <p:nvPicPr>
+          <p:cNvPr id="4" name="Espace réservé du contenu 3"/>
+          <p:cNvPicPr>
+            <a:picLocks noGrp="1" noChangeAspect="1"/>
+          </p:cNvPicPr>
+          <p:nvPr>
+            <p:ph idx="1"/>
+          </p:nvPr>
+        </p:nvPicPr>
+        <p:blipFill>
+          <a:blip r:embed="rId2">
+            <a:extLst>
+              <a:ext uri="{28A0092B-C50C-407E-A947-70E740481C1C}">
+                <a14:useLocalDpi xmlns:a14="http://schemas.microsoft.com/office/drawing/2010/main" val="0"/>
+              </a:ext>
+            </a:extLst>
+          </a:blip>
+          <a:stretch>
+            <a:fillRect/>
+          </a:stretch>
+        </p:blipFill>
+        <p:spPr>
+          <a:xfrm>
+            <a:off x="767792" y="1955528"/>
+            <a:ext cx="9718975" cy="3787970"/>
+          </a:xfrm>
+        </p:spPr>
+      </p:pic>
+    </p:spTree>
+    <p:extLst>
+      <p:ext uri="{BB962C8B-B14F-4D97-AF65-F5344CB8AC3E}">
+        <p14:creationId xmlns:p14="http://schemas.microsoft.com/office/powerpoint/2010/main" val="1272921022"/>
+      </p:ext>
+    </p:extLst>
+  </p:cSld>
+  <p:clrMapOvr>
+    <a:masterClrMapping/>
+  </p:clrMapOvr>
+  <p:timing>
+    <p:tnLst>
+      <p:par>
+        <p:cTn id="1" dur="indefinite" restart="never" nodeType="tmRoot"/>
+      </p:par>
+    </p:tnLst>
+  </p:timing>
+</p:sld>
+</file>
+
+<file path=ppt/slides/slide7.xml><?xml version="1.0" encoding="utf-8"?>
+<p:sld xmlns:a="http://schemas.openxmlformats.org/drawingml/2006/main" xmlns:r="http://schemas.openxmlformats.org/officeDocument/2006/relationships" xmlns:p="http://schemas.openxmlformats.org/presentationml/2006/main">
+  <p:cSld>
+    <p:spTree>
+      <p:nvGrpSpPr>
+        <p:cNvPr id="1" name=""/>
+        <p:cNvGrpSpPr/>
+        <p:nvPr/>
+      </p:nvGrpSpPr>
+      <p:grpSpPr>
+        <a:xfrm>
+          <a:off x="0" y="0"/>
+          <a:ext cx="0" cy="0"/>
+          <a:chOff x="0" y="0"/>
+          <a:chExt cx="0" cy="0"/>
+        </a:xfrm>
+      </p:grpSpPr>
+      <p:sp>
+        <p:nvSpPr>
+          <p:cNvPr id="2" name="Titre 1"/>
+          <p:cNvSpPr>
+            <a:spLocks noGrp="1"/>
+          </p:cNvSpPr>
+          <p:nvPr>
+            <p:ph type="title"/>
+          </p:nvPr>
+        </p:nvSpPr>
+        <p:spPr/>
+        <p:txBody>
+          <a:bodyPr/>
+          <a:lstStyle/>
+          <a:p>
+            <a:r>
+              <a:rPr lang="fr-CA" dirty="0"/>
+              <a:t>A</a:t>
+            </a:r>
+            <a:r>
+              <a:rPr lang="fr-CA" dirty="0" smtClean="0"/>
+              <a:t>gences </a:t>
+            </a:r>
+            <a:r>
+              <a:rPr lang="fr-CA" dirty="0"/>
+              <a:t>de </a:t>
+            </a:r>
+            <a:r>
+              <a:rPr lang="fr-CA" dirty="0" smtClean="0"/>
+              <a:t>publicité(Détail)</a:t>
+            </a:r>
+            <a:endParaRPr lang="fr-CA" dirty="0"/>
+          </a:p>
+        </p:txBody>
+      </p:sp>
+      <p:pic>
+        <p:nvPicPr>
+          <p:cNvPr id="4" name="Espace réservé du contenu 3"/>
+          <p:cNvPicPr>
+            <a:picLocks noGrp="1" noChangeAspect="1"/>
+          </p:cNvPicPr>
+          <p:nvPr>
+            <p:ph idx="1"/>
+          </p:nvPr>
+        </p:nvPicPr>
+        <p:blipFill>
+          <a:blip r:embed="rId2">
+            <a:extLst>
+              <a:ext uri="{28A0092B-C50C-407E-A947-70E740481C1C}">
+                <a14:useLocalDpi xmlns:a14="http://schemas.microsoft.com/office/drawing/2010/main" val="0"/>
+              </a:ext>
+            </a:extLst>
+          </a:blip>
+          <a:stretch>
+            <a:fillRect/>
+          </a:stretch>
+        </p:blipFill>
+        <p:spPr>
+          <a:xfrm>
+            <a:off x="408944" y="2349542"/>
+            <a:ext cx="10300964" cy="3828836"/>
+          </a:xfrm>
+        </p:spPr>
+      </p:pic>
+    </p:spTree>
+    <p:extLst>
+      <p:ext uri="{BB962C8B-B14F-4D97-AF65-F5344CB8AC3E}">
+        <p14:creationId xmlns:p14="http://schemas.microsoft.com/office/powerpoint/2010/main" val="1079835518"/>
+      </p:ext>
+    </p:extLst>
+  </p:cSld>
+  <p:clrMapOvr>
+    <a:masterClrMapping/>
+  </p:clrMapOvr>
+  <p:timing>
+    <p:tnLst>
+      <p:par>
+        <p:cTn id="1" dur="indefinite" restart="never" nodeType="tmRoot"/>
+      </p:par>
+    </p:tnLst>
+  </p:timing>
+</p:sld>
+</file>
+
+<file path=ppt/slides/slide8.xml><?xml version="1.0" encoding="utf-8"?>
+<p:sld xmlns:a="http://schemas.openxmlformats.org/drawingml/2006/main" xmlns:r="http://schemas.openxmlformats.org/officeDocument/2006/relationships" xmlns:p="http://schemas.openxmlformats.org/presentationml/2006/main">
+  <p:cSld>
+    <p:spTree>
+      <p:nvGrpSpPr>
+        <p:cNvPr id="1" name=""/>
+        <p:cNvGrpSpPr/>
+        <p:nvPr/>
+      </p:nvGrpSpPr>
+      <p:grpSpPr>
+        <a:xfrm>
+          <a:off x="0" y="0"/>
+          <a:ext cx="0" cy="0"/>
+          <a:chOff x="0" y="0"/>
+          <a:chExt cx="0" cy="0"/>
+        </a:xfrm>
+      </p:grpSpPr>
+      <p:sp>
+        <p:nvSpPr>
+          <p:cNvPr id="2" name="Titre 1"/>
+          <p:cNvSpPr>
+            <a:spLocks noGrp="1"/>
+          </p:cNvSpPr>
+          <p:nvPr>
+            <p:ph type="title"/>
+          </p:nvPr>
+        </p:nvSpPr>
+        <p:spPr>
+          <a:xfrm>
+            <a:off x="774357" y="365760"/>
+            <a:ext cx="10180155" cy="1325562"/>
+          </a:xfrm>
+        </p:spPr>
+        <p:txBody>
+          <a:bodyPr>
+            <a:normAutofit/>
+          </a:bodyPr>
+          <a:lstStyle/>
+          <a:p>
+            <a:r>
+              <a:rPr lang="fr-CA" sz="4000" dirty="0" smtClean="0"/>
+              <a:t>Gestion des catégorie d’artiste(Sommaire)</a:t>
+            </a:r>
+            <a:endParaRPr lang="fr-CA" sz="4000" dirty="0"/>
+          </a:p>
+        </p:txBody>
+      </p:sp>
+      <p:pic>
+        <p:nvPicPr>
+          <p:cNvPr id="4" name="Espace réservé du contenu 3"/>
+          <p:cNvPicPr>
+            <a:picLocks noGrp="1" noChangeAspect="1"/>
+          </p:cNvPicPr>
+          <p:nvPr>
+            <p:ph idx="1"/>
+          </p:nvPr>
+        </p:nvPicPr>
+        <p:blipFill>
+          <a:blip r:embed="rId2">
+            <a:extLst>
+              <a:ext uri="{28A0092B-C50C-407E-A947-70E740481C1C}">
+                <a14:useLocalDpi xmlns:a14="http://schemas.microsoft.com/office/drawing/2010/main" val="0"/>
+              </a:ext>
+            </a:extLst>
+          </a:blip>
+          <a:stretch>
+            <a:fillRect/>
+          </a:stretch>
+        </p:blipFill>
+        <p:spPr>
+          <a:xfrm>
+            <a:off x="1005017" y="2046143"/>
+            <a:ext cx="9260212" cy="3609001"/>
+          </a:xfrm>
+        </p:spPr>
+      </p:pic>
+    </p:spTree>
+    <p:extLst>
+      <p:ext uri="{BB962C8B-B14F-4D97-AF65-F5344CB8AC3E}">
+        <p14:creationId xmlns:p14="http://schemas.microsoft.com/office/powerpoint/2010/main" val="1011138271"/>
+      </p:ext>
+    </p:extLst>
+  </p:cSld>
+  <p:clrMapOvr>
+    <a:masterClrMapping/>
+  </p:clrMapOvr>
+  <p:timing>
+    <p:tnLst>
+      <p:par>
+        <p:cTn id="1" dur="indefinite" restart="never" nodeType="tmRoot"/>
+      </p:par>
+    </p:tnLst>
+  </p:timing>
+</p:sld>
+</file>
+
+<file path=ppt/slides/slide9.xml><?xml version="1.0" encoding="utf-8"?>
+<p:sld xmlns:a="http://schemas.openxmlformats.org/drawingml/2006/main" xmlns:r="http://schemas.openxmlformats.org/officeDocument/2006/relationships" xmlns:p="http://schemas.openxmlformats.org/presentationml/2006/main">
+  <p:cSld>
+    <p:spTree>
+      <p:nvGrpSpPr>
+        <p:cNvPr id="1" name=""/>
+        <p:cNvGrpSpPr/>
+        <p:nvPr/>
+      </p:nvGrpSpPr>
+      <p:grpSpPr>
+        <a:xfrm>
+          <a:off x="0" y="0"/>
+          <a:ext cx="0" cy="0"/>
+          <a:chOff x="0" y="0"/>
+          <a:chExt cx="0" cy="0"/>
+        </a:xfrm>
+      </p:grpSpPr>
+      <p:sp>
+        <p:nvSpPr>
+          <p:cNvPr id="2" name="Titre 1"/>
+          <p:cNvSpPr>
+            <a:spLocks noGrp="1"/>
+          </p:cNvSpPr>
+          <p:nvPr>
+            <p:ph type="title"/>
+          </p:nvPr>
+        </p:nvSpPr>
+        <p:spPr/>
+        <p:txBody>
+          <a:bodyPr>
+            <a:normAutofit/>
+          </a:bodyPr>
+          <a:lstStyle/>
+          <a:p>
+            <a:r>
+              <a:rPr lang="fr-CA" sz="4000" dirty="0"/>
+              <a:t>Gestion des catégorie </a:t>
+            </a:r>
+            <a:r>
+              <a:rPr lang="fr-CA" sz="4000" dirty="0" smtClean="0"/>
+              <a:t>d’artiste(Détail)</a:t>
+            </a:r>
+            <a:endParaRPr lang="fr-CA" sz="4000" dirty="0"/>
+          </a:p>
+        </p:txBody>
+      </p:sp>
+      <p:pic>
+        <p:nvPicPr>
+          <p:cNvPr id="4" name="Espace réservé du contenu 3"/>
+          <p:cNvPicPr>
+            <a:picLocks noGrp="1" noChangeAspect="1"/>
+          </p:cNvPicPr>
+          <p:nvPr>
+            <p:ph idx="1"/>
+          </p:nvPr>
+        </p:nvPicPr>
+        <p:blipFill>
+          <a:blip r:embed="rId2">
+            <a:extLst>
+              <a:ext uri="{28A0092B-C50C-407E-A947-70E740481C1C}">
+                <a14:useLocalDpi xmlns:a14="http://schemas.microsoft.com/office/drawing/2010/main" val="0"/>
+              </a:ext>
+            </a:extLst>
+          </a:blip>
+          <a:stretch>
+            <a:fillRect/>
+          </a:stretch>
+        </p:blipFill>
+        <p:spPr>
+          <a:xfrm>
+            <a:off x="1891788" y="1832466"/>
+            <a:ext cx="7335274" cy="4344006"/>
+          </a:xfrm>
+        </p:spPr>
+      </p:pic>
+    </p:spTree>
+    <p:extLst>
+      <p:ext uri="{BB962C8B-B14F-4D97-AF65-F5344CB8AC3E}">
+        <p14:creationId xmlns:p14="http://schemas.microsoft.com/office/powerpoint/2010/main" val="4244561636"/>
+      </p:ext>
+    </p:extLst>
+  </p:cSld>
+  <p:clrMapOvr>
+    <a:masterClrMapping/>
+  </p:clrMapOvr>
+  <p:timing>
+    <p:tnLst>
+      <p:par>
+        <p:cTn id="1" dur="indefinite" restart="never" nodeType="tmRoot"/>
+      </p:par>
+    </p:tnLst>
+  </p:timing>
 </p:sld>
 </file>
 

</xml_diff>

<commit_message>
Création du speech de la présentation
</commit_message>
<xml_diff>
--- a/Gestion de projet/Présentations/PowerPoint.pptx
+++ b/Gestion de projet/Présentations/PowerPoint.pptx
@@ -3,7 +3,7 @@
 <p:presentation xmlns:a="http://schemas.openxmlformats.org/drawingml/2006/main" xmlns:r="http://schemas.openxmlformats.org/officeDocument/2006/relationships" xmlns:p="http://schemas.openxmlformats.org/presentationml/2006/main" saveSubsetFonts="1">
   <p:sldMasterIdLst>
     <p:sldMasterId id="2147483840" r:id="rId1"/>
-    <p:sldMasterId id="2147483940" r:id="rId2"/>
+    <p:sldMasterId id="2147483952" r:id="rId2"/>
   </p:sldMasterIdLst>
   <p:sldIdLst>
     <p:sldId id="256" r:id="rId3"/>
@@ -25,7 +25,7 @@
     <p:sldId id="272" r:id="rId19"/>
     <p:sldId id="273" r:id="rId20"/>
   </p:sldIdLst>
-  <p:sldSz cx="12192000" cy="6858000"/>
+  <p:sldSz cx="9144000" cy="6858000" type="screen4x3"/>
   <p:notesSz cx="6858000" cy="9144000"/>
   <p:defaultTextStyle>
     <a:defPPr>
@@ -125,12 +125,12 @@
   <p:extLst>
     <p:ext uri="{EFAFB233-063F-42B5-8137-9DF3F51BA10A}">
       <p15:sldGuideLst xmlns:p15="http://schemas.microsoft.com/office/powerpoint/2012/main">
-        <p15:guide id="1" orient="horz" pos="2160">
+        <p15:guide id="1" orient="horz" pos="2160" userDrawn="1">
           <p15:clr>
             <a:srgbClr val="A4A3A4"/>
           </p15:clr>
         </p15:guide>
-        <p15:guide id="2" pos="3840">
+        <p15:guide id="2" pos="2880" userDrawn="1">
           <p15:clr>
             <a:srgbClr val="A4A3A4"/>
           </p15:clr>
@@ -170,8 +170,8 @@
         </p:nvSpPr>
         <p:spPr>
           <a:xfrm>
-            <a:off x="1524000" y="1124530"/>
-            <a:ext cx="9144000" cy="2387600"/>
+            <a:off x="1143000" y="1124530"/>
+            <a:ext cx="6858000" cy="2387600"/>
           </a:xfrm>
         </p:spPr>
         <p:txBody>
@@ -180,7 +180,7 @@
           </a:bodyPr>
           <a:lstStyle>
             <a:lvl1pPr algn="ctr">
-              <a:defRPr sz="6000"/>
+              <a:defRPr sz="4500"/>
             </a:lvl1pPr>
           </a:lstStyle>
           <a:p>
@@ -204,8 +204,8 @@
         </p:nvSpPr>
         <p:spPr>
           <a:xfrm>
-            <a:off x="1524000" y="3602038"/>
-            <a:ext cx="9144000" cy="1655762"/>
+            <a:off x="1143000" y="3602038"/>
+            <a:ext cx="6858000" cy="1655762"/>
           </a:xfrm>
         </p:spPr>
         <p:txBody>
@@ -215,7 +215,7 @@
           <a:lstStyle>
             <a:lvl1pPr marL="0" indent="0" algn="ctr">
               <a:buNone/>
-              <a:defRPr sz="2400">
+              <a:defRPr sz="1800">
                 <a:solidFill>
                   <a:schemeClr val="tx1">
                     <a:lumMod val="75000"/>
@@ -224,37 +224,37 @@
                 </a:solidFill>
               </a:defRPr>
             </a:lvl1pPr>
-            <a:lvl2pPr marL="457200" indent="0" algn="ctr">
-              <a:buNone/>
-              <a:defRPr sz="2800"/>
+            <a:lvl2pPr marL="342900" indent="0" algn="ctr">
+              <a:buNone/>
+              <a:defRPr sz="2100"/>
             </a:lvl2pPr>
-            <a:lvl3pPr marL="914400" indent="0" algn="ctr">
-              <a:buNone/>
-              <a:defRPr sz="2400"/>
+            <a:lvl3pPr marL="685800" indent="0" algn="ctr">
+              <a:buNone/>
+              <a:defRPr sz="1800"/>
             </a:lvl3pPr>
-            <a:lvl4pPr marL="1371600" indent="0" algn="ctr">
-              <a:buNone/>
-              <a:defRPr sz="2000"/>
+            <a:lvl4pPr marL="1028700" indent="0" algn="ctr">
+              <a:buNone/>
+              <a:defRPr sz="1500"/>
             </a:lvl4pPr>
-            <a:lvl5pPr marL="1828800" indent="0" algn="ctr">
-              <a:buNone/>
-              <a:defRPr sz="2000"/>
+            <a:lvl5pPr marL="1371600" indent="0" algn="ctr">
+              <a:buNone/>
+              <a:defRPr sz="1500"/>
             </a:lvl5pPr>
-            <a:lvl6pPr marL="2286000" indent="0" algn="ctr">
-              <a:buNone/>
-              <a:defRPr sz="2000"/>
+            <a:lvl6pPr marL="1714500" indent="0" algn="ctr">
+              <a:buNone/>
+              <a:defRPr sz="1500"/>
             </a:lvl6pPr>
-            <a:lvl7pPr marL="2743200" indent="0" algn="ctr">
-              <a:buNone/>
-              <a:defRPr sz="2000"/>
+            <a:lvl7pPr marL="2057400" indent="0" algn="ctr">
+              <a:buNone/>
+              <a:defRPr sz="1500"/>
             </a:lvl7pPr>
-            <a:lvl8pPr marL="3200400" indent="0" algn="ctr">
-              <a:buNone/>
-              <a:defRPr sz="2000"/>
+            <a:lvl8pPr marL="2400300" indent="0" algn="ctr">
+              <a:buNone/>
+              <a:defRPr sz="1500"/>
             </a:lvl8pPr>
-            <a:lvl9pPr marL="3657600" indent="0" algn="ctr">
-              <a:buNone/>
-              <a:defRPr sz="2000"/>
+            <a:lvl9pPr marL="2743200" indent="0" algn="ctr">
+              <a:buNone/>
+              <a:defRPr sz="1500"/>
             </a:lvl9pPr>
           </a:lstStyle>
           <a:p>
@@ -283,7 +283,7 @@
           <a:p>
             <a:fld id="{A8224893-DBDA-4BFA-9CE1-4BFE7CD0F8CF}" type="datetime1">
               <a:rPr lang="en-US" smtClean="0"/>
-              <a:t>12/13/2016</a:t>
+              <a:t>12/14/2016</a:t>
             </a:fld>
             <a:endParaRPr lang="en-US"/>
           </a:p>
@@ -453,7 +453,7 @@
           <a:p>
             <a:fld id="{5F4E5243-F52A-4D37-9694-EB26C6C31910}" type="datetime1">
               <a:rPr lang="en-US" smtClean="0"/>
-              <a:t>12/13/2016</a:t>
+              <a:t>12/14/2016</a:t>
             </a:fld>
             <a:endParaRPr lang="en-US"/>
           </a:p>
@@ -543,8 +543,8 @@
         </p:nvSpPr>
         <p:spPr>
           <a:xfrm>
-            <a:off x="8724900" y="360362"/>
-            <a:ext cx="2628900" cy="5811838"/>
+            <a:off x="6543675" y="360362"/>
+            <a:ext cx="1971675" cy="5811838"/>
           </a:xfrm>
         </p:spPr>
         <p:txBody>
@@ -571,8 +571,8 @@
         </p:nvSpPr>
         <p:spPr>
           <a:xfrm>
-            <a:off x="838200" y="360362"/>
-            <a:ext cx="7734300" cy="5811837"/>
+            <a:off x="628650" y="360363"/>
+            <a:ext cx="5800725" cy="5811837"/>
           </a:xfrm>
         </p:spPr>
         <p:txBody>
@@ -633,7 +633,7 @@
           <a:p>
             <a:fld id="{3A77B6E1-634A-48DC-9E8B-D894023267EF}" type="datetime1">
               <a:rPr lang="en-US" smtClean="0"/>
-              <a:t>12/13/2016</a:t>
+              <a:t>12/14/2016</a:t>
             </a:fld>
             <a:endParaRPr lang="en-US"/>
           </a:p>
@@ -733,8 +733,8 @@
         </p:nvSpPr>
         <p:spPr>
           <a:xfrm>
-            <a:off x="1261872" y="758952"/>
-            <a:ext cx="9418320" cy="4041648"/>
+            <a:off x="946404" y="758952"/>
+            <a:ext cx="7063740" cy="4041648"/>
           </a:xfrm>
         </p:spPr>
         <p:txBody>
@@ -746,7 +746,7 @@
               <a:lnSpc>
                 <a:spcPct val="85000"/>
               </a:lnSpc>
-              <a:defRPr sz="7200" baseline="0">
+              <a:defRPr sz="6600" baseline="0">
                 <a:solidFill>
                   <a:schemeClr val="tx1"/>
                 </a:solidFill>
@@ -774,8 +774,8 @@
         </p:nvSpPr>
         <p:spPr>
           <a:xfrm>
-            <a:off x="1261872" y="4800600"/>
-            <a:ext cx="9418320" cy="1691640"/>
+            <a:off x="946404" y="4800600"/>
+            <a:ext cx="7063740" cy="1691640"/>
           </a:xfrm>
         </p:spPr>
         <p:txBody>
@@ -785,21 +785,21 @@
           <a:lstStyle>
             <a:lvl1pPr marL="0" indent="0" algn="l">
               <a:buNone/>
-              <a:defRPr sz="2200" baseline="0">
+              <a:defRPr sz="2000" baseline="0">
                 <a:solidFill>
                   <a:schemeClr val="tx1">
-                    <a:lumMod val="75000"/>
+                    <a:lumMod val="85000"/>
                   </a:schemeClr>
                 </a:solidFill>
               </a:defRPr>
             </a:lvl1pPr>
             <a:lvl2pPr marL="457200" indent="0" algn="ctr">
               <a:buNone/>
-              <a:defRPr sz="2200"/>
+              <a:defRPr sz="2000"/>
             </a:lvl2pPr>
             <a:lvl3pPr marL="914400" indent="0" algn="ctr">
               <a:buNone/>
-              <a:defRPr sz="2200"/>
+              <a:defRPr sz="2000"/>
             </a:lvl3pPr>
             <a:lvl4pPr marL="1371600" indent="0" algn="ctr">
               <a:buNone/>
@@ -837,101 +837,6 @@
       </p:sp>
       <p:sp>
         <p:nvSpPr>
-          <p:cNvPr id="4" name="Date Placeholder 3"/>
-          <p:cNvSpPr>
-            <a:spLocks noGrp="1"/>
-          </p:cNvSpPr>
-          <p:nvPr>
-            <p:ph type="dt" sz="half" idx="10"/>
-          </p:nvPr>
-        </p:nvSpPr>
-        <p:spPr/>
-        <p:txBody>
-          <a:bodyPr/>
-          <a:lstStyle>
-            <a:lvl1pPr>
-              <a:defRPr>
-                <a:solidFill>
-                  <a:schemeClr val="tx1">
-                    <a:lumMod val="50000"/>
-                  </a:schemeClr>
-                </a:solidFill>
-              </a:defRPr>
-            </a:lvl1pPr>
-          </a:lstStyle>
-          <a:p>
-            <a:fld id="{A8224893-DBDA-4BFA-9CE1-4BFE7CD0F8CF}" type="datetime1">
-              <a:rPr lang="en-US" smtClean="0"/>
-              <a:t>12/13/2016</a:t>
-            </a:fld>
-            <a:endParaRPr lang="en-US"/>
-          </a:p>
-        </p:txBody>
-      </p:sp>
-      <p:sp>
-        <p:nvSpPr>
-          <p:cNvPr id="5" name="Footer Placeholder 4"/>
-          <p:cNvSpPr>
-            <a:spLocks noGrp="1"/>
-          </p:cNvSpPr>
-          <p:nvPr>
-            <p:ph type="ftr" sz="quarter" idx="11"/>
-          </p:nvPr>
-        </p:nvSpPr>
-        <p:spPr/>
-        <p:txBody>
-          <a:bodyPr/>
-          <a:lstStyle>
-            <a:lvl1pPr>
-              <a:defRPr>
-                <a:solidFill>
-                  <a:schemeClr val="tx1">
-                    <a:lumMod val="65000"/>
-                  </a:schemeClr>
-                </a:solidFill>
-              </a:defRPr>
-            </a:lvl1pPr>
-          </a:lstStyle>
-          <a:p>
-            <a:endParaRPr lang="en-US"/>
-          </a:p>
-        </p:txBody>
-      </p:sp>
-      <p:sp>
-        <p:nvSpPr>
-          <p:cNvPr id="6" name="Slide Number Placeholder 5"/>
-          <p:cNvSpPr>
-            <a:spLocks noGrp="1"/>
-          </p:cNvSpPr>
-          <p:nvPr>
-            <p:ph type="sldNum" sz="quarter" idx="12"/>
-          </p:nvPr>
-        </p:nvSpPr>
-        <p:spPr/>
-        <p:txBody>
-          <a:bodyPr/>
-          <a:lstStyle>
-            <a:lvl1pPr>
-              <a:defRPr>
-                <a:solidFill>
-                  <a:schemeClr val="tx1">
-                    <a:lumMod val="65000"/>
-                  </a:schemeClr>
-                </a:solidFill>
-              </a:defRPr>
-            </a:lvl1pPr>
-          </a:lstStyle>
-          <a:p>
-            <a:fld id="{4FAB73BC-B049-4115-A692-8D63A059BFB8}" type="slidenum">
-              <a:rPr lang="en-US" smtClean="0"/>
-              <a:t>‹N°›</a:t>
-            </a:fld>
-            <a:endParaRPr lang="en-US"/>
-          </a:p>
-        </p:txBody>
-      </p:sp>
-      <p:sp>
-        <p:nvSpPr>
           <p:cNvPr id="7" name="Rectangle 6"/>
           <p:cNvSpPr/>
           <p:nvPr/>
@@ -939,7 +844,7 @@
         <p:spPr>
           <a:xfrm>
             <a:off x="0" y="0"/>
-            <a:ext cx="457200" cy="6858000"/>
+            <a:ext cx="342900" cy="6858000"/>
           </a:xfrm>
           <a:prstGeom prst="rect">
             <a:avLst/>
@@ -968,10 +873,108 @@
           </a:fontRef>
         </p:style>
       </p:sp>
+      <p:sp>
+        <p:nvSpPr>
+          <p:cNvPr id="8" name="Date Placeholder 7"/>
+          <p:cNvSpPr>
+            <a:spLocks noGrp="1"/>
+          </p:cNvSpPr>
+          <p:nvPr>
+            <p:ph type="dt" sz="half" idx="10"/>
+          </p:nvPr>
+        </p:nvSpPr>
+        <p:spPr/>
+        <p:txBody>
+          <a:bodyPr/>
+          <a:lstStyle>
+            <a:lvl1pPr>
+              <a:defRPr>
+                <a:solidFill>
+                  <a:schemeClr val="bg2">
+                    <a:lumMod val="20000"/>
+                    <a:lumOff val="80000"/>
+                  </a:schemeClr>
+                </a:solidFill>
+              </a:defRPr>
+            </a:lvl1pPr>
+          </a:lstStyle>
+          <a:p>
+            <a:fld id="{A8224893-DBDA-4BFA-9CE1-4BFE7CD0F8CF}" type="datetime1">
+              <a:rPr lang="en-US" smtClean="0"/>
+              <a:t>12/14/2016</a:t>
+            </a:fld>
+            <a:endParaRPr lang="en-US"/>
+          </a:p>
+        </p:txBody>
+      </p:sp>
+      <p:sp>
+        <p:nvSpPr>
+          <p:cNvPr id="9" name="Footer Placeholder 8"/>
+          <p:cNvSpPr>
+            <a:spLocks noGrp="1"/>
+          </p:cNvSpPr>
+          <p:nvPr>
+            <p:ph type="ftr" sz="quarter" idx="11"/>
+          </p:nvPr>
+        </p:nvSpPr>
+        <p:spPr/>
+        <p:txBody>
+          <a:bodyPr/>
+          <a:lstStyle>
+            <a:lvl1pPr>
+              <a:defRPr>
+                <a:solidFill>
+                  <a:schemeClr val="bg2">
+                    <a:lumMod val="20000"/>
+                    <a:lumOff val="80000"/>
+                  </a:schemeClr>
+                </a:solidFill>
+              </a:defRPr>
+            </a:lvl1pPr>
+          </a:lstStyle>
+          <a:p>
+            <a:endParaRPr lang="en-US"/>
+          </a:p>
+        </p:txBody>
+      </p:sp>
+      <p:sp>
+        <p:nvSpPr>
+          <p:cNvPr id="10" name="Slide Number Placeholder 9"/>
+          <p:cNvSpPr>
+            <a:spLocks noGrp="1"/>
+          </p:cNvSpPr>
+          <p:nvPr>
+            <p:ph type="sldNum" sz="quarter" idx="12"/>
+          </p:nvPr>
+        </p:nvSpPr>
+        <p:spPr/>
+        <p:txBody>
+          <a:bodyPr/>
+          <a:lstStyle>
+            <a:lvl1pPr>
+              <a:defRPr>
+                <a:solidFill>
+                  <a:schemeClr val="bg2">
+                    <a:lumMod val="60000"/>
+                    <a:lumOff val="40000"/>
+                  </a:schemeClr>
+                </a:solidFill>
+              </a:defRPr>
+            </a:lvl1pPr>
+          </a:lstStyle>
+          <a:p>
+            <a:fld id="{4FAB73BC-B049-4115-A692-8D63A059BFB8}" type="slidenum">
+              <a:rPr lang="en-US" smtClean="0"/>
+              <a:t>‹N°›</a:t>
+            </a:fld>
+            <a:endParaRPr lang="en-US"/>
+          </a:p>
+        </p:txBody>
+      </p:sp>
     </p:spTree>
     <p:extLst>
       <p:ext uri="{BB962C8B-B14F-4D97-AF65-F5344CB8AC3E}">
-        <p14:creationId xmlns:p14="http://schemas.microsoft.com/office/powerpoint/2010/main" val="1487327463"/>
+        <p14:creationId xmlns:p14="http://schemas.microsoft.com/office/powerpoint/2010/main" val="1540826542"/>
       </p:ext>
     </p:extLst>
   </p:cSld>
@@ -1090,7 +1093,7 @@
           <a:p>
             <a:fld id="{7B2D3E9E-A95C-48F2-B4BF-A71542E0BE9A}" type="datetime1">
               <a:rPr lang="en-US" smtClean="0"/>
-              <a:t>12/13/2016</a:t>
+              <a:t>12/14/2016</a:t>
             </a:fld>
             <a:endParaRPr lang="en-US"/>
           </a:p>
@@ -1141,7 +1144,7 @@
     </p:spTree>
     <p:extLst>
       <p:ext uri="{BB962C8B-B14F-4D97-AF65-F5344CB8AC3E}">
-        <p14:creationId xmlns:p14="http://schemas.microsoft.com/office/powerpoint/2010/main" val="1460867461"/>
+        <p14:creationId xmlns:p14="http://schemas.microsoft.com/office/powerpoint/2010/main" val="869941764"/>
       </p:ext>
     </p:extLst>
   </p:cSld>
@@ -1180,8 +1183,8 @@
         </p:nvSpPr>
         <p:spPr>
           <a:xfrm>
-            <a:off x="1261872" y="758952"/>
-            <a:ext cx="9418320" cy="4041648"/>
+            <a:off x="946404" y="758952"/>
+            <a:ext cx="7063740" cy="4041648"/>
           </a:xfrm>
         </p:spPr>
         <p:txBody>
@@ -1193,7 +1196,7 @@
               <a:lnSpc>
                 <a:spcPct val="85000"/>
               </a:lnSpc>
-              <a:defRPr sz="7200" b="0"/>
+              <a:defRPr sz="6600" b="0"/>
             </a:lvl1pPr>
           </a:lstStyle>
           <a:p>
@@ -1217,8 +1220,8 @@
         </p:nvSpPr>
         <p:spPr>
           <a:xfrm>
-            <a:off x="1261872" y="4800600"/>
-            <a:ext cx="9418320" cy="1691640"/>
+            <a:off x="946404" y="4800600"/>
+            <a:ext cx="7063740" cy="1691640"/>
           </a:xfrm>
         </p:spPr>
         <p:txBody>
@@ -1228,11 +1231,11 @@
           <a:lstStyle>
             <a:lvl1pPr marL="0" indent="0">
               <a:buNone/>
-              <a:defRPr sz="2200">
+              <a:defRPr sz="2000">
                 <a:solidFill>
                   <a:schemeClr val="tx1">
-                    <a:lumMod val="65000"/>
-                    <a:lumOff val="35000"/>
+                    <a:lumMod val="75000"/>
+                    <a:lumOff val="25000"/>
                   </a:schemeClr>
                 </a:solidFill>
               </a:defRPr>
@@ -1344,7 +1347,7 @@
           <a:p>
             <a:fld id="{A50F84E2-2D7A-43CF-AC90-352A289A783A}" type="datetime1">
               <a:rPr lang="en-US" smtClean="0"/>
-              <a:t>12/13/2016</a:t>
+              <a:t>12/14/2016</a:t>
             </a:fld>
             <a:endParaRPr lang="en-US"/>
           </a:p>
@@ -1401,7 +1404,7 @@
         <p:spPr>
           <a:xfrm>
             <a:off x="0" y="0"/>
-            <a:ext cx="457200" cy="6858000"/>
+            <a:ext cx="342900" cy="6858000"/>
           </a:xfrm>
           <a:prstGeom prst="rect">
             <a:avLst/>
@@ -1433,7 +1436,7 @@
     </p:spTree>
     <p:extLst>
       <p:ext uri="{BB962C8B-B14F-4D97-AF65-F5344CB8AC3E}">
-        <p14:creationId xmlns:p14="http://schemas.microsoft.com/office/powerpoint/2010/main" val="3978065938"/>
+        <p14:creationId xmlns:p14="http://schemas.microsoft.com/office/powerpoint/2010/main" val="3270302380"/>
       </p:ext>
     </p:extLst>
   </p:cSld>
@@ -1495,8 +1498,8 @@
         </p:nvSpPr>
         <p:spPr>
           <a:xfrm>
-            <a:off x="1261872" y="1828800"/>
-            <a:ext cx="4480560" cy="4351337"/>
+            <a:off x="946404" y="1828801"/>
+            <a:ext cx="3360420" cy="4351337"/>
           </a:xfrm>
         </p:spPr>
         <p:txBody>
@@ -1580,8 +1583,8 @@
         </p:nvSpPr>
         <p:spPr>
           <a:xfrm>
-            <a:off x="6126480" y="1828800"/>
-            <a:ext cx="4480560" cy="4351337"/>
+            <a:off x="4594860" y="1828801"/>
+            <a:ext cx="3360420" cy="4351337"/>
           </a:xfrm>
         </p:spPr>
         <p:txBody>
@@ -1670,7 +1673,7 @@
           <a:p>
             <a:fld id="{F12952B5-7A2F-4CC8-B7CE-9234E21C2837}" type="datetime1">
               <a:rPr lang="en-US" smtClean="0"/>
-              <a:t>12/13/2016</a:t>
+              <a:t>12/14/2016</a:t>
             </a:fld>
             <a:endParaRPr lang="en-US"/>
           </a:p>
@@ -1721,7 +1724,7 @@
     </p:spTree>
     <p:extLst>
       <p:ext uri="{BB962C8B-B14F-4D97-AF65-F5344CB8AC3E}">
-        <p14:creationId xmlns:p14="http://schemas.microsoft.com/office/powerpoint/2010/main" val="203998639"/>
+        <p14:creationId xmlns:p14="http://schemas.microsoft.com/office/powerpoint/2010/main" val="1784425358"/>
       </p:ext>
     </p:extLst>
   </p:cSld>
@@ -1783,8 +1786,8 @@
         </p:nvSpPr>
         <p:spPr>
           <a:xfrm>
-            <a:off x="1261872" y="1713655"/>
-            <a:ext cx="4480560" cy="731520"/>
+            <a:off x="946404" y="1717185"/>
+            <a:ext cx="3360420" cy="731520"/>
           </a:xfrm>
         </p:spPr>
         <p:txBody>
@@ -1797,7 +1800,7 @@
                 <a:spcPts val="0"/>
               </a:spcBef>
               <a:buNone/>
-              <a:defRPr sz="2000" b="0">
+              <a:defRPr sz="1800" b="0">
                 <a:solidFill>
                   <a:schemeClr val="tx2"/>
                 </a:solidFill>
@@ -1805,7 +1808,7 @@
             </a:lvl1pPr>
             <a:lvl2pPr marL="457200" indent="0">
               <a:buNone/>
-              <a:defRPr sz="2000" b="1"/>
+              <a:defRPr sz="1800" b="1"/>
             </a:lvl2pPr>
             <a:lvl3pPr marL="914400" indent="0">
               <a:buNone/>
@@ -1857,8 +1860,8 @@
         </p:nvSpPr>
         <p:spPr>
           <a:xfrm>
-            <a:off x="1261872" y="2507550"/>
-            <a:ext cx="4480560" cy="3664650"/>
+            <a:off x="946404" y="2507550"/>
+            <a:ext cx="3360420" cy="3664650"/>
           </a:xfrm>
         </p:spPr>
         <p:txBody>
@@ -1932,18 +1935,18 @@
       </p:sp>
       <p:sp>
         <p:nvSpPr>
-          <p:cNvPr id="5" name="Text Placeholder 4"/>
-          <p:cNvSpPr>
-            <a:spLocks noGrp="1"/>
-          </p:cNvSpPr>
-          <p:nvPr>
-            <p:ph type="body" sz="quarter" idx="3"/>
+          <p:cNvPr id="11" name="Text Placeholder 10"/>
+          <p:cNvSpPr>
+            <a:spLocks noGrp="1"/>
+          </p:cNvSpPr>
+          <p:nvPr>
+            <p:ph type="body" sz="quarter" idx="13"/>
           </p:nvPr>
         </p:nvSpPr>
         <p:spPr>
           <a:xfrm>
-            <a:off x="6126480" y="1713655"/>
-            <a:ext cx="4480560" cy="731520"/>
+            <a:off x="4599432" y="1717185"/>
+            <a:ext cx="3364992" cy="731520"/>
           </a:xfrm>
         </p:spPr>
         <p:txBody>
@@ -1952,14 +1955,9 @@
           </a:bodyPr>
           <a:lstStyle>
             <a:lvl1pPr marL="0" indent="0">
-              <a:lnSpc>
-                <a:spcPct val="95000"/>
-              </a:lnSpc>
-              <a:spcBef>
-                <a:spcPts val="0"/>
-              </a:spcBef>
-              <a:buNone/>
-              <a:defRPr lang="en-US" sz="2000" b="0" kern="1200" dirty="0">
+              <a:buFontTx/>
+              <a:buNone/>
+              <a:defRPr lang="en-US" sz="1800" b="0" kern="1200" spc="10" baseline="0" dirty="0">
                 <a:solidFill>
                   <a:schemeClr val="tx2"/>
                 </a:solidFill>
@@ -1968,48 +1966,22 @@
                 <a:cs typeface="+mn-cs"/>
               </a:defRPr>
             </a:lvl1pPr>
-            <a:lvl2pPr marL="457200" indent="0">
-              <a:buNone/>
-              <a:defRPr sz="2000" b="1"/>
-            </a:lvl2pPr>
-            <a:lvl3pPr marL="914400" indent="0">
-              <a:buNone/>
-              <a:defRPr sz="1800" b="1"/>
-            </a:lvl3pPr>
-            <a:lvl4pPr marL="1371600" indent="0">
-              <a:buNone/>
-              <a:defRPr sz="1600" b="1"/>
-            </a:lvl4pPr>
-            <a:lvl5pPr marL="1828800" indent="0">
-              <a:buNone/>
-              <a:defRPr sz="1600" b="1"/>
-            </a:lvl5pPr>
-            <a:lvl6pPr marL="2286000" indent="0">
-              <a:buNone/>
-              <a:defRPr sz="1600" b="1"/>
-            </a:lvl6pPr>
-            <a:lvl7pPr marL="2743200" indent="0">
-              <a:buNone/>
-              <a:defRPr sz="1600" b="1"/>
-            </a:lvl7pPr>
-            <a:lvl8pPr marL="3200400" indent="0">
-              <a:buNone/>
-              <a:defRPr sz="1600" b="1"/>
-            </a:lvl8pPr>
-            <a:lvl9pPr marL="3657600" indent="0">
-              <a:buNone/>
-              <a:defRPr sz="1600" b="1"/>
-            </a:lvl9pPr>
           </a:lstStyle>
           <a:p>
             <a:pPr marL="0" lvl="0" indent="0" algn="l" defTabSz="914400" rtl="0" eaLnBrk="1" latinLnBrk="0" hangingPunct="1">
               <a:lnSpc>
-                <a:spcPct val="90000"/>
+                <a:spcPct val="95000"/>
               </a:lnSpc>
               <a:spcBef>
-                <a:spcPts val="2000"/>
+                <a:spcPts val="0"/>
               </a:spcBef>
-              <a:buFontTx/>
+              <a:spcAft>
+                <a:spcPts val="200"/>
+              </a:spcAft>
+              <a:buClr>
+                <a:schemeClr val="accent1"/>
+              </a:buClr>
+              <a:buSzPct val="80000"/>
               <a:buNone/>
             </a:pPr>
             <a:r>
@@ -2031,8 +2003,8 @@
         </p:nvSpPr>
         <p:spPr>
           <a:xfrm>
-            <a:off x="6126480" y="2507550"/>
-            <a:ext cx="4480560" cy="3664650"/>
+            <a:off x="4594860" y="2507550"/>
+            <a:ext cx="3360420" cy="3664650"/>
           </a:xfrm>
         </p:spPr>
         <p:txBody>
@@ -2121,7 +2093,7 @@
           <a:p>
             <a:fld id="{CE1DA07A-9201-4B4B-BAF2-015AFA30F520}" type="datetime1">
               <a:rPr lang="en-US" smtClean="0"/>
-              <a:t>12/13/2016</a:t>
+              <a:t>12/14/2016</a:t>
             </a:fld>
             <a:endParaRPr lang="en-US"/>
           </a:p>
@@ -2172,7 +2144,7 @@
     </p:spTree>
     <p:extLst>
       <p:ext uri="{BB962C8B-B14F-4D97-AF65-F5344CB8AC3E}">
-        <p14:creationId xmlns:p14="http://schemas.microsoft.com/office/powerpoint/2010/main" val="3967427704"/>
+        <p14:creationId xmlns:p14="http://schemas.microsoft.com/office/powerpoint/2010/main" val="3434388963"/>
       </p:ext>
     </p:extLst>
   </p:cSld>
@@ -2239,7 +2211,7 @@
           <a:p>
             <a:fld id="{73D7E00A-486F-4252-8B1D-E32645521F49}" type="datetime1">
               <a:rPr lang="en-US" smtClean="0"/>
-              <a:t>12/13/2016</a:t>
+              <a:t>12/14/2016</a:t>
             </a:fld>
             <a:endParaRPr lang="en-US"/>
           </a:p>
@@ -2290,7 +2262,7 @@
     </p:spTree>
     <p:extLst>
       <p:ext uri="{BB962C8B-B14F-4D97-AF65-F5344CB8AC3E}">
-        <p14:creationId xmlns:p14="http://schemas.microsoft.com/office/powerpoint/2010/main" val="37466018"/>
+        <p14:creationId xmlns:p14="http://schemas.microsoft.com/office/powerpoint/2010/main" val="2891732468"/>
       </p:ext>
     </p:extLst>
   </p:cSld>
@@ -2334,7 +2306,7 @@
           <a:p>
             <a:fld id="{8DDF5F92-E675-4B36-9A60-69A962A68675}" type="datetime1">
               <a:rPr lang="en-US" smtClean="0"/>
-              <a:t>12/13/2016</a:t>
+              <a:t>12/14/2016</a:t>
             </a:fld>
             <a:endParaRPr lang="en-US"/>
           </a:p>
@@ -2385,7 +2357,7 @@
     </p:spTree>
     <p:extLst>
       <p:ext uri="{BB962C8B-B14F-4D97-AF65-F5344CB8AC3E}">
-        <p14:creationId xmlns:p14="http://schemas.microsoft.com/office/powerpoint/2010/main" val="2982376658"/>
+        <p14:creationId xmlns:p14="http://schemas.microsoft.com/office/powerpoint/2010/main" val="3243350491"/>
       </p:ext>
     </p:extLst>
   </p:cSld>
@@ -2424,8 +2396,8 @@
         </p:nvSpPr>
         <p:spPr>
           <a:xfrm>
-            <a:off x="841248" y="457200"/>
-            <a:ext cx="3200400" cy="1600197"/>
+            <a:off x="630936" y="457201"/>
+            <a:ext cx="2400300" cy="1600197"/>
           </a:xfrm>
         </p:spPr>
         <p:txBody>
@@ -2434,7 +2406,7 @@
           </a:bodyPr>
           <a:lstStyle>
             <a:lvl1pPr>
-              <a:defRPr sz="3200" b="0" baseline="0"/>
+              <a:defRPr sz="2800" b="0" baseline="0"/>
             </a:lvl1pPr>
           </a:lstStyle>
           <a:p>
@@ -2458,21 +2430,21 @@
         </p:nvSpPr>
         <p:spPr>
           <a:xfrm>
-            <a:off x="4504267" y="685800"/>
-            <a:ext cx="6079066" cy="5486400"/>
+            <a:off x="3378200" y="685800"/>
+            <a:ext cx="4559300" cy="5486400"/>
           </a:xfrm>
         </p:spPr>
         <p:txBody>
           <a:bodyPr/>
           <a:lstStyle>
             <a:lvl1pPr>
-              <a:defRPr sz="2000"/>
+              <a:defRPr sz="1800"/>
             </a:lvl1pPr>
             <a:lvl2pPr>
-              <a:defRPr sz="1800"/>
+              <a:defRPr sz="1600"/>
             </a:lvl2pPr>
             <a:lvl3pPr>
-              <a:defRPr sz="1600"/>
+              <a:defRPr sz="1400"/>
             </a:lvl3pPr>
             <a:lvl4pPr>
               <a:defRPr sz="1400"/>
@@ -2543,8 +2515,8 @@
         </p:nvSpPr>
         <p:spPr>
           <a:xfrm>
-            <a:off x="841248" y="2099734"/>
-            <a:ext cx="3200400" cy="3810001"/>
+            <a:off x="630936" y="2099735"/>
+            <a:ext cx="2400300" cy="3810001"/>
           </a:xfrm>
         </p:spPr>
         <p:txBody>
@@ -2621,7 +2593,7 @@
           <a:p>
             <a:fld id="{AF6E2C9B-5FA2-460D-9BE7-B0812FC2A6FF}" type="datetime1">
               <a:rPr lang="en-US" smtClean="0"/>
-              <a:t>12/13/2016</a:t>
+              <a:t>12/14/2016</a:t>
             </a:fld>
             <a:endParaRPr lang="en-US"/>
           </a:p>
@@ -2672,7 +2644,7 @@
     </p:spTree>
     <p:extLst>
       <p:ext uri="{BB962C8B-B14F-4D97-AF65-F5344CB8AC3E}">
-        <p14:creationId xmlns:p14="http://schemas.microsoft.com/office/powerpoint/2010/main" val="755884980"/>
+        <p14:creationId xmlns:p14="http://schemas.microsoft.com/office/powerpoint/2010/main" val="72835503"/>
       </p:ext>
     </p:extLst>
   </p:cSld>
@@ -2791,7 +2763,7 @@
           <a:p>
             <a:fld id="{7B2D3E9E-A95C-48F2-B4BF-A71542E0BE9A}" type="datetime1">
               <a:rPr lang="en-US" smtClean="0"/>
-              <a:t>12/13/2016</a:t>
+              <a:t>12/14/2016</a:t>
             </a:fld>
             <a:endParaRPr lang="en-US"/>
           </a:p>
@@ -2878,7 +2850,7 @@
         <p:spPr>
           <a:xfrm>
             <a:off x="0" y="5105400"/>
-            <a:ext cx="11292840" cy="1752600"/>
+            <a:ext cx="8469630" cy="1752600"/>
           </a:xfrm>
           <a:prstGeom prst="rect">
             <a:avLst/>
@@ -2919,8 +2891,8 @@
         </p:nvSpPr>
         <p:spPr>
           <a:xfrm>
-            <a:off x="914400" y="5257800"/>
-            <a:ext cx="9982200" cy="914400"/>
+            <a:off x="685800" y="5257800"/>
+            <a:ext cx="7486650" cy="914400"/>
           </a:xfrm>
         </p:spPr>
         <p:txBody>
@@ -2957,8 +2929,8 @@
         </p:nvSpPr>
         <p:spPr>
           <a:xfrm>
-            <a:off x="0" y="0"/>
-            <a:ext cx="11292840" cy="5128923"/>
+            <a:off x="0" y="1"/>
+            <a:ext cx="8469630" cy="5128923"/>
           </a:xfrm>
           <a:blipFill>
             <a:blip r:embed="rId2"/>
@@ -3032,8 +3004,8 @@
         </p:nvSpPr>
         <p:spPr>
           <a:xfrm>
-            <a:off x="914400" y="6108589"/>
-            <a:ext cx="9982200" cy="597011"/>
+            <a:off x="685800" y="6108590"/>
+            <a:ext cx="7486650" cy="597011"/>
           </a:xfrm>
         </p:spPr>
         <p:txBody>
@@ -3116,7 +3088,7 @@
           <a:p>
             <a:fld id="{1D374940-A916-4C8B-9648-02A2D3898F9E}" type="datetime1">
               <a:rPr lang="en-US" smtClean="0"/>
-              <a:t>12/13/2016</a:t>
+              <a:t>12/14/2016</a:t>
             </a:fld>
             <a:endParaRPr lang="en-US"/>
           </a:p>
@@ -3167,7 +3139,7 @@
     </p:spTree>
     <p:extLst>
       <p:ext uri="{BB962C8B-B14F-4D97-AF65-F5344CB8AC3E}">
-        <p14:creationId xmlns:p14="http://schemas.microsoft.com/office/powerpoint/2010/main" val="3679501661"/>
+        <p14:creationId xmlns:p14="http://schemas.microsoft.com/office/powerpoint/2010/main" val="1313418090"/>
       </p:ext>
     </p:extLst>
   </p:cSld>
@@ -3286,7 +3258,7 @@
           <a:p>
             <a:fld id="{5F4E5243-F52A-4D37-9694-EB26C6C31910}" type="datetime1">
               <a:rPr lang="en-US" smtClean="0"/>
-              <a:t>12/13/2016</a:t>
+              <a:t>12/14/2016</a:t>
             </a:fld>
             <a:endParaRPr lang="en-US"/>
           </a:p>
@@ -3337,7 +3309,7 @@
     </p:spTree>
     <p:extLst>
       <p:ext uri="{BB962C8B-B14F-4D97-AF65-F5344CB8AC3E}">
-        <p14:creationId xmlns:p14="http://schemas.microsoft.com/office/powerpoint/2010/main" val="4146641135"/>
+        <p14:creationId xmlns:p14="http://schemas.microsoft.com/office/powerpoint/2010/main" val="1610374140"/>
       </p:ext>
     </p:extLst>
   </p:cSld>
@@ -3376,8 +3348,8 @@
         </p:nvSpPr>
         <p:spPr>
           <a:xfrm>
-            <a:off x="8648700" y="381000"/>
-            <a:ext cx="2476500" cy="5897562"/>
+            <a:off x="6486525" y="381000"/>
+            <a:ext cx="1857375" cy="5897562"/>
           </a:xfrm>
         </p:spPr>
         <p:txBody>
@@ -3404,8 +3376,8 @@
         </p:nvSpPr>
         <p:spPr>
           <a:xfrm>
-            <a:off x="762000" y="381000"/>
-            <a:ext cx="7734300" cy="5897562"/>
+            <a:off x="571500" y="381000"/>
+            <a:ext cx="5800725" cy="5897562"/>
           </a:xfrm>
         </p:spPr>
         <p:txBody>
@@ -3466,7 +3438,7 @@
           <a:p>
             <a:fld id="{3A77B6E1-634A-48DC-9E8B-D894023267EF}" type="datetime1">
               <a:rPr lang="en-US" smtClean="0"/>
-              <a:t>12/13/2016</a:t>
+              <a:t>12/14/2016</a:t>
             </a:fld>
             <a:endParaRPr lang="en-US"/>
           </a:p>
@@ -3517,7 +3489,7 @@
     </p:spTree>
     <p:extLst>
       <p:ext uri="{BB962C8B-B14F-4D97-AF65-F5344CB8AC3E}">
-        <p14:creationId xmlns:p14="http://schemas.microsoft.com/office/powerpoint/2010/main" val="1847727445"/>
+        <p14:creationId xmlns:p14="http://schemas.microsoft.com/office/powerpoint/2010/main" val="4146850464"/>
       </p:ext>
     </p:extLst>
   </p:cSld>
@@ -3556,8 +3528,8 @@
         </p:nvSpPr>
         <p:spPr>
           <a:xfrm>
-            <a:off x="831850" y="1712423"/>
-            <a:ext cx="10515600" cy="2851208"/>
+            <a:off x="623888" y="1712423"/>
+            <a:ext cx="7886700" cy="2851208"/>
           </a:xfrm>
         </p:spPr>
         <p:txBody>
@@ -3566,7 +3538,7 @@
           </a:bodyPr>
           <a:lstStyle>
             <a:lvl1pPr>
-              <a:defRPr sz="6000" b="0"/>
+              <a:defRPr sz="4500" b="0"/>
             </a:lvl1pPr>
           </a:lstStyle>
           <a:p>
@@ -3590,8 +3562,8 @@
         </p:nvSpPr>
         <p:spPr>
           <a:xfrm>
-            <a:off x="831850" y="4552633"/>
-            <a:ext cx="10515600" cy="1500187"/>
+            <a:off x="623888" y="4552634"/>
+            <a:ext cx="7886700" cy="1500187"/>
           </a:xfrm>
         </p:spPr>
         <p:txBody>
@@ -3601,7 +3573,7 @@
           <a:lstStyle>
             <a:lvl1pPr marL="0" indent="0">
               <a:buNone/>
-              <a:defRPr sz="2400">
+              <a:defRPr sz="1800">
                 <a:solidFill>
                   <a:schemeClr val="tx1">
                     <a:lumMod val="75000"/>
@@ -3610,9 +3582,9 @@
                 </a:solidFill>
               </a:defRPr>
             </a:lvl1pPr>
-            <a:lvl2pPr marL="457200" indent="0">
-              <a:buNone/>
-              <a:defRPr sz="1800">
+            <a:lvl2pPr marL="342900" indent="0">
+              <a:buNone/>
+              <a:defRPr sz="1350">
                 <a:solidFill>
                   <a:schemeClr val="tx1">
                     <a:tint val="75000"/>
@@ -3620,9 +3592,9 @@
                 </a:solidFill>
               </a:defRPr>
             </a:lvl2pPr>
-            <a:lvl3pPr marL="914400" indent="0">
-              <a:buNone/>
-              <a:defRPr sz="1600">
+            <a:lvl3pPr marL="685800" indent="0">
+              <a:buNone/>
+              <a:defRPr sz="1200">
                 <a:solidFill>
                   <a:schemeClr val="tx1">
                     <a:tint val="75000"/>
@@ -3630,9 +3602,9 @@
                 </a:solidFill>
               </a:defRPr>
             </a:lvl3pPr>
-            <a:lvl4pPr marL="1371600" indent="0">
-              <a:buNone/>
-              <a:defRPr sz="1400">
+            <a:lvl4pPr marL="1028700" indent="0">
+              <a:buNone/>
+              <a:defRPr sz="1050">
                 <a:solidFill>
                   <a:schemeClr val="tx1">
                     <a:tint val="75000"/>
@@ -3640,9 +3612,9 @@
                 </a:solidFill>
               </a:defRPr>
             </a:lvl4pPr>
-            <a:lvl5pPr marL="1828800" indent="0">
-              <a:buNone/>
-              <a:defRPr sz="1400">
+            <a:lvl5pPr marL="1371600" indent="0">
+              <a:buNone/>
+              <a:defRPr sz="1050">
                 <a:solidFill>
                   <a:schemeClr val="tx1">
                     <a:tint val="75000"/>
@@ -3650,9 +3622,9 @@
                 </a:solidFill>
               </a:defRPr>
             </a:lvl5pPr>
-            <a:lvl6pPr marL="2286000" indent="0">
-              <a:buNone/>
-              <a:defRPr sz="1400">
+            <a:lvl6pPr marL="1714500" indent="0">
+              <a:buNone/>
+              <a:defRPr sz="1050">
                 <a:solidFill>
                   <a:schemeClr val="tx1">
                     <a:tint val="75000"/>
@@ -3660,9 +3632,9 @@
                 </a:solidFill>
               </a:defRPr>
             </a:lvl6pPr>
-            <a:lvl7pPr marL="2743200" indent="0">
-              <a:buNone/>
-              <a:defRPr sz="1400">
+            <a:lvl7pPr marL="2057400" indent="0">
+              <a:buNone/>
+              <a:defRPr sz="1050">
                 <a:solidFill>
                   <a:schemeClr val="tx1">
                     <a:tint val="75000"/>
@@ -3670,9 +3642,9 @@
                 </a:solidFill>
               </a:defRPr>
             </a:lvl7pPr>
-            <a:lvl8pPr marL="3200400" indent="0">
-              <a:buNone/>
-              <a:defRPr sz="1400">
+            <a:lvl8pPr marL="2400300" indent="0">
+              <a:buNone/>
+              <a:defRPr sz="1050">
                 <a:solidFill>
                   <a:schemeClr val="tx1">
                     <a:tint val="75000"/>
@@ -3680,9 +3652,9 @@
                 </a:solidFill>
               </a:defRPr>
             </a:lvl8pPr>
-            <a:lvl9pPr marL="3657600" indent="0">
-              <a:buNone/>
-              <a:defRPr sz="1400">
+            <a:lvl9pPr marL="2743200" indent="0">
+              <a:buNone/>
+              <a:defRPr sz="1050">
                 <a:solidFill>
                   <a:schemeClr val="tx1">
                     <a:tint val="75000"/>
@@ -3717,7 +3689,7 @@
           <a:p>
             <a:fld id="{A50F84E2-2D7A-43CF-AC90-352A289A783A}" type="datetime1">
               <a:rPr lang="en-US" smtClean="0"/>
-              <a:t>12/13/2016</a:t>
+              <a:t>12/14/2016</a:t>
             </a:fld>
             <a:endParaRPr lang="en-US"/>
           </a:p>
@@ -3830,8 +3802,8 @@
         </p:nvSpPr>
         <p:spPr>
           <a:xfrm>
-            <a:off x="845127" y="1828800"/>
-            <a:ext cx="5181600" cy="4351337"/>
+            <a:off x="633845" y="1828801"/>
+            <a:ext cx="3886200" cy="4351337"/>
           </a:xfrm>
         </p:spPr>
         <p:txBody>
@@ -3887,8 +3859,8 @@
         </p:nvSpPr>
         <p:spPr>
           <a:xfrm>
-            <a:off x="6172200" y="1828800"/>
-            <a:ext cx="5181600" cy="4351337"/>
+            <a:off x="4629150" y="1828801"/>
+            <a:ext cx="3886200" cy="4351337"/>
           </a:xfrm>
         </p:spPr>
         <p:txBody>
@@ -3949,7 +3921,7 @@
           <a:p>
             <a:fld id="{F12952B5-7A2F-4CC8-B7CE-9234E21C2837}" type="datetime1">
               <a:rPr lang="en-US" smtClean="0"/>
-              <a:t>12/13/2016</a:t>
+              <a:t>12/14/2016</a:t>
             </a:fld>
             <a:endParaRPr lang="en-US"/>
           </a:p>
@@ -4034,8 +4006,8 @@
         </p:nvSpPr>
         <p:spPr>
           <a:xfrm>
-            <a:off x="845127" y="1681850"/>
-            <a:ext cx="5156200" cy="825699"/>
+            <a:off x="633845" y="1681851"/>
+            <a:ext cx="3867150" cy="825699"/>
           </a:xfrm>
         </p:spPr>
         <p:txBody>
@@ -4048,39 +4020,39 @@
                 <a:spcPts val="0"/>
               </a:spcBef>
               <a:buNone/>
-              <a:defRPr sz="2400" b="1"/>
+              <a:defRPr sz="1800" b="1"/>
             </a:lvl1pPr>
-            <a:lvl2pPr marL="457200" indent="0">
-              <a:buNone/>
-              <a:defRPr sz="2000" b="1"/>
+            <a:lvl2pPr marL="342900" indent="0">
+              <a:buNone/>
+              <a:defRPr sz="1500" b="1"/>
             </a:lvl2pPr>
-            <a:lvl3pPr marL="914400" indent="0">
-              <a:buNone/>
-              <a:defRPr sz="1800" b="1"/>
+            <a:lvl3pPr marL="685800" indent="0">
+              <a:buNone/>
+              <a:defRPr sz="1350" b="1"/>
             </a:lvl3pPr>
-            <a:lvl4pPr marL="1371600" indent="0">
-              <a:buNone/>
-              <a:defRPr sz="1600" b="1"/>
+            <a:lvl4pPr marL="1028700" indent="0">
+              <a:buNone/>
+              <a:defRPr sz="1200" b="1"/>
             </a:lvl4pPr>
-            <a:lvl5pPr marL="1828800" indent="0">
-              <a:buNone/>
-              <a:defRPr sz="1600" b="1"/>
+            <a:lvl5pPr marL="1371600" indent="0">
+              <a:buNone/>
+              <a:defRPr sz="1200" b="1"/>
             </a:lvl5pPr>
-            <a:lvl6pPr marL="2286000" indent="0">
-              <a:buNone/>
-              <a:defRPr sz="1600" b="1"/>
+            <a:lvl6pPr marL="1714500" indent="0">
+              <a:buNone/>
+              <a:defRPr sz="1200" b="1"/>
             </a:lvl6pPr>
-            <a:lvl7pPr marL="2743200" indent="0">
-              <a:buNone/>
-              <a:defRPr sz="1600" b="1"/>
+            <a:lvl7pPr marL="2057400" indent="0">
+              <a:buNone/>
+              <a:defRPr sz="1200" b="1"/>
             </a:lvl7pPr>
-            <a:lvl8pPr marL="3200400" indent="0">
-              <a:buNone/>
-              <a:defRPr sz="1600" b="1"/>
+            <a:lvl8pPr marL="2400300" indent="0">
+              <a:buNone/>
+              <a:defRPr sz="1200" b="1"/>
             </a:lvl8pPr>
-            <a:lvl9pPr marL="3657600" indent="0">
-              <a:buNone/>
-              <a:defRPr sz="1600" b="1"/>
+            <a:lvl9pPr marL="2743200" indent="0">
+              <a:buNone/>
+              <a:defRPr sz="1200" b="1"/>
             </a:lvl9pPr>
           </a:lstStyle>
           <a:p>
@@ -4104,8 +4076,8 @@
         </p:nvSpPr>
         <p:spPr>
           <a:xfrm>
-            <a:off x="845127" y="2507550"/>
-            <a:ext cx="5156200" cy="3680525"/>
+            <a:off x="633845" y="2507551"/>
+            <a:ext cx="3867150" cy="3680525"/>
           </a:xfrm>
         </p:spPr>
         <p:txBody>
@@ -4161,8 +4133,8 @@
         </p:nvSpPr>
         <p:spPr>
           <a:xfrm>
-            <a:off x="6172200" y="1681851"/>
-            <a:ext cx="5181601" cy="825698"/>
+            <a:off x="4629150" y="1681851"/>
+            <a:ext cx="3886201" cy="825698"/>
           </a:xfrm>
         </p:spPr>
         <p:txBody>
@@ -4173,39 +4145,39 @@
                 <a:spcPts val="0"/>
               </a:spcBef>
               <a:buNone/>
-              <a:defRPr sz="2400" b="1"/>
+              <a:defRPr sz="1800" b="1"/>
             </a:lvl1pPr>
-            <a:lvl2pPr marL="457200" indent="0">
-              <a:buNone/>
-              <a:defRPr sz="2000" b="1"/>
+            <a:lvl2pPr marL="342900" indent="0">
+              <a:buNone/>
+              <a:defRPr sz="1500" b="1"/>
             </a:lvl2pPr>
-            <a:lvl3pPr marL="914400" indent="0">
-              <a:buNone/>
-              <a:defRPr sz="1800" b="1"/>
+            <a:lvl3pPr marL="685800" indent="0">
+              <a:buNone/>
+              <a:defRPr sz="1350" b="1"/>
             </a:lvl3pPr>
-            <a:lvl4pPr marL="1371600" indent="0">
-              <a:buNone/>
-              <a:defRPr sz="1600" b="1"/>
+            <a:lvl4pPr marL="1028700" indent="0">
+              <a:buNone/>
+              <a:defRPr sz="1200" b="1"/>
             </a:lvl4pPr>
-            <a:lvl5pPr marL="1828800" indent="0">
-              <a:buNone/>
-              <a:defRPr sz="1600" b="1"/>
+            <a:lvl5pPr marL="1371600" indent="0">
+              <a:buNone/>
+              <a:defRPr sz="1200" b="1"/>
             </a:lvl5pPr>
-            <a:lvl6pPr marL="2286000" indent="0">
-              <a:buNone/>
-              <a:defRPr sz="1600" b="1"/>
+            <a:lvl6pPr marL="1714500" indent="0">
+              <a:buNone/>
+              <a:defRPr sz="1200" b="1"/>
             </a:lvl6pPr>
-            <a:lvl7pPr marL="2743200" indent="0">
-              <a:buNone/>
-              <a:defRPr sz="1600" b="1"/>
+            <a:lvl7pPr marL="2057400" indent="0">
+              <a:buNone/>
+              <a:defRPr sz="1200" b="1"/>
             </a:lvl7pPr>
-            <a:lvl8pPr marL="3200400" indent="0">
-              <a:buNone/>
-              <a:defRPr sz="1600" b="1"/>
+            <a:lvl8pPr marL="2400300" indent="0">
+              <a:buNone/>
+              <a:defRPr sz="1200" b="1"/>
             </a:lvl8pPr>
-            <a:lvl9pPr marL="3657600" indent="0">
-              <a:buNone/>
-              <a:defRPr sz="1600" b="1"/>
+            <a:lvl9pPr marL="2743200" indent="0">
+              <a:buNone/>
+              <a:defRPr sz="1200" b="1"/>
             </a:lvl9pPr>
           </a:lstStyle>
           <a:p>
@@ -4229,8 +4201,8 @@
         </p:nvSpPr>
         <p:spPr>
           <a:xfrm>
-            <a:off x="6172200" y="2507550"/>
-            <a:ext cx="5181601" cy="3680525"/>
+            <a:off x="4629150" y="2507551"/>
+            <a:ext cx="3886201" cy="3680525"/>
           </a:xfrm>
         </p:spPr>
         <p:txBody>
@@ -4291,7 +4263,7 @@
           <a:p>
             <a:fld id="{CE1DA07A-9201-4B4B-BAF2-015AFA30F520}" type="datetime1">
               <a:rPr lang="en-US" smtClean="0"/>
-              <a:t>12/13/2016</a:t>
+              <a:t>12/14/2016</a:t>
             </a:fld>
             <a:endParaRPr lang="en-US"/>
           </a:p>
@@ -4404,7 +4376,7 @@
           <a:p>
             <a:fld id="{73D7E00A-486F-4252-8B1D-E32645521F49}" type="datetime1">
               <a:rPr lang="en-US" smtClean="0"/>
-              <a:t>12/13/2016</a:t>
+              <a:t>12/14/2016</a:t>
             </a:fld>
             <a:endParaRPr lang="en-US"/>
           </a:p>
@@ -4522,7 +4494,7 @@
           <a:p>
             <a:fld id="{8DDF5F92-E675-4B36-9A60-69A962A68675}" type="datetime1">
               <a:rPr lang="en-US" smtClean="0"/>
-              <a:t>12/13/2016</a:t>
+              <a:t>12/14/2016</a:t>
             </a:fld>
             <a:endParaRPr lang="en-US"/>
           </a:p>
@@ -4612,8 +4584,8 @@
         </p:nvSpPr>
         <p:spPr>
           <a:xfrm>
-            <a:off x="841248" y="457200"/>
-            <a:ext cx="3931920" cy="1600197"/>
+            <a:off x="630936" y="457201"/>
+            <a:ext cx="2948940" cy="1600197"/>
           </a:xfrm>
         </p:spPr>
         <p:txBody>
@@ -4622,7 +4594,7 @@
           </a:bodyPr>
           <a:lstStyle>
             <a:lvl1pPr>
-              <a:defRPr sz="3200" b="0"/>
+              <a:defRPr sz="2400" b="0"/>
             </a:lvl1pPr>
           </a:lstStyle>
           <a:p>
@@ -4646,39 +4618,39 @@
         </p:nvSpPr>
         <p:spPr>
           <a:xfrm>
-            <a:off x="5181600" y="990600"/>
-            <a:ext cx="6172200" cy="4876800"/>
+            <a:off x="3886200" y="990600"/>
+            <a:ext cx="4629150" cy="4876800"/>
           </a:xfrm>
         </p:spPr>
         <p:txBody>
           <a:bodyPr/>
           <a:lstStyle>
             <a:lvl1pPr>
-              <a:defRPr sz="3200"/>
+              <a:defRPr sz="2400"/>
             </a:lvl1pPr>
             <a:lvl2pPr>
-              <a:defRPr sz="2800"/>
+              <a:defRPr sz="2100"/>
             </a:lvl2pPr>
             <a:lvl3pPr>
-              <a:defRPr sz="2400"/>
+              <a:defRPr sz="1800"/>
             </a:lvl3pPr>
             <a:lvl4pPr>
-              <a:defRPr sz="2000"/>
+              <a:defRPr sz="1500"/>
             </a:lvl4pPr>
             <a:lvl5pPr>
-              <a:defRPr sz="2000"/>
+              <a:defRPr sz="1500"/>
             </a:lvl5pPr>
             <a:lvl6pPr>
-              <a:defRPr sz="2000"/>
+              <a:defRPr sz="1500"/>
             </a:lvl6pPr>
             <a:lvl7pPr>
-              <a:defRPr sz="2000"/>
+              <a:defRPr sz="1500"/>
             </a:lvl7pPr>
             <a:lvl8pPr>
-              <a:defRPr sz="2000"/>
+              <a:defRPr sz="1500"/>
             </a:lvl8pPr>
             <a:lvl9pPr>
-              <a:defRPr sz="2000"/>
+              <a:defRPr sz="1500"/>
             </a:lvl9pPr>
           </a:lstStyle>
           <a:p>
@@ -4731,8 +4703,8 @@
         </p:nvSpPr>
         <p:spPr>
           <a:xfrm>
-            <a:off x="841248" y="2057399"/>
-            <a:ext cx="3931920" cy="3810001"/>
+            <a:off x="630936" y="2057399"/>
+            <a:ext cx="2948940" cy="3810001"/>
           </a:xfrm>
         </p:spPr>
         <p:txBody>
@@ -4745,39 +4717,39 @@
                 <a:spcPct val="90000"/>
               </a:lnSpc>
               <a:buNone/>
-              <a:defRPr sz="1600"/>
+              <a:defRPr sz="1200"/>
             </a:lvl1pPr>
-            <a:lvl2pPr marL="457200" indent="0">
-              <a:buNone/>
-              <a:defRPr sz="1200"/>
+            <a:lvl2pPr marL="342900" indent="0">
+              <a:buNone/>
+              <a:defRPr sz="900"/>
             </a:lvl2pPr>
-            <a:lvl3pPr marL="914400" indent="0">
-              <a:buNone/>
-              <a:defRPr sz="1000"/>
+            <a:lvl3pPr marL="685800" indent="0">
+              <a:buNone/>
+              <a:defRPr sz="750"/>
             </a:lvl3pPr>
-            <a:lvl4pPr marL="1371600" indent="0">
-              <a:buNone/>
-              <a:defRPr sz="900"/>
+            <a:lvl4pPr marL="1028700" indent="0">
+              <a:buNone/>
+              <a:defRPr sz="675"/>
             </a:lvl4pPr>
-            <a:lvl5pPr marL="1828800" indent="0">
-              <a:buNone/>
-              <a:defRPr sz="900"/>
+            <a:lvl5pPr marL="1371600" indent="0">
+              <a:buNone/>
+              <a:defRPr sz="675"/>
             </a:lvl5pPr>
-            <a:lvl6pPr marL="2286000" indent="0">
-              <a:buNone/>
-              <a:defRPr sz="900"/>
+            <a:lvl6pPr marL="1714500" indent="0">
+              <a:buNone/>
+              <a:defRPr sz="675"/>
             </a:lvl6pPr>
-            <a:lvl7pPr marL="2743200" indent="0">
-              <a:buNone/>
-              <a:defRPr sz="900"/>
+            <a:lvl7pPr marL="2057400" indent="0">
+              <a:buNone/>
+              <a:defRPr sz="675"/>
             </a:lvl7pPr>
-            <a:lvl8pPr marL="3200400" indent="0">
-              <a:buNone/>
-              <a:defRPr sz="900"/>
+            <a:lvl8pPr marL="2400300" indent="0">
+              <a:buNone/>
+              <a:defRPr sz="675"/>
             </a:lvl8pPr>
-            <a:lvl9pPr marL="3657600" indent="0">
-              <a:buNone/>
-              <a:defRPr sz="900"/>
+            <a:lvl9pPr marL="2743200" indent="0">
+              <a:buNone/>
+              <a:defRPr sz="675"/>
             </a:lvl9pPr>
           </a:lstStyle>
           <a:p>
@@ -4806,7 +4778,7 @@
           <a:p>
             <a:fld id="{AF6E2C9B-5FA2-460D-9BE7-B0812FC2A6FF}" type="datetime1">
               <a:rPr lang="en-US" smtClean="0"/>
-              <a:t>12/13/2016</a:t>
+              <a:t>12/14/2016</a:t>
             </a:fld>
             <a:endParaRPr lang="en-US"/>
           </a:p>
@@ -4896,8 +4868,8 @@
         </p:nvSpPr>
         <p:spPr>
           <a:xfrm>
-            <a:off x="841248" y="457200"/>
-            <a:ext cx="3931920" cy="1600200"/>
+            <a:off x="630936" y="457200"/>
+            <a:ext cx="2948940" cy="1600200"/>
           </a:xfrm>
         </p:spPr>
         <p:txBody>
@@ -4906,7 +4878,7 @@
           </a:bodyPr>
           <a:lstStyle>
             <a:lvl1pPr>
-              <a:defRPr sz="3200" b="0"/>
+              <a:defRPr sz="2400" b="0"/>
             </a:lvl1pPr>
           </a:lstStyle>
           <a:p>
@@ -4930,8 +4902,8 @@
         </p:nvSpPr>
         <p:spPr>
           <a:xfrm>
-            <a:off x="5181600" y="990600"/>
-            <a:ext cx="6172200" cy="4876800"/>
+            <a:off x="3886200" y="990600"/>
+            <a:ext cx="4629150" cy="4876800"/>
           </a:xfrm>
         </p:spPr>
         <p:txBody>
@@ -4939,39 +4911,39 @@
           <a:lstStyle>
             <a:lvl1pPr marL="0" indent="0">
               <a:buNone/>
-              <a:defRPr sz="3200"/>
+              <a:defRPr sz="2400"/>
             </a:lvl1pPr>
-            <a:lvl2pPr marL="457200" indent="0">
-              <a:buNone/>
-              <a:defRPr sz="2800"/>
+            <a:lvl2pPr marL="342900" indent="0">
+              <a:buNone/>
+              <a:defRPr sz="2100"/>
             </a:lvl2pPr>
-            <a:lvl3pPr marL="914400" indent="0">
-              <a:buNone/>
-              <a:defRPr sz="2400"/>
+            <a:lvl3pPr marL="685800" indent="0">
+              <a:buNone/>
+              <a:defRPr sz="1800"/>
             </a:lvl3pPr>
-            <a:lvl4pPr marL="1371600" indent="0">
-              <a:buNone/>
-              <a:defRPr sz="2000"/>
+            <a:lvl4pPr marL="1028700" indent="0">
+              <a:buNone/>
+              <a:defRPr sz="1500"/>
             </a:lvl4pPr>
-            <a:lvl5pPr marL="1828800" indent="0">
-              <a:buNone/>
-              <a:defRPr sz="2000"/>
+            <a:lvl5pPr marL="1371600" indent="0">
+              <a:buNone/>
+              <a:defRPr sz="1500"/>
             </a:lvl5pPr>
-            <a:lvl6pPr marL="2286000" indent="0">
-              <a:buNone/>
-              <a:defRPr sz="2000"/>
+            <a:lvl6pPr marL="1714500" indent="0">
+              <a:buNone/>
+              <a:defRPr sz="1500"/>
             </a:lvl6pPr>
-            <a:lvl7pPr marL="2743200" indent="0">
-              <a:buNone/>
-              <a:defRPr sz="2000"/>
+            <a:lvl7pPr marL="2057400" indent="0">
+              <a:buNone/>
+              <a:defRPr sz="1500"/>
             </a:lvl7pPr>
-            <a:lvl8pPr marL="3200400" indent="0">
-              <a:buNone/>
-              <a:defRPr sz="2000"/>
+            <a:lvl8pPr marL="2400300" indent="0">
+              <a:buNone/>
+              <a:defRPr sz="1500"/>
             </a:lvl8pPr>
-            <a:lvl9pPr marL="3657600" indent="0">
-              <a:buNone/>
-              <a:defRPr sz="2000"/>
+            <a:lvl9pPr marL="2743200" indent="0">
+              <a:buNone/>
+              <a:defRPr sz="1500"/>
             </a:lvl9pPr>
           </a:lstStyle>
           <a:p>
@@ -4995,8 +4967,8 @@
         </p:nvSpPr>
         <p:spPr>
           <a:xfrm>
-            <a:off x="841248" y="2057400"/>
-            <a:ext cx="3931920" cy="3810000"/>
+            <a:off x="630936" y="2057400"/>
+            <a:ext cx="2948940" cy="3810000"/>
           </a:xfrm>
         </p:spPr>
         <p:txBody>
@@ -5009,39 +4981,39 @@
                 <a:spcPct val="90000"/>
               </a:lnSpc>
               <a:buNone/>
-              <a:defRPr sz="1600"/>
+              <a:defRPr sz="1200"/>
             </a:lvl1pPr>
-            <a:lvl2pPr marL="457200" indent="0">
-              <a:buNone/>
-              <a:defRPr sz="1200"/>
+            <a:lvl2pPr marL="342900" indent="0">
+              <a:buNone/>
+              <a:defRPr sz="900"/>
             </a:lvl2pPr>
-            <a:lvl3pPr marL="914400" indent="0">
-              <a:buNone/>
-              <a:defRPr sz="1000"/>
+            <a:lvl3pPr marL="685800" indent="0">
+              <a:buNone/>
+              <a:defRPr sz="750"/>
             </a:lvl3pPr>
-            <a:lvl4pPr marL="1371600" indent="0">
-              <a:buNone/>
-              <a:defRPr sz="900"/>
+            <a:lvl4pPr marL="1028700" indent="0">
+              <a:buNone/>
+              <a:defRPr sz="675"/>
             </a:lvl4pPr>
-            <a:lvl5pPr marL="1828800" indent="0">
-              <a:buNone/>
-              <a:defRPr sz="900"/>
+            <a:lvl5pPr marL="1371600" indent="0">
+              <a:buNone/>
+              <a:defRPr sz="675"/>
             </a:lvl5pPr>
-            <a:lvl6pPr marL="2286000" indent="0">
-              <a:buNone/>
-              <a:defRPr sz="900"/>
+            <a:lvl6pPr marL="1714500" indent="0">
+              <a:buNone/>
+              <a:defRPr sz="675"/>
             </a:lvl6pPr>
-            <a:lvl7pPr marL="2743200" indent="0">
-              <a:buNone/>
-              <a:defRPr sz="900"/>
+            <a:lvl7pPr marL="2057400" indent="0">
+              <a:buNone/>
+              <a:defRPr sz="675"/>
             </a:lvl7pPr>
-            <a:lvl8pPr marL="3200400" indent="0">
-              <a:buNone/>
-              <a:defRPr sz="900"/>
+            <a:lvl8pPr marL="2400300" indent="0">
+              <a:buNone/>
+              <a:defRPr sz="675"/>
             </a:lvl8pPr>
-            <a:lvl9pPr marL="3657600" indent="0">
-              <a:buNone/>
-              <a:defRPr sz="900"/>
+            <a:lvl9pPr marL="2743200" indent="0">
+              <a:buNone/>
+              <a:defRPr sz="675"/>
             </a:lvl9pPr>
           </a:lstStyle>
           <a:p>
@@ -5070,7 +5042,7 @@
           <a:p>
             <a:fld id="{1D374940-A916-4C8B-9648-02A2D3898F9E}" type="datetime1">
               <a:rPr lang="en-US" smtClean="0"/>
-              <a:t>12/13/2016</a:t>
+              <a:t>12/14/2016</a:t>
             </a:fld>
             <a:endParaRPr lang="en-US"/>
           </a:p>
@@ -5165,8 +5137,8 @@
         </p:nvSpPr>
         <p:spPr>
           <a:xfrm>
-            <a:off x="845127" y="365760"/>
-            <a:ext cx="10515600" cy="1325562"/>
+            <a:off x="633845" y="365760"/>
+            <a:ext cx="7886700" cy="1325562"/>
           </a:xfrm>
           <a:prstGeom prst="rect">
             <a:avLst/>
@@ -5198,8 +5170,8 @@
         </p:nvSpPr>
         <p:spPr>
           <a:xfrm>
-            <a:off x="845127" y="1828800"/>
-            <a:ext cx="10515600" cy="4351337"/>
+            <a:off x="633845" y="1828801"/>
+            <a:ext cx="7886700" cy="4351337"/>
           </a:xfrm>
           <a:prstGeom prst="rect">
             <a:avLst/>
@@ -5260,8 +5232,8 @@
         </p:nvSpPr>
         <p:spPr>
           <a:xfrm>
-            <a:off x="838200" y="6356350"/>
-            <a:ext cx="2743200" cy="365125"/>
+            <a:off x="628650" y="6356351"/>
+            <a:ext cx="2057400" cy="365125"/>
           </a:xfrm>
           <a:prstGeom prst="rect">
             <a:avLst/>
@@ -5271,7 +5243,7 @@
           <a:bodyPr vert="horz" lIns="91440" tIns="45720" rIns="91440" bIns="45720" rtlCol="0" anchor="ctr"/>
           <a:lstStyle>
             <a:lvl1pPr algn="l">
-              <a:defRPr sz="1100">
+              <a:defRPr sz="825">
                 <a:solidFill>
                   <a:schemeClr val="tx1">
                     <a:lumMod val="65000"/>
@@ -5284,7 +5256,7 @@
           <a:p>
             <a:fld id="{5586B75A-687E-405C-8A0B-8D00578BA2C3}" type="datetime1">
               <a:rPr lang="en-US" smtClean="0"/>
-              <a:t>12/13/2016</a:t>
+              <a:t>12/14/2016</a:t>
             </a:fld>
             <a:endParaRPr lang="en-US"/>
           </a:p>
@@ -5302,8 +5274,8 @@
         </p:nvSpPr>
         <p:spPr>
           <a:xfrm>
-            <a:off x="4038600" y="6356350"/>
-            <a:ext cx="4114800" cy="365125"/>
+            <a:off x="3028950" y="6356351"/>
+            <a:ext cx="3086100" cy="365125"/>
           </a:xfrm>
           <a:prstGeom prst="rect">
             <a:avLst/>
@@ -5313,7 +5285,7 @@
           <a:bodyPr vert="horz" lIns="91440" tIns="45720" rIns="91440" bIns="45720" rtlCol="0" anchor="ctr"/>
           <a:lstStyle>
             <a:lvl1pPr algn="ctr">
-              <a:defRPr sz="1100">
+              <a:defRPr sz="825">
                 <a:solidFill>
                   <a:schemeClr val="tx1">
                     <a:lumMod val="65000"/>
@@ -5340,8 +5312,8 @@
         </p:nvSpPr>
         <p:spPr>
           <a:xfrm>
-            <a:off x="8617527" y="6356350"/>
-            <a:ext cx="2743200" cy="365125"/>
+            <a:off x="6463145" y="6356351"/>
+            <a:ext cx="2057400" cy="365125"/>
           </a:xfrm>
           <a:prstGeom prst="rect">
             <a:avLst/>
@@ -5351,7 +5323,7 @@
           <a:bodyPr vert="horz" lIns="91440" tIns="45720" rIns="91440" bIns="45720" rtlCol="0" anchor="ctr"/>
           <a:lstStyle>
             <a:lvl1pPr algn="r">
-              <a:defRPr sz="1100">
+              <a:defRPr sz="825">
                 <a:solidFill>
                   <a:schemeClr val="tx1">
                     <a:tint val="75000"/>
@@ -5388,7 +5360,7 @@
   <p:hf sldNum="0" hdr="0" ftr="0" dt="0"/>
   <p:txStyles>
     <p:titleStyle>
-      <a:lvl1pPr algn="l" defTabSz="914400" rtl="0" eaLnBrk="1" latinLnBrk="0" hangingPunct="1">
+      <a:lvl1pPr algn="l" defTabSz="685800" rtl="0" eaLnBrk="1" latinLnBrk="0" hangingPunct="1">
         <a:lnSpc>
           <a:spcPct val="90000"/>
         </a:lnSpc>
@@ -5396,7 +5368,7 @@
           <a:spcPct val="0"/>
         </a:spcBef>
         <a:buNone/>
-        <a:defRPr sz="4400" kern="1200">
+        <a:defRPr sz="3300" kern="1200">
           <a:solidFill>
             <a:schemeClr val="tx1"/>
           </a:solidFill>
@@ -5407,16 +5379,16 @@
       </a:lvl1pPr>
     </p:titleStyle>
     <p:bodyStyle>
-      <a:lvl1pPr marL="228600" indent="-228600" algn="l" defTabSz="914400" rtl="0" eaLnBrk="1" latinLnBrk="0" hangingPunct="1">
+      <a:lvl1pPr marL="171450" indent="-171450" algn="l" defTabSz="685800" rtl="0" eaLnBrk="1" latinLnBrk="0" hangingPunct="1">
         <a:lnSpc>
           <a:spcPct val="90000"/>
         </a:lnSpc>
         <a:spcBef>
-          <a:spcPts val="1000"/>
+          <a:spcPts val="750"/>
         </a:spcBef>
         <a:buFont typeface="Wingdings 2" pitchFamily="18" charset="2"/>
         <a:buChar char=""/>
-        <a:defRPr sz="2800" kern="1200">
+        <a:defRPr sz="2100" kern="1200">
           <a:solidFill>
             <a:schemeClr val="tx1"/>
           </a:solidFill>
@@ -5425,48 +5397,12 @@
           <a:cs typeface="+mn-cs"/>
         </a:defRPr>
       </a:lvl1pPr>
-      <a:lvl2pPr marL="685800" indent="-228600" algn="l" defTabSz="914400" rtl="0" eaLnBrk="1" latinLnBrk="0" hangingPunct="1">
+      <a:lvl2pPr marL="514350" indent="-171450" algn="l" defTabSz="685800" rtl="0" eaLnBrk="1" latinLnBrk="0" hangingPunct="1">
         <a:lnSpc>
           <a:spcPct val="90000"/>
         </a:lnSpc>
         <a:spcBef>
-          <a:spcPts val="500"/>
-        </a:spcBef>
-        <a:buFont typeface="Wingdings 2" pitchFamily="18" charset="2"/>
-        <a:buChar char=""/>
-        <a:defRPr sz="2400" kern="1200">
-          <a:solidFill>
-            <a:schemeClr val="tx1"/>
-          </a:solidFill>
-          <a:latin typeface="+mn-lt"/>
-          <a:ea typeface="+mn-ea"/>
-          <a:cs typeface="+mn-cs"/>
-        </a:defRPr>
-      </a:lvl2pPr>
-      <a:lvl3pPr marL="1143000" indent="-228600" algn="l" defTabSz="914400" rtl="0" eaLnBrk="1" latinLnBrk="0" hangingPunct="1">
-        <a:lnSpc>
-          <a:spcPct val="90000"/>
-        </a:lnSpc>
-        <a:spcBef>
-          <a:spcPts val="500"/>
-        </a:spcBef>
-        <a:buFont typeface="Wingdings 2" pitchFamily="18" charset="2"/>
-        <a:buChar char=""/>
-        <a:defRPr sz="2000" kern="1200">
-          <a:solidFill>
-            <a:schemeClr val="tx1"/>
-          </a:solidFill>
-          <a:latin typeface="+mn-lt"/>
-          <a:ea typeface="+mn-ea"/>
-          <a:cs typeface="+mn-cs"/>
-        </a:defRPr>
-      </a:lvl3pPr>
-      <a:lvl4pPr marL="1600200" indent="-228600" algn="l" defTabSz="914400" rtl="0" eaLnBrk="1" latinLnBrk="0" hangingPunct="1">
-        <a:lnSpc>
-          <a:spcPct val="90000"/>
-        </a:lnSpc>
-        <a:spcBef>
-          <a:spcPts val="500"/>
+          <a:spcPts val="375"/>
         </a:spcBef>
         <a:buFont typeface="Wingdings 2" pitchFamily="18" charset="2"/>
         <a:buChar char=""/>
@@ -5478,17 +5414,53 @@
           <a:ea typeface="+mn-ea"/>
           <a:cs typeface="+mn-cs"/>
         </a:defRPr>
-      </a:lvl4pPr>
-      <a:lvl5pPr marL="2057400" indent="-228600" algn="l" defTabSz="914400" rtl="0" eaLnBrk="1" latinLnBrk="0" hangingPunct="1">
+      </a:lvl2pPr>
+      <a:lvl3pPr marL="857250" indent="-171450" algn="l" defTabSz="685800" rtl="0" eaLnBrk="1" latinLnBrk="0" hangingPunct="1">
         <a:lnSpc>
           <a:spcPct val="90000"/>
         </a:lnSpc>
         <a:spcBef>
-          <a:spcPts val="500"/>
+          <a:spcPts val="375"/>
         </a:spcBef>
         <a:buFont typeface="Wingdings 2" pitchFamily="18" charset="2"/>
         <a:buChar char=""/>
-        <a:defRPr sz="1800" kern="1200">
+        <a:defRPr sz="1500" kern="1200">
+          <a:solidFill>
+            <a:schemeClr val="tx1"/>
+          </a:solidFill>
+          <a:latin typeface="+mn-lt"/>
+          <a:ea typeface="+mn-ea"/>
+          <a:cs typeface="+mn-cs"/>
+        </a:defRPr>
+      </a:lvl3pPr>
+      <a:lvl4pPr marL="1200150" indent="-171450" algn="l" defTabSz="685800" rtl="0" eaLnBrk="1" latinLnBrk="0" hangingPunct="1">
+        <a:lnSpc>
+          <a:spcPct val="90000"/>
+        </a:lnSpc>
+        <a:spcBef>
+          <a:spcPts val="375"/>
+        </a:spcBef>
+        <a:buFont typeface="Wingdings 2" pitchFamily="18" charset="2"/>
+        <a:buChar char=""/>
+        <a:defRPr sz="1350" kern="1200">
+          <a:solidFill>
+            <a:schemeClr val="tx1"/>
+          </a:solidFill>
+          <a:latin typeface="+mn-lt"/>
+          <a:ea typeface="+mn-ea"/>
+          <a:cs typeface="+mn-cs"/>
+        </a:defRPr>
+      </a:lvl4pPr>
+      <a:lvl5pPr marL="1543050" indent="-171450" algn="l" defTabSz="685800" rtl="0" eaLnBrk="1" latinLnBrk="0" hangingPunct="1">
+        <a:lnSpc>
+          <a:spcPct val="90000"/>
+        </a:lnSpc>
+        <a:spcBef>
+          <a:spcPts val="375"/>
+        </a:spcBef>
+        <a:buFont typeface="Wingdings 2" pitchFamily="18" charset="2"/>
+        <a:buChar char=""/>
+        <a:defRPr sz="1350" kern="1200">
           <a:solidFill>
             <a:schemeClr val="tx1"/>
           </a:solidFill>
@@ -5497,13 +5469,13 @@
           <a:cs typeface="+mn-cs"/>
         </a:defRPr>
       </a:lvl5pPr>
-      <a:lvl6pPr marL="2514600" indent="-228600" algn="l" defTabSz="914400" rtl="0" eaLnBrk="1" latinLnBrk="0" hangingPunct="1">
+      <a:lvl6pPr marL="1885950" indent="-171450" algn="l" defTabSz="685800" rtl="0" eaLnBrk="1" latinLnBrk="0" hangingPunct="1">
         <a:spcBef>
           <a:spcPct val="20000"/>
         </a:spcBef>
         <a:buFont typeface="Wingdings 2" pitchFamily="18" charset="2"/>
         <a:buChar char=""/>
-        <a:defRPr sz="1800" kern="1200">
+        <a:defRPr sz="1350" kern="1200">
           <a:solidFill>
             <a:schemeClr val="tx1"/>
           </a:solidFill>
@@ -5512,13 +5484,13 @@
           <a:cs typeface="+mn-cs"/>
         </a:defRPr>
       </a:lvl6pPr>
-      <a:lvl7pPr marL="2971800" indent="-228600" algn="l" defTabSz="914400" rtl="0" eaLnBrk="1" latinLnBrk="0" hangingPunct="1">
+      <a:lvl7pPr marL="2228850" indent="-171450" algn="l" defTabSz="685800" rtl="0" eaLnBrk="1" latinLnBrk="0" hangingPunct="1">
         <a:spcBef>
           <a:spcPct val="20000"/>
         </a:spcBef>
         <a:buFont typeface="Wingdings 2" pitchFamily="18" charset="2"/>
         <a:buChar char=""/>
-        <a:defRPr sz="1800" kern="1200">
+        <a:defRPr sz="1350" kern="1200">
           <a:solidFill>
             <a:schemeClr val="tx1"/>
           </a:solidFill>
@@ -5527,13 +5499,13 @@
           <a:cs typeface="+mn-cs"/>
         </a:defRPr>
       </a:lvl7pPr>
-      <a:lvl8pPr marL="3429000" indent="-228600" algn="l" defTabSz="914400" rtl="0" eaLnBrk="1" latinLnBrk="0" hangingPunct="1">
+      <a:lvl8pPr marL="2571750" indent="-171450" algn="l" defTabSz="685800" rtl="0" eaLnBrk="1" latinLnBrk="0" hangingPunct="1">
         <a:spcBef>
           <a:spcPct val="20000"/>
         </a:spcBef>
         <a:buFont typeface="Wingdings 2" pitchFamily="18" charset="2"/>
         <a:buChar char=""/>
-        <a:defRPr sz="1800" kern="1200">
+        <a:defRPr sz="1350" kern="1200">
           <a:solidFill>
             <a:schemeClr val="tx1"/>
           </a:solidFill>
@@ -5542,13 +5514,13 @@
           <a:cs typeface="+mn-cs"/>
         </a:defRPr>
       </a:lvl8pPr>
-      <a:lvl9pPr marL="3886200" indent="-228600" algn="l" defTabSz="914400" rtl="0" eaLnBrk="1" latinLnBrk="0" hangingPunct="1">
+      <a:lvl9pPr marL="2914650" indent="-171450" algn="l" defTabSz="685800" rtl="0" eaLnBrk="1" latinLnBrk="0" hangingPunct="1">
         <a:spcBef>
           <a:spcPct val="20000"/>
         </a:spcBef>
         <a:buFont typeface="Wingdings 2" pitchFamily="18" charset="2"/>
         <a:buChar char=""/>
-        <a:defRPr sz="1800" kern="1200">
+        <a:defRPr sz="1350" kern="1200">
           <a:solidFill>
             <a:schemeClr val="tx1"/>
           </a:solidFill>
@@ -5562,8 +5534,8 @@
       <a:defPPr>
         <a:defRPr lang="en-US"/>
       </a:defPPr>
-      <a:lvl1pPr marL="0" algn="l" defTabSz="914400" rtl="0" eaLnBrk="1" latinLnBrk="0" hangingPunct="1">
-        <a:defRPr sz="1800" kern="1200">
+      <a:lvl1pPr marL="0" algn="l" defTabSz="685800" rtl="0" eaLnBrk="1" latinLnBrk="0" hangingPunct="1">
+        <a:defRPr sz="1350" kern="1200">
           <a:solidFill>
             <a:schemeClr val="tx1"/>
           </a:solidFill>
@@ -5572,8 +5544,8 @@
           <a:cs typeface="+mn-cs"/>
         </a:defRPr>
       </a:lvl1pPr>
-      <a:lvl2pPr marL="457200" algn="l" defTabSz="914400" rtl="0" eaLnBrk="1" latinLnBrk="0" hangingPunct="1">
-        <a:defRPr sz="1800" kern="1200">
+      <a:lvl2pPr marL="342900" algn="l" defTabSz="685800" rtl="0" eaLnBrk="1" latinLnBrk="0" hangingPunct="1">
+        <a:defRPr sz="1350" kern="1200">
           <a:solidFill>
             <a:schemeClr val="tx1"/>
           </a:solidFill>
@@ -5582,8 +5554,8 @@
           <a:cs typeface="+mn-cs"/>
         </a:defRPr>
       </a:lvl2pPr>
-      <a:lvl3pPr marL="914400" algn="l" defTabSz="914400" rtl="0" eaLnBrk="1" latinLnBrk="0" hangingPunct="1">
-        <a:defRPr sz="1800" kern="1200">
+      <a:lvl3pPr marL="685800" algn="l" defTabSz="685800" rtl="0" eaLnBrk="1" latinLnBrk="0" hangingPunct="1">
+        <a:defRPr sz="1350" kern="1200">
           <a:solidFill>
             <a:schemeClr val="tx1"/>
           </a:solidFill>
@@ -5592,8 +5564,8 @@
           <a:cs typeface="+mn-cs"/>
         </a:defRPr>
       </a:lvl3pPr>
-      <a:lvl4pPr marL="1371600" algn="l" defTabSz="914400" rtl="0" eaLnBrk="1" latinLnBrk="0" hangingPunct="1">
-        <a:defRPr sz="1800" kern="1200">
+      <a:lvl4pPr marL="1028700" algn="l" defTabSz="685800" rtl="0" eaLnBrk="1" latinLnBrk="0" hangingPunct="1">
+        <a:defRPr sz="1350" kern="1200">
           <a:solidFill>
             <a:schemeClr val="tx1"/>
           </a:solidFill>
@@ -5602,8 +5574,8 @@
           <a:cs typeface="+mn-cs"/>
         </a:defRPr>
       </a:lvl4pPr>
-      <a:lvl5pPr marL="1828800" algn="l" defTabSz="914400" rtl="0" eaLnBrk="1" latinLnBrk="0" hangingPunct="1">
-        <a:defRPr sz="1800" kern="1200">
+      <a:lvl5pPr marL="1371600" algn="l" defTabSz="685800" rtl="0" eaLnBrk="1" latinLnBrk="0" hangingPunct="1">
+        <a:defRPr sz="1350" kern="1200">
           <a:solidFill>
             <a:schemeClr val="tx1"/>
           </a:solidFill>
@@ -5612,8 +5584,8 @@
           <a:cs typeface="+mn-cs"/>
         </a:defRPr>
       </a:lvl5pPr>
-      <a:lvl6pPr marL="2286000" algn="l" defTabSz="914400" rtl="0" eaLnBrk="1" latinLnBrk="0" hangingPunct="1">
-        <a:defRPr sz="1800" kern="1200">
+      <a:lvl6pPr marL="1714500" algn="l" defTabSz="685800" rtl="0" eaLnBrk="1" latinLnBrk="0" hangingPunct="1">
+        <a:defRPr sz="1350" kern="1200">
           <a:solidFill>
             <a:schemeClr val="tx1"/>
           </a:solidFill>
@@ -5622,8 +5594,8 @@
           <a:cs typeface="+mn-cs"/>
         </a:defRPr>
       </a:lvl6pPr>
-      <a:lvl7pPr marL="2743200" algn="l" defTabSz="914400" rtl="0" eaLnBrk="1" latinLnBrk="0" hangingPunct="1">
-        <a:defRPr sz="1800" kern="1200">
+      <a:lvl7pPr marL="2057400" algn="l" defTabSz="685800" rtl="0" eaLnBrk="1" latinLnBrk="0" hangingPunct="1">
+        <a:defRPr sz="1350" kern="1200">
           <a:solidFill>
             <a:schemeClr val="tx1"/>
           </a:solidFill>
@@ -5632,8 +5604,8 @@
           <a:cs typeface="+mn-cs"/>
         </a:defRPr>
       </a:lvl7pPr>
-      <a:lvl8pPr marL="3200400" algn="l" defTabSz="914400" rtl="0" eaLnBrk="1" latinLnBrk="0" hangingPunct="1">
-        <a:defRPr sz="1800" kern="1200">
+      <a:lvl8pPr marL="2400300" algn="l" defTabSz="685800" rtl="0" eaLnBrk="1" latinLnBrk="0" hangingPunct="1">
+        <a:defRPr sz="1350" kern="1200">
           <a:solidFill>
             <a:schemeClr val="tx1"/>
           </a:solidFill>
@@ -5642,8 +5614,8 @@
           <a:cs typeface="+mn-cs"/>
         </a:defRPr>
       </a:lvl8pPr>
-      <a:lvl9pPr marL="3657600" algn="l" defTabSz="914400" rtl="0" eaLnBrk="1" latinLnBrk="0" hangingPunct="1">
-        <a:defRPr sz="1800" kern="1200">
+      <a:lvl9pPr marL="2743200" algn="l" defTabSz="685800" rtl="0" eaLnBrk="1" latinLnBrk="0" hangingPunct="1">
+        <a:defRPr sz="1350" kern="1200">
           <a:solidFill>
             <a:schemeClr val="tx1"/>
           </a:solidFill>
@@ -5687,8 +5659,8 @@
         </p:nvSpPr>
         <p:spPr>
           <a:xfrm>
-            <a:off x="11292840" y="0"/>
-            <a:ext cx="914400" cy="6858000"/>
+            <a:off x="8418195" y="0"/>
+            <a:ext cx="731520" cy="6858000"/>
           </a:xfrm>
           <a:prstGeom prst="rect">
             <a:avLst/>
@@ -5731,8 +5703,8 @@
         </p:nvSpPr>
         <p:spPr>
           <a:xfrm>
-            <a:off x="1261872" y="365760"/>
-            <a:ext cx="9692640" cy="1325562"/>
+            <a:off x="946404" y="365760"/>
+            <a:ext cx="7269480" cy="1325562"/>
           </a:xfrm>
           <a:prstGeom prst="rect">
             <a:avLst/>
@@ -5764,8 +5736,8 @@
         </p:nvSpPr>
         <p:spPr>
           <a:xfrm>
-            <a:off x="1261872" y="1828800"/>
-            <a:ext cx="8595360" cy="4351337"/>
+            <a:off x="946404" y="1828801"/>
+            <a:ext cx="6446520" cy="4351337"/>
           </a:xfrm>
           <a:prstGeom prst="rect">
             <a:avLst/>
@@ -5826,8 +5798,8 @@
         </p:nvSpPr>
         <p:spPr>
           <a:xfrm rot="16200000">
-            <a:off x="10797542" y="998537"/>
-            <a:ext cx="1904999" cy="365125"/>
+            <a:off x="7831456" y="1044178"/>
+            <a:ext cx="1904999" cy="273844"/>
           </a:xfrm>
           <a:prstGeom prst="rect">
             <a:avLst/>
@@ -5850,7 +5822,7 @@
           <a:p>
             <a:fld id="{5586B75A-687E-405C-8A0B-8D00578BA2C3}" type="datetime1">
               <a:rPr lang="en-US" smtClean="0"/>
-              <a:t>12/13/2016</a:t>
+              <a:t>12/14/2016</a:t>
             </a:fld>
             <a:endParaRPr lang="en-US"/>
           </a:p>
@@ -5868,8 +5840,8 @@
         </p:nvSpPr>
         <p:spPr>
           <a:xfrm rot="16200000">
-            <a:off x="9959341" y="4046537"/>
-            <a:ext cx="3581400" cy="365125"/>
+            <a:off x="6993255" y="4092178"/>
+            <a:ext cx="3581400" cy="273844"/>
           </a:xfrm>
           <a:prstGeom prst="rect">
             <a:avLst/>
@@ -5906,20 +5878,20 @@
         </p:nvSpPr>
         <p:spPr>
           <a:xfrm>
-            <a:off x="11292840" y="6172200"/>
-            <a:ext cx="914400" cy="593725"/>
+            <a:off x="8441055" y="6172201"/>
+            <a:ext cx="685800" cy="593725"/>
           </a:xfrm>
           <a:prstGeom prst="rect">
             <a:avLst/>
           </a:prstGeom>
         </p:spPr>
         <p:txBody>
-          <a:bodyPr vert="horz" lIns="45720" tIns="45720" rIns="45720" bIns="45720" rtlCol="0" anchor="ctr">
+          <a:bodyPr vert="horz" lIns="27432" tIns="45720" rIns="27432" bIns="45720" rtlCol="0" anchor="ctr">
             <a:normAutofit/>
           </a:bodyPr>
           <a:lstStyle>
             <a:lvl1pPr algn="ctr">
-              <a:defRPr sz="3600">
+              <a:defRPr sz="3200">
                 <a:solidFill>
                   <a:schemeClr val="tx2">
                     <a:lumMod val="60000"/>
@@ -5941,23 +5913,23 @@
     </p:spTree>
     <p:extLst>
       <p:ext uri="{BB962C8B-B14F-4D97-AF65-F5344CB8AC3E}">
-        <p14:creationId xmlns:p14="http://schemas.microsoft.com/office/powerpoint/2010/main" val="3096461945"/>
+        <p14:creationId xmlns:p14="http://schemas.microsoft.com/office/powerpoint/2010/main" val="950514195"/>
       </p:ext>
     </p:extLst>
   </p:cSld>
   <p:clrMap bg1="lt1" tx1="dk1" bg2="lt2" tx2="dk2" accent1="accent1" accent2="accent2" accent3="accent3" accent4="accent4" accent5="accent5" accent6="accent6" hlink="hlink" folHlink="folHlink"/>
   <p:sldLayoutIdLst>
-    <p:sldLayoutId id="2147483941" r:id="rId1"/>
-    <p:sldLayoutId id="2147483942" r:id="rId2"/>
-    <p:sldLayoutId id="2147483943" r:id="rId3"/>
-    <p:sldLayoutId id="2147483944" r:id="rId4"/>
-    <p:sldLayoutId id="2147483945" r:id="rId5"/>
-    <p:sldLayoutId id="2147483946" r:id="rId6"/>
-    <p:sldLayoutId id="2147483947" r:id="rId7"/>
-    <p:sldLayoutId id="2147483948" r:id="rId8"/>
-    <p:sldLayoutId id="2147483949" r:id="rId9"/>
-    <p:sldLayoutId id="2147483950" r:id="rId10"/>
-    <p:sldLayoutId id="2147483951" r:id="rId11"/>
+    <p:sldLayoutId id="2147483953" r:id="rId1"/>
+    <p:sldLayoutId id="2147483954" r:id="rId2"/>
+    <p:sldLayoutId id="2147483955" r:id="rId3"/>
+    <p:sldLayoutId id="2147483956" r:id="rId4"/>
+    <p:sldLayoutId id="2147483957" r:id="rId5"/>
+    <p:sldLayoutId id="2147483958" r:id="rId6"/>
+    <p:sldLayoutId id="2147483959" r:id="rId7"/>
+    <p:sldLayoutId id="2147483960" r:id="rId8"/>
+    <p:sldLayoutId id="2147483961" r:id="rId9"/>
+    <p:sldLayoutId id="2147483962" r:id="rId10"/>
+    <p:sldLayoutId id="2147483963" r:id="rId11"/>
   </p:sldLayoutIdLst>
   <p:hf sldNum="0" hdr="0" ftr="0" dt="0"/>
   <p:txStyles>
@@ -5970,7 +5942,7 @@
           <a:spcPct val="0"/>
         </a:spcBef>
         <a:buNone/>
-        <a:defRPr sz="4400" kern="1200" spc="-50" baseline="0">
+        <a:defRPr sz="4000" kern="1200" spc="-50" baseline="0">
           <a:solidFill>
             <a:schemeClr val="tx1"/>
           </a:solidFill>
@@ -6351,12 +6323,14 @@
         </p:nvSpPr>
         <p:spPr>
           <a:xfrm>
-            <a:off x="1426628" y="601361"/>
-            <a:ext cx="9418320" cy="1258330"/>
+            <a:off x="1069971" y="1308271"/>
+            <a:ext cx="7063740" cy="943748"/>
           </a:xfrm>
         </p:spPr>
         <p:txBody>
-          <a:bodyPr/>
+          <a:bodyPr>
+            <a:normAutofit fontScale="90000"/>
+          </a:bodyPr>
           <a:lstStyle/>
           <a:p>
             <a:r>
@@ -6379,8 +6353,8 @@
         </p:nvSpPr>
         <p:spPr>
           <a:xfrm>
-            <a:off x="1494014" y="2380734"/>
-            <a:ext cx="9418320" cy="552759"/>
+            <a:off x="1120511" y="2642801"/>
+            <a:ext cx="7063740" cy="414569"/>
           </a:xfrm>
         </p:spPr>
         <p:txBody>
@@ -6418,8 +6392,8 @@
         </p:blipFill>
         <p:spPr>
           <a:xfrm>
-            <a:off x="5524500" y="3314700"/>
-            <a:ext cx="6667500" cy="3543300"/>
+            <a:off x="4143375" y="3343275"/>
+            <a:ext cx="5000625" cy="2657475"/>
           </a:xfrm>
           <a:prstGeom prst="rect">
             <a:avLst/>
@@ -6481,10 +6455,10 @@
           <a:lstStyle/>
           <a:p>
             <a:r>
-              <a:rPr lang="fr-CA" sz="4000" dirty="0" smtClean="0"/>
+              <a:rPr lang="fr-CA" sz="3000" dirty="0"/>
               <a:t>Gestion des artistes(Sommaire)</a:t>
             </a:r>
-            <a:endParaRPr lang="fr-CA" sz="4000" dirty="0"/>
+            <a:endParaRPr lang="fr-CA" sz="3000" dirty="0"/>
           </a:p>
         </p:txBody>
       </p:sp>
@@ -6512,8 +6486,8 @@
         </p:blipFill>
         <p:spPr>
           <a:xfrm>
-            <a:off x="1138496" y="2020029"/>
-            <a:ext cx="9291959" cy="3622890"/>
+            <a:off x="853873" y="2372272"/>
+            <a:ext cx="6968969" cy="2717168"/>
           </a:xfrm>
         </p:spPr>
       </p:pic>
@@ -6572,14 +6546,14 @@
           <a:lstStyle/>
           <a:p>
             <a:r>
-              <a:rPr lang="fr-CA" sz="4000" dirty="0"/>
+              <a:rPr lang="fr-CA" sz="3000" dirty="0"/>
               <a:t>Gestion des </a:t>
             </a:r>
             <a:r>
-              <a:rPr lang="fr-CA" sz="4000" dirty="0" smtClean="0"/>
+              <a:rPr lang="fr-CA" sz="3000" dirty="0"/>
               <a:t>artistes(Détail)</a:t>
             </a:r>
-            <a:endParaRPr lang="fr-CA" sz="4000" dirty="0"/>
+            <a:endParaRPr lang="fr-CA" sz="3000" dirty="0"/>
           </a:p>
         </p:txBody>
       </p:sp>
@@ -6607,8 +6581,8 @@
         </p:blipFill>
         <p:spPr>
           <a:xfrm>
-            <a:off x="2257168" y="1828799"/>
-            <a:ext cx="5994453" cy="4438257"/>
+            <a:off x="1692876" y="2228850"/>
+            <a:ext cx="4495840" cy="3328693"/>
           </a:xfrm>
         </p:spPr>
       </p:pic>
@@ -6667,10 +6641,10 @@
           <a:lstStyle/>
           <a:p>
             <a:r>
-              <a:rPr lang="fr-CA" sz="4000" dirty="0" smtClean="0"/>
+              <a:rPr lang="fr-CA" sz="3000" dirty="0"/>
               <a:t>Gestion des engagements</a:t>
             </a:r>
-            <a:endParaRPr lang="fr-CA" sz="4000" dirty="0"/>
+            <a:endParaRPr lang="fr-CA" sz="3000" dirty="0"/>
           </a:p>
         </p:txBody>
       </p:sp>
@@ -6698,8 +6672,8 @@
         </p:blipFill>
         <p:spPr>
           <a:xfrm>
-            <a:off x="2003540" y="1828800"/>
-            <a:ext cx="7111770" cy="4351338"/>
+            <a:off x="1502655" y="2228850"/>
+            <a:ext cx="5333828" cy="3263504"/>
           </a:xfrm>
         </p:spPr>
       </p:pic>
@@ -6758,10 +6732,10 @@
           <a:lstStyle/>
           <a:p>
             <a:r>
-              <a:rPr lang="fr-CA" sz="4000" dirty="0" smtClean="0"/>
+              <a:rPr lang="fr-CA" sz="3000" dirty="0"/>
               <a:t>Gestion des exigences</a:t>
             </a:r>
-            <a:endParaRPr lang="fr-CA" sz="4000" dirty="0"/>
+            <a:endParaRPr lang="fr-CA" sz="3000" dirty="0"/>
           </a:p>
         </p:txBody>
       </p:sp>
@@ -6789,8 +6763,8 @@
         </p:blipFill>
         <p:spPr>
           <a:xfrm>
-            <a:off x="1734604" y="1956308"/>
-            <a:ext cx="7649643" cy="4096322"/>
+            <a:off x="1300954" y="2324481"/>
+            <a:ext cx="5737232" cy="3072242"/>
           </a:xfrm>
         </p:spPr>
       </p:pic>
@@ -6849,10 +6823,10 @@
           <a:lstStyle/>
           <a:p>
             <a:r>
-              <a:rPr lang="fr-CA" sz="4000" dirty="0" smtClean="0"/>
+              <a:rPr lang="fr-CA" sz="3000" dirty="0"/>
               <a:t>Gestion des contrats(Sommaire)</a:t>
             </a:r>
-            <a:endParaRPr lang="fr-CA" sz="4000" dirty="0"/>
+            <a:endParaRPr lang="fr-CA" sz="3000" dirty="0"/>
           </a:p>
         </p:txBody>
       </p:sp>
@@ -6880,8 +6854,8 @@
         </p:blipFill>
         <p:spPr>
           <a:xfrm>
-            <a:off x="1113782" y="2202352"/>
-            <a:ext cx="8594725" cy="3292286"/>
+            <a:off x="835337" y="2509014"/>
+            <a:ext cx="6446044" cy="2469215"/>
           </a:xfrm>
         </p:spPr>
       </p:pic>
@@ -6940,14 +6914,14 @@
           <a:lstStyle/>
           <a:p>
             <a:r>
-              <a:rPr lang="fr-CA" sz="4000" dirty="0"/>
+              <a:rPr lang="fr-CA" sz="3000" dirty="0"/>
               <a:t>Gestion des </a:t>
             </a:r>
             <a:r>
-              <a:rPr lang="fr-CA" sz="4000" dirty="0" smtClean="0"/>
+              <a:rPr lang="fr-CA" sz="3000" dirty="0"/>
               <a:t>contrats(Détail)</a:t>
             </a:r>
-            <a:endParaRPr lang="fr-CA" sz="4000" dirty="0"/>
+            <a:endParaRPr lang="fr-CA" sz="3000" dirty="0"/>
           </a:p>
         </p:txBody>
       </p:sp>
@@ -6962,7 +6936,7 @@
           </p:nvPr>
         </p:nvPicPr>
         <p:blipFill>
-          <a:blip r:embed="rId2">
+          <a:blip r:embed="rId2" cstate="print">
             <a:extLst>
               <a:ext uri="{28A0092B-C50C-407E-A947-70E740481C1C}">
                 <a14:useLocalDpi xmlns:a14="http://schemas.microsoft.com/office/drawing/2010/main" val="0"/>
@@ -6975,8 +6949,8 @@
         </p:blipFill>
         <p:spPr>
           <a:xfrm>
-            <a:off x="1056117" y="1909618"/>
-            <a:ext cx="8594725" cy="3510879"/>
+            <a:off x="792088" y="2289464"/>
+            <a:ext cx="6446044" cy="2633159"/>
           </a:xfrm>
         </p:spPr>
       </p:pic>
@@ -7027,47 +7001,52 @@
             <p:ph type="title"/>
           </p:nvPr>
         </p:nvSpPr>
-        <p:spPr/>
+        <p:spPr>
+          <a:xfrm>
+            <a:off x="946404" y="1029730"/>
+            <a:ext cx="7269480" cy="661592"/>
+          </a:xfrm>
+        </p:spPr>
         <p:txBody>
           <a:bodyPr>
-            <a:normAutofit fontScale="90000"/>
+            <a:noAutofit/>
           </a:bodyPr>
           <a:lstStyle/>
           <a:p>
             <a:r>
-              <a:rPr lang="fr-CA" dirty="0" smtClean="0"/>
+              <a:rPr lang="fr-CA" sz="3000" dirty="0" smtClean="0"/>
               <a:t/>
             </a:r>
             <a:br>
-              <a:rPr lang="fr-CA" dirty="0" smtClean="0"/>
+              <a:rPr lang="fr-CA" sz="3000" dirty="0" smtClean="0"/>
             </a:br>
             <a:r>
-              <a:rPr lang="fr-CA" dirty="0"/>
+              <a:rPr lang="fr-CA" sz="3000" dirty="0"/>
               <a:t/>
             </a:r>
             <a:br>
-              <a:rPr lang="fr-CA" dirty="0"/>
+              <a:rPr lang="fr-CA" sz="3000" dirty="0"/>
             </a:br>
             <a:r>
-              <a:rPr lang="fr-CA" dirty="0" smtClean="0"/>
+              <a:rPr lang="fr-CA" sz="3000" dirty="0" smtClean="0"/>
               <a:t/>
             </a:r>
             <a:br>
-              <a:rPr lang="fr-CA" dirty="0" smtClean="0"/>
+              <a:rPr lang="fr-CA" sz="3000" dirty="0" smtClean="0"/>
             </a:br>
             <a:r>
-              <a:rPr lang="fr-CA" dirty="0" smtClean="0"/>
+              <a:rPr lang="fr-CA" sz="3000" dirty="0" smtClean="0"/>
               <a:t>Démonstration </a:t>
             </a:r>
             <a:r>
-              <a:rPr lang="fr-CA" dirty="0"/>
+              <a:rPr lang="fr-CA" sz="3000" dirty="0"/>
               <a:t>de l’application </a:t>
             </a:r>
             <a:r>
-              <a:rPr lang="fr-CA" dirty="0" smtClean="0"/>
+              <a:rPr lang="fr-CA" sz="3000" dirty="0" smtClean="0"/>
               <a:t>Web</a:t>
             </a:r>
-            <a:endParaRPr lang="fr-CA" dirty="0"/>
+            <a:endParaRPr lang="fr-CA" sz="3000" dirty="0"/>
           </a:p>
         </p:txBody>
       </p:sp>
@@ -7082,7 +7061,7 @@
           </p:nvPr>
         </p:nvPicPr>
         <p:blipFill>
-          <a:blip r:embed="rId2">
+          <a:blip r:embed="rId2" cstate="print">
             <a:extLst>
               <a:ext uri="{28A0092B-C50C-407E-A947-70E740481C1C}">
                 <a14:useLocalDpi xmlns:a14="http://schemas.microsoft.com/office/drawing/2010/main" val="0"/>
@@ -7095,8 +7074,8 @@
         </p:blipFill>
         <p:spPr>
           <a:xfrm>
-            <a:off x="1262063" y="2170505"/>
-            <a:ext cx="8850805" cy="3777214"/>
+            <a:off x="946548" y="2493367"/>
+            <a:ext cx="6638104" cy="2832911"/>
           </a:xfrm>
           <a:ln>
             <a:solidFill>
@@ -7160,10 +7139,10 @@
           <a:lstStyle/>
           <a:p>
             <a:r>
-              <a:rPr lang="fr-CA" sz="4000" dirty="0" smtClean="0"/>
+              <a:rPr lang="fr-CA" sz="3000" dirty="0"/>
               <a:t>Création d’un évènement au complet</a:t>
             </a:r>
-            <a:endParaRPr lang="fr-CA" sz="4000" dirty="0"/>
+            <a:endParaRPr lang="fr-CA" sz="3000" dirty="0"/>
           </a:p>
         </p:txBody>
       </p:sp>
@@ -7191,8 +7170,8 @@
         </p:blipFill>
         <p:spPr>
           <a:xfrm>
-            <a:off x="1506538" y="2504281"/>
-            <a:ext cx="8105775" cy="3000375"/>
+            <a:off x="1129904" y="2735461"/>
+            <a:ext cx="6079331" cy="2250281"/>
           </a:xfrm>
         </p:spPr>
       </p:pic>
@@ -7251,10 +7230,10 @@
           <a:lstStyle/>
           <a:p>
             <a:r>
-              <a:rPr lang="fr-CA" sz="4000" dirty="0" smtClean="0"/>
+              <a:rPr lang="fr-CA" sz="3000" dirty="0"/>
               <a:t>Conclusion</a:t>
             </a:r>
-            <a:endParaRPr lang="fr-CA" sz="4000" dirty="0"/>
+            <a:endParaRPr lang="fr-CA" sz="3000" dirty="0"/>
           </a:p>
         </p:txBody>
       </p:sp>
@@ -7275,36 +7254,27 @@
           <a:p>
             <a:r>
               <a:rPr lang="fr-CA" dirty="0" smtClean="0"/>
-              <a:t>Bons coups de l’équipe</a:t>
+              <a:t>Résumé de l’application </a:t>
             </a:r>
           </a:p>
           <a:p>
             <a:r>
               <a:rPr lang="fr-CA" dirty="0" smtClean="0"/>
-              <a:t>Erreurs de l’équipe</a:t>
-            </a:r>
-          </a:p>
-          <a:p>
+              <a:t>Fonctionnement de de </a:t>
+            </a:r>
             <a:r>
               <a:rPr lang="fr-CA" dirty="0" smtClean="0"/>
-              <a:t>Bon coups individuels</a:t>
-            </a:r>
-            <a:endParaRPr lang="fr-CA" dirty="0"/>
-          </a:p>
-          <a:p>
-            <a:r>
-              <a:rPr lang="fr-CA" dirty="0"/>
-              <a:t>Erreurs </a:t>
-            </a:r>
+              <a:t>l’équipe</a:t>
+            </a:r>
+          </a:p>
+          <a:p>
             <a:r>
               <a:rPr lang="fr-CA" dirty="0" smtClean="0"/>
-              <a:t>individuels</a:t>
-            </a:r>
-          </a:p>
-          <a:p>
+              <a:t>Recommandations </a:t>
+            </a:r>
             <a:r>
               <a:rPr lang="fr-CA" dirty="0" smtClean="0"/>
-              <a:t>Recommandations et suggestions </a:t>
+              <a:t>et suggestions </a:t>
             </a:r>
             <a:endParaRPr lang="fr-CA" dirty="0"/>
           </a:p>
@@ -7363,10 +7333,10 @@
           <a:lstStyle/>
           <a:p>
             <a:r>
-              <a:rPr lang="fr-CA" sz="4000" dirty="0" smtClean="0"/>
-              <a:t>Contenu</a:t>
-            </a:r>
-            <a:endParaRPr lang="fr-CA" sz="4000" dirty="0"/>
+              <a:rPr lang="fr-CA" sz="3000" dirty="0" smtClean="0"/>
+              <a:t>Contenu de la présentation</a:t>
+            </a:r>
+            <a:endParaRPr lang="fr-CA" sz="3000" dirty="0"/>
           </a:p>
         </p:txBody>
       </p:sp>
@@ -7389,16 +7359,18 @@
               <a:rPr lang="fr-CA" dirty="0" smtClean="0"/>
               <a:t>Introduction</a:t>
             </a:r>
+            <a:endParaRPr lang="fr-CA" dirty="0" smtClean="0"/>
           </a:p>
           <a:p>
             <a:r>
               <a:rPr lang="fr-CA" dirty="0" smtClean="0"/>
-              <a:t>Présentation de l’application </a:t>
-            </a:r>
-            <a:r>
-              <a:rPr lang="fr-CA" dirty="0"/>
-              <a:t>console</a:t>
-            </a:r>
+              <a:t>Présentation </a:t>
+            </a:r>
+            <a:r>
+              <a:rPr lang="fr-CA" dirty="0" smtClean="0"/>
+              <a:t>de la console d’administration</a:t>
+            </a:r>
+            <a:endParaRPr lang="fr-CA" dirty="0"/>
           </a:p>
           <a:p>
             <a:r>
@@ -7476,10 +7448,10 @@
           <a:lstStyle/>
           <a:p>
             <a:r>
-              <a:rPr lang="fr-CA" sz="4000" dirty="0" smtClean="0"/>
+              <a:rPr lang="fr-CA" sz="3000" dirty="0"/>
               <a:t>Introduction</a:t>
             </a:r>
-            <a:endParaRPr lang="fr-CA" sz="4000" dirty="0"/>
+            <a:endParaRPr lang="fr-CA" sz="3000" dirty="0"/>
           </a:p>
         </p:txBody>
       </p:sp>
@@ -7512,11 +7484,7 @@
           <a:p>
             <a:r>
               <a:rPr lang="fr-CA" dirty="0" smtClean="0"/>
-              <a:t>Objectifs du </a:t>
-            </a:r>
-            <a:r>
-              <a:rPr lang="fr-CA" dirty="0" smtClean="0"/>
-              <a:t>projet</a:t>
+              <a:t>Objectifs du projet</a:t>
             </a:r>
           </a:p>
         </p:txBody>
@@ -7576,10 +7544,10 @@
           <a:lstStyle/>
           <a:p>
             <a:r>
-              <a:rPr lang="fr-CA" sz="4000" dirty="0" smtClean="0"/>
+              <a:rPr lang="fr-CA" sz="3000" dirty="0"/>
               <a:t>Application console</a:t>
             </a:r>
-            <a:endParaRPr lang="fr-CA" sz="4000" dirty="0"/>
+            <a:endParaRPr lang="fr-CA" sz="3000" dirty="0"/>
           </a:p>
         </p:txBody>
       </p:sp>
@@ -7627,8 +7595,8 @@
         </p:blipFill>
         <p:spPr>
           <a:xfrm>
-            <a:off x="1518348" y="1828800"/>
-            <a:ext cx="8428654" cy="4102443"/>
+            <a:off x="1138761" y="2228851"/>
+            <a:ext cx="6321491" cy="3076832"/>
           </a:xfrm>
           <a:prstGeom prst="rect">
             <a:avLst/>
@@ -7688,10 +7656,10 @@
           <a:lstStyle/>
           <a:p>
             <a:r>
-              <a:rPr lang="fr-CA" sz="4000" dirty="0" smtClean="0"/>
+              <a:rPr lang="fr-CA" sz="3000" dirty="0"/>
               <a:t>Menu</a:t>
             </a:r>
-            <a:endParaRPr lang="fr-CA" sz="4000" dirty="0"/>
+            <a:endParaRPr lang="fr-CA" sz="3000" dirty="0"/>
           </a:p>
         </p:txBody>
       </p:sp>
@@ -7719,8 +7687,8 @@
         </p:blipFill>
         <p:spPr>
           <a:xfrm>
-            <a:off x="788178" y="2184940"/>
-            <a:ext cx="8622634" cy="3705114"/>
+            <a:off x="591133" y="2495955"/>
+            <a:ext cx="6466976" cy="2778836"/>
           </a:xfrm>
           <a:prstGeom prst="rect">
             <a:avLst/>
@@ -7782,14 +7750,22 @@
           <a:lstStyle/>
           <a:p>
             <a:r>
-              <a:rPr lang="fr-CA" sz="4000" dirty="0"/>
+              <a:rPr lang="fr-CA" sz="3000" dirty="0"/>
               <a:t>A</a:t>
             </a:r>
             <a:r>
-              <a:rPr lang="fr-CA" sz="4000" dirty="0" smtClean="0"/>
-              <a:t>gences de publicité(Sommaire)</a:t>
-            </a:r>
-            <a:endParaRPr lang="fr-CA" sz="4000" dirty="0"/>
+              <a:rPr lang="fr-CA" sz="3000" dirty="0"/>
+              <a:t>gences </a:t>
+            </a:r>
+            <a:r>
+              <a:rPr lang="fr-CA" sz="3000" dirty="0" smtClean="0"/>
+              <a:t>d’artistes(Sommaire</a:t>
+            </a:r>
+            <a:r>
+              <a:rPr lang="fr-CA" sz="3000" dirty="0"/>
+              <a:t>)</a:t>
+            </a:r>
+            <a:endParaRPr lang="fr-CA" sz="3000" dirty="0"/>
           </a:p>
         </p:txBody>
       </p:sp>
@@ -7817,8 +7793,8 @@
         </p:blipFill>
         <p:spPr>
           <a:xfrm>
-            <a:off x="767792" y="1955528"/>
-            <a:ext cx="9718975" cy="3787970"/>
+            <a:off x="575845" y="2323896"/>
+            <a:ext cx="7289231" cy="2840978"/>
           </a:xfrm>
         </p:spPr>
       </p:pic>
@@ -7883,12 +7859,12 @@
               <a:t>gences </a:t>
             </a:r>
             <a:r>
-              <a:rPr lang="fr-CA" dirty="0"/>
-              <a:t>de </a:t>
-            </a:r>
-            <a:r>
               <a:rPr lang="fr-CA" dirty="0" smtClean="0"/>
-              <a:t>publicité(Détail)</a:t>
+              <a:t>d’artistes(Détail</a:t>
+            </a:r>
+            <a:r>
+              <a:rPr lang="fr-CA" dirty="0" smtClean="0"/>
+              <a:t>)</a:t>
             </a:r>
             <a:endParaRPr lang="fr-CA" dirty="0"/>
           </a:p>
@@ -7918,8 +7894,8 @@
         </p:blipFill>
         <p:spPr>
           <a:xfrm>
-            <a:off x="408944" y="2349542"/>
-            <a:ext cx="10300964" cy="3828836"/>
+            <a:off x="946150" y="2968736"/>
+            <a:ext cx="6446838" cy="2071465"/>
           </a:xfrm>
         </p:spPr>
       </p:pic>
@@ -7972,8 +7948,8 @@
         </p:nvSpPr>
         <p:spPr>
           <a:xfrm>
-            <a:off x="774357" y="365760"/>
-            <a:ext cx="10180155" cy="1325562"/>
+            <a:off x="580768" y="1131570"/>
+            <a:ext cx="7635116" cy="994172"/>
           </a:xfrm>
         </p:spPr>
         <p:txBody>
@@ -7983,10 +7959,10 @@
           <a:lstStyle/>
           <a:p>
             <a:r>
-              <a:rPr lang="fr-CA" sz="4000" dirty="0" smtClean="0"/>
+              <a:rPr lang="fr-CA" sz="3000" dirty="0"/>
               <a:t>Gestion des catégorie d’artiste(Sommaire)</a:t>
             </a:r>
-            <a:endParaRPr lang="fr-CA" sz="4000" dirty="0"/>
+            <a:endParaRPr lang="fr-CA" sz="3000" dirty="0"/>
           </a:p>
         </p:txBody>
       </p:sp>
@@ -8014,8 +7990,8 @@
         </p:blipFill>
         <p:spPr>
           <a:xfrm>
-            <a:off x="1005017" y="2046143"/>
-            <a:ext cx="9260212" cy="3609001"/>
+            <a:off x="753763" y="2391858"/>
+            <a:ext cx="6945159" cy="2706751"/>
           </a:xfrm>
         </p:spPr>
       </p:pic>
@@ -8074,14 +8050,14 @@
           <a:lstStyle/>
           <a:p>
             <a:r>
-              <a:rPr lang="fr-CA" sz="4000" dirty="0"/>
+              <a:rPr lang="fr-CA" sz="3000" dirty="0"/>
               <a:t>Gestion des catégorie </a:t>
             </a:r>
             <a:r>
-              <a:rPr lang="fr-CA" sz="4000" dirty="0" smtClean="0"/>
+              <a:rPr lang="fr-CA" sz="3000" dirty="0"/>
               <a:t>d’artiste(Détail)</a:t>
             </a:r>
-            <a:endParaRPr lang="fr-CA" sz="4000" dirty="0"/>
+            <a:endParaRPr lang="fr-CA" sz="3000" dirty="0"/>
           </a:p>
         </p:txBody>
       </p:sp>
@@ -8109,8 +8085,8 @@
         </p:blipFill>
         <p:spPr>
           <a:xfrm>
-            <a:off x="1891788" y="1832466"/>
-            <a:ext cx="7335274" cy="4344006"/>
+            <a:off x="1418841" y="2231599"/>
+            <a:ext cx="5501456" cy="3258005"/>
           </a:xfrm>
         </p:spPr>
       </p:pic>

</xml_diff>

<commit_message>
Powerpoint mise en page
</commit_message>
<xml_diff>
--- a/Gestion de projet/Présentations/PowerPoint.pptx
+++ b/Gestion de projet/Présentations/PowerPoint.pptx
@@ -13,17 +13,20 @@
     <p:sldId id="260" r:id="rId7"/>
     <p:sldId id="261" r:id="rId8"/>
     <p:sldId id="262" r:id="rId9"/>
-    <p:sldId id="263" r:id="rId10"/>
-    <p:sldId id="264" r:id="rId11"/>
-    <p:sldId id="265" r:id="rId12"/>
-    <p:sldId id="266" r:id="rId13"/>
-    <p:sldId id="267" r:id="rId14"/>
-    <p:sldId id="268" r:id="rId15"/>
-    <p:sldId id="269" r:id="rId16"/>
-    <p:sldId id="270" r:id="rId17"/>
-    <p:sldId id="271" r:id="rId18"/>
-    <p:sldId id="272" r:id="rId19"/>
-    <p:sldId id="273" r:id="rId20"/>
+    <p:sldId id="274" r:id="rId10"/>
+    <p:sldId id="263" r:id="rId11"/>
+    <p:sldId id="264" r:id="rId12"/>
+    <p:sldId id="265" r:id="rId13"/>
+    <p:sldId id="266" r:id="rId14"/>
+    <p:sldId id="267" r:id="rId15"/>
+    <p:sldId id="268" r:id="rId16"/>
+    <p:sldId id="269" r:id="rId17"/>
+    <p:sldId id="270" r:id="rId18"/>
+    <p:sldId id="271" r:id="rId19"/>
+    <p:sldId id="272" r:id="rId20"/>
+    <p:sldId id="273" r:id="rId21"/>
+    <p:sldId id="275" r:id="rId22"/>
+    <p:sldId id="276" r:id="rId23"/>
   </p:sldIdLst>
   <p:sldSz cx="9144000" cy="6858000" type="screen4x3"/>
   <p:notesSz cx="6858000" cy="9144000"/>
@@ -6323,8 +6326,8 @@
         </p:nvSpPr>
         <p:spPr>
           <a:xfrm>
-            <a:off x="1069971" y="1308271"/>
-            <a:ext cx="7063740" cy="943748"/>
+            <a:off x="0" y="1308271"/>
+            <a:ext cx="9143999" cy="943748"/>
           </a:xfrm>
         </p:spPr>
         <p:txBody>
@@ -6333,9 +6336,17 @@
           </a:bodyPr>
           <a:lstStyle/>
           <a:p>
-            <a:r>
-              <a:rPr lang="fr-CA" dirty="0" smtClean="0"/>
-              <a:t>Projet de fin études</a:t>
+            <a:pPr algn="ctr"/>
+            <a:r>
+              <a:rPr lang="fr-CA" dirty="0"/>
+              <a:t/>
+            </a:r>
+            <a:br>
+              <a:rPr lang="fr-CA" dirty="0"/>
+            </a:br>
+            <a:r>
+              <a:rPr lang="fr-CA" dirty="0"/>
+              <a:t>ECJ</a:t>
             </a:r>
             <a:endParaRPr lang="fr-CA" dirty="0"/>
           </a:p>
@@ -6353,8 +6364,8 @@
         </p:nvSpPr>
         <p:spPr>
           <a:xfrm>
-            <a:off x="1120511" y="2642801"/>
-            <a:ext cx="7063740" cy="414569"/>
+            <a:off x="0" y="2642801"/>
+            <a:ext cx="9143999" cy="414569"/>
           </a:xfrm>
         </p:spPr>
         <p:txBody>
@@ -6363,8 +6374,8 @@
           <a:p>
             <a:pPr algn="ctr"/>
             <a:r>
-              <a:rPr lang="fr-CA" dirty="0" smtClean="0"/>
-              <a:t>ECJ</a:t>
+              <a:rPr lang="fr-CA" dirty="0"/>
+              <a:t>Projet de fin études</a:t>
             </a:r>
             <a:endParaRPr lang="fr-CA" dirty="0"/>
           </a:p>
@@ -6392,12 +6403,15 @@
         </p:blipFill>
         <p:spPr>
           <a:xfrm>
-            <a:off x="4143375" y="3343275"/>
+            <a:off x="2071688" y="4076955"/>
             <a:ext cx="5000625" cy="2657475"/>
           </a:xfrm>
           <a:prstGeom prst="rect">
             <a:avLst/>
           </a:prstGeom>
+          <a:solidFill>
+            <a:schemeClr val="tx1"/>
+          </a:solidFill>
         </p:spPr>
       </p:pic>
     </p:spTree>
@@ -6456,9 +6470,8 @@
           <a:p>
             <a:r>
               <a:rPr lang="fr-CA" sz="3000" dirty="0"/>
-              <a:t>Gestion des artistes(Sommaire)</a:t>
-            </a:r>
-            <a:endParaRPr lang="fr-CA" sz="3000" dirty="0"/>
+              <a:t>Gestion des catégorie d’artiste(Détail)</a:t>
+            </a:r>
           </a:p>
         </p:txBody>
       </p:sp>
@@ -6486,15 +6499,15 @@
         </p:blipFill>
         <p:spPr>
           <a:xfrm>
-            <a:off x="853873" y="2372272"/>
-            <a:ext cx="6968969" cy="2717168"/>
+            <a:off x="1418841" y="2231599"/>
+            <a:ext cx="5501456" cy="3258005"/>
           </a:xfrm>
         </p:spPr>
       </p:pic>
     </p:spTree>
     <p:extLst>
       <p:ext uri="{BB962C8B-B14F-4D97-AF65-F5344CB8AC3E}">
-        <p14:creationId xmlns:p14="http://schemas.microsoft.com/office/powerpoint/2010/main" val="3263798583"/>
+        <p14:creationId xmlns:p14="http://schemas.microsoft.com/office/powerpoint/2010/main" val="4244561636"/>
       </p:ext>
     </p:extLst>
   </p:cSld>
@@ -6547,19 +6560,14 @@
           <a:p>
             <a:r>
               <a:rPr lang="fr-CA" sz="3000" dirty="0"/>
-              <a:t>Gestion des </a:t>
-            </a:r>
-            <a:r>
-              <a:rPr lang="fr-CA" sz="3000" dirty="0"/>
-              <a:t>artistes(Détail)</a:t>
-            </a:r>
-            <a:endParaRPr lang="fr-CA" sz="3000" dirty="0"/>
+              <a:t>Gestion des artistes(Sommaire)</a:t>
+            </a:r>
           </a:p>
         </p:txBody>
       </p:sp>
       <p:pic>
         <p:nvPicPr>
-          <p:cNvPr id="6" name="Espace réservé du contenu 5"/>
+          <p:cNvPr id="4" name="Espace réservé du contenu 3"/>
           <p:cNvPicPr>
             <a:picLocks noGrp="1" noChangeAspect="1"/>
           </p:cNvPicPr>
@@ -6581,15 +6589,15 @@
         </p:blipFill>
         <p:spPr>
           <a:xfrm>
-            <a:off x="1692876" y="2228850"/>
-            <a:ext cx="4495840" cy="3328693"/>
+            <a:off x="631451" y="2100424"/>
+            <a:ext cx="7293349" cy="2282106"/>
           </a:xfrm>
         </p:spPr>
       </p:pic>
     </p:spTree>
     <p:extLst>
       <p:ext uri="{BB962C8B-B14F-4D97-AF65-F5344CB8AC3E}">
-        <p14:creationId xmlns:p14="http://schemas.microsoft.com/office/powerpoint/2010/main" val="1637175353"/>
+        <p14:creationId xmlns:p14="http://schemas.microsoft.com/office/powerpoint/2010/main" val="3263798583"/>
       </p:ext>
     </p:extLst>
   </p:cSld>
@@ -6642,9 +6650,98 @@
           <a:p>
             <a:r>
               <a:rPr lang="fr-CA" sz="3000" dirty="0"/>
+              <a:t>Gestion des artistes(Détail)</a:t>
+            </a:r>
+          </a:p>
+        </p:txBody>
+      </p:sp>
+      <p:pic>
+        <p:nvPicPr>
+          <p:cNvPr id="6" name="Espace réservé du contenu 5"/>
+          <p:cNvPicPr>
+            <a:picLocks noGrp="1" noChangeAspect="1"/>
+          </p:cNvPicPr>
+          <p:nvPr>
+            <p:ph idx="1"/>
+          </p:nvPr>
+        </p:nvPicPr>
+        <p:blipFill>
+          <a:blip r:embed="rId2">
+            <a:extLst>
+              <a:ext uri="{28A0092B-C50C-407E-A947-70E740481C1C}">
+                <a14:useLocalDpi xmlns:a14="http://schemas.microsoft.com/office/drawing/2010/main" val="0"/>
+              </a:ext>
+            </a:extLst>
+          </a:blip>
+          <a:stretch>
+            <a:fillRect/>
+          </a:stretch>
+        </p:blipFill>
+        <p:spPr>
+          <a:xfrm>
+            <a:off x="1692875" y="2228850"/>
+            <a:ext cx="4880919" cy="3990718"/>
+          </a:xfrm>
+        </p:spPr>
+      </p:pic>
+    </p:spTree>
+    <p:extLst>
+      <p:ext uri="{BB962C8B-B14F-4D97-AF65-F5344CB8AC3E}">
+        <p14:creationId xmlns:p14="http://schemas.microsoft.com/office/powerpoint/2010/main" val="1637175353"/>
+      </p:ext>
+    </p:extLst>
+  </p:cSld>
+  <p:clrMapOvr>
+    <a:masterClrMapping/>
+  </p:clrMapOvr>
+  <p:timing>
+    <p:tnLst>
+      <p:par>
+        <p:cTn id="1" dur="indefinite" restart="never" nodeType="tmRoot"/>
+      </p:par>
+    </p:tnLst>
+  </p:timing>
+</p:sld>
+</file>
+
+<file path=ppt/slides/slide13.xml><?xml version="1.0" encoding="utf-8"?>
+<p:sld xmlns:a="http://schemas.openxmlformats.org/drawingml/2006/main" xmlns:r="http://schemas.openxmlformats.org/officeDocument/2006/relationships" xmlns:p="http://schemas.openxmlformats.org/presentationml/2006/main">
+  <p:cSld>
+    <p:spTree>
+      <p:nvGrpSpPr>
+        <p:cNvPr id="1" name=""/>
+        <p:cNvGrpSpPr/>
+        <p:nvPr/>
+      </p:nvGrpSpPr>
+      <p:grpSpPr>
+        <a:xfrm>
+          <a:off x="0" y="0"/>
+          <a:ext cx="0" cy="0"/>
+          <a:chOff x="0" y="0"/>
+          <a:chExt cx="0" cy="0"/>
+        </a:xfrm>
+      </p:grpSpPr>
+      <p:sp>
+        <p:nvSpPr>
+          <p:cNvPr id="2" name="Titre 1"/>
+          <p:cNvSpPr>
+            <a:spLocks noGrp="1"/>
+          </p:cNvSpPr>
+          <p:nvPr>
+            <p:ph type="title"/>
+          </p:nvPr>
+        </p:nvSpPr>
+        <p:spPr/>
+        <p:txBody>
+          <a:bodyPr>
+            <a:normAutofit/>
+          </a:bodyPr>
+          <a:lstStyle/>
+          <a:p>
+            <a:r>
+              <a:rPr lang="fr-CA" sz="3000" dirty="0"/>
               <a:t>Gestion des engagements</a:t>
             </a:r>
-            <a:endParaRPr lang="fr-CA" sz="3000" dirty="0"/>
           </a:p>
         </p:txBody>
       </p:sp>
@@ -6697,7 +6794,7 @@
 </p:sld>
 </file>
 
-<file path=ppt/slides/slide13.xml><?xml version="1.0" encoding="utf-8"?>
+<file path=ppt/slides/slide14.xml><?xml version="1.0" encoding="utf-8"?>
 <p:sld xmlns:a="http://schemas.openxmlformats.org/drawingml/2006/main" xmlns:r="http://schemas.openxmlformats.org/officeDocument/2006/relationships" xmlns:p="http://schemas.openxmlformats.org/presentationml/2006/main">
   <p:cSld>
     <p:spTree>
@@ -6735,7 +6832,6 @@
               <a:rPr lang="fr-CA" sz="3000" dirty="0"/>
               <a:t>Gestion des exigences</a:t>
             </a:r>
-            <a:endParaRPr lang="fr-CA" sz="3000" dirty="0"/>
           </a:p>
         </p:txBody>
       </p:sp>
@@ -6788,7 +6884,7 @@
 </p:sld>
 </file>
 
-<file path=ppt/slides/slide14.xml><?xml version="1.0" encoding="utf-8"?>
+<file path=ppt/slides/slide15.xml><?xml version="1.0" encoding="utf-8"?>
 <p:sld xmlns:a="http://schemas.openxmlformats.org/drawingml/2006/main" xmlns:r="http://schemas.openxmlformats.org/officeDocument/2006/relationships" xmlns:p="http://schemas.openxmlformats.org/presentationml/2006/main">
   <p:cSld>
     <p:spTree>
@@ -6826,7 +6922,6 @@
               <a:rPr lang="fr-CA" sz="3000" dirty="0"/>
               <a:t>Gestion des contrats(Sommaire)</a:t>
             </a:r>
-            <a:endParaRPr lang="fr-CA" sz="3000" dirty="0"/>
           </a:p>
         </p:txBody>
       </p:sp>
@@ -6854,8 +6949,8 @@
         </p:blipFill>
         <p:spPr>
           <a:xfrm>
-            <a:off x="835337" y="2509014"/>
-            <a:ext cx="6446044" cy="2469215"/>
+            <a:off x="835336" y="2509014"/>
+            <a:ext cx="7089464" cy="2586425"/>
           </a:xfrm>
         </p:spPr>
       </p:pic>
@@ -6879,7 +6974,7 @@
 </p:sld>
 </file>
 
-<file path=ppt/slides/slide15.xml><?xml version="1.0" encoding="utf-8"?>
+<file path=ppt/slides/slide16.xml><?xml version="1.0" encoding="utf-8"?>
 <p:sld xmlns:a="http://schemas.openxmlformats.org/drawingml/2006/main" xmlns:r="http://schemas.openxmlformats.org/officeDocument/2006/relationships" xmlns:p="http://schemas.openxmlformats.org/presentationml/2006/main">
   <p:cSld>
     <p:spTree>
@@ -6915,13 +7010,8 @@
           <a:p>
             <a:r>
               <a:rPr lang="fr-CA" sz="3000" dirty="0"/>
-              <a:t>Gestion des </a:t>
-            </a:r>
-            <a:r>
-              <a:rPr lang="fr-CA" sz="3000" dirty="0"/>
-              <a:t>contrats(Détail)</a:t>
-            </a:r>
-            <a:endParaRPr lang="fr-CA" sz="3000" dirty="0"/>
+              <a:t>Gestion des contrats(Détail)</a:t>
+            </a:r>
           </a:p>
         </p:txBody>
       </p:sp>
@@ -6950,7 +7040,7 @@
         <p:spPr>
           <a:xfrm>
             <a:off x="792088" y="2289464"/>
-            <a:ext cx="6446044" cy="2633159"/>
+            <a:ext cx="7120360" cy="2908612"/>
           </a:xfrm>
         </p:spPr>
       </p:pic>
@@ -6974,7 +7064,7 @@
 </p:sld>
 </file>
 
-<file path=ppt/slides/slide16.xml><?xml version="1.0" encoding="utf-8"?>
+<file path=ppt/slides/slide17.xml><?xml version="1.0" encoding="utf-8"?>
 <p:sld xmlns:a="http://schemas.openxmlformats.org/drawingml/2006/main" xmlns:r="http://schemas.openxmlformats.org/officeDocument/2006/relationships" xmlns:p="http://schemas.openxmlformats.org/presentationml/2006/main">
   <p:cSld>
     <p:spTree>
@@ -7104,7 +7194,7 @@
 </p:sld>
 </file>
 
-<file path=ppt/slides/slide17.xml><?xml version="1.0" encoding="utf-8"?>
+<file path=ppt/slides/slide18.xml><?xml version="1.0" encoding="utf-8"?>
 <p:sld xmlns:a="http://schemas.openxmlformats.org/drawingml/2006/main" xmlns:r="http://schemas.openxmlformats.org/officeDocument/2006/relationships" xmlns:p="http://schemas.openxmlformats.org/presentationml/2006/main">
   <p:cSld>
     <p:spTree>
@@ -7142,7 +7232,6 @@
               <a:rPr lang="fr-CA" sz="3000" dirty="0"/>
               <a:t>Création d’un évènement au complet</a:t>
             </a:r>
-            <a:endParaRPr lang="fr-CA" sz="3000" dirty="0"/>
           </a:p>
         </p:txBody>
       </p:sp>
@@ -7195,7 +7284,7 @@
 </p:sld>
 </file>
 
-<file path=ppt/slides/slide18.xml><?xml version="1.0" encoding="utf-8"?>
+<file path=ppt/slides/slide19.xml><?xml version="1.0" encoding="utf-8"?>
 <p:sld xmlns:a="http://schemas.openxmlformats.org/drawingml/2006/main" xmlns:r="http://schemas.openxmlformats.org/officeDocument/2006/relationships" xmlns:p="http://schemas.openxmlformats.org/presentationml/2006/main">
   <p:cSld>
     <p:spTree>
@@ -7233,7 +7322,6 @@
               <a:rPr lang="fr-CA" sz="3000" dirty="0"/>
               <a:t>Conclusion</a:t>
             </a:r>
-            <a:endParaRPr lang="fr-CA" sz="3000" dirty="0"/>
           </a:p>
         </p:txBody>
       </p:sp>
@@ -7260,21 +7348,13 @@
           <a:p>
             <a:r>
               <a:rPr lang="fr-CA" dirty="0" smtClean="0"/>
-              <a:t>Fonctionnement de de </a:t>
-            </a:r>
+              <a:t>Fonctionnement de de l’équipe</a:t>
+            </a:r>
+          </a:p>
+          <a:p>
             <a:r>
               <a:rPr lang="fr-CA" dirty="0" smtClean="0"/>
-              <a:t>l’équipe</a:t>
-            </a:r>
-          </a:p>
-          <a:p>
-            <a:r>
-              <a:rPr lang="fr-CA" dirty="0" smtClean="0"/>
-              <a:t>Recommandations </a:t>
-            </a:r>
-            <a:r>
-              <a:rPr lang="fr-CA" dirty="0" smtClean="0"/>
-              <a:t>et suggestions </a:t>
+              <a:t>Recommandations et suggestions </a:t>
             </a:r>
             <a:endParaRPr lang="fr-CA" dirty="0"/>
           </a:p>
@@ -7359,16 +7439,11 @@
               <a:rPr lang="fr-CA" dirty="0" smtClean="0"/>
               <a:t>Introduction</a:t>
             </a:r>
-            <a:endParaRPr lang="fr-CA" dirty="0" smtClean="0"/>
           </a:p>
           <a:p>
             <a:r>
               <a:rPr lang="fr-CA" dirty="0" smtClean="0"/>
-              <a:t>Présentation </a:t>
-            </a:r>
-            <a:r>
-              <a:rPr lang="fr-CA" dirty="0" smtClean="0"/>
-              <a:t>de la console d’administration</a:t>
+              <a:t>Présentation de la console d’administration</a:t>
             </a:r>
             <a:endParaRPr lang="fr-CA" dirty="0"/>
           </a:p>
@@ -7399,6 +7474,139 @@
     <p:extLst>
       <p:ext uri="{BB962C8B-B14F-4D97-AF65-F5344CB8AC3E}">
         <p14:creationId xmlns:p14="http://schemas.microsoft.com/office/powerpoint/2010/main" val="3365026024"/>
+      </p:ext>
+    </p:extLst>
+  </p:cSld>
+  <p:clrMapOvr>
+    <a:masterClrMapping/>
+  </p:clrMapOvr>
+  <p:timing>
+    <p:tnLst>
+      <p:par>
+        <p:cTn id="1" dur="indefinite" restart="never" nodeType="tmRoot"/>
+      </p:par>
+    </p:tnLst>
+  </p:timing>
+</p:sld>
+</file>
+
+<file path=ppt/slides/slide20.xml><?xml version="1.0" encoding="utf-8"?>
+<p:sld xmlns:a="http://schemas.openxmlformats.org/drawingml/2006/main" xmlns:r="http://schemas.openxmlformats.org/officeDocument/2006/relationships" xmlns:p="http://schemas.openxmlformats.org/presentationml/2006/main">
+  <p:cSld>
+    <p:spTree>
+      <p:nvGrpSpPr>
+        <p:cNvPr id="1" name=""/>
+        <p:cNvGrpSpPr/>
+        <p:nvPr/>
+      </p:nvGrpSpPr>
+      <p:grpSpPr>
+        <a:xfrm>
+          <a:off x="0" y="0"/>
+          <a:ext cx="0" cy="0"/>
+          <a:chOff x="0" y="0"/>
+          <a:chExt cx="0" cy="0"/>
+        </a:xfrm>
+      </p:grpSpPr>
+      <p:sp>
+        <p:nvSpPr>
+          <p:cNvPr id="2" name="Titre 1"/>
+          <p:cNvSpPr>
+            <a:spLocks noGrp="1"/>
+          </p:cNvSpPr>
+          <p:nvPr>
+            <p:ph type="title"/>
+          </p:nvPr>
+        </p:nvSpPr>
+        <p:spPr>
+          <a:xfrm>
+            <a:off x="0" y="0"/>
+            <a:ext cx="9144000" cy="6858000"/>
+          </a:xfrm>
+        </p:spPr>
+        <p:txBody>
+          <a:bodyPr anchor="ctr"/>
+          <a:lstStyle/>
+          <a:p>
+            <a:pPr algn="ctr"/>
+            <a:r>
+              <a:rPr lang="fr-CA" dirty="0"/>
+              <a:t>Questions</a:t>
+            </a:r>
+            <a:endParaRPr lang="fr-CA" dirty="0"/>
+          </a:p>
+        </p:txBody>
+      </p:sp>
+    </p:spTree>
+    <p:extLst>
+      <p:ext uri="{BB962C8B-B14F-4D97-AF65-F5344CB8AC3E}">
+        <p14:creationId xmlns:p14="http://schemas.microsoft.com/office/powerpoint/2010/main" val="912246389"/>
+      </p:ext>
+    </p:extLst>
+  </p:cSld>
+  <p:clrMapOvr>
+    <a:masterClrMapping/>
+  </p:clrMapOvr>
+  <p:timing>
+    <p:tnLst>
+      <p:par>
+        <p:cTn id="1" dur="indefinite" restart="never" nodeType="tmRoot"/>
+      </p:par>
+    </p:tnLst>
+  </p:timing>
+</p:sld>
+</file>
+
+<file path=ppt/slides/slide21.xml><?xml version="1.0" encoding="utf-8"?>
+<p:sld xmlns:a="http://schemas.openxmlformats.org/drawingml/2006/main" xmlns:r="http://schemas.openxmlformats.org/officeDocument/2006/relationships" xmlns:p="http://schemas.openxmlformats.org/presentationml/2006/main">
+  <p:cSld>
+    <p:spTree>
+      <p:nvGrpSpPr>
+        <p:cNvPr id="1" name=""/>
+        <p:cNvGrpSpPr/>
+        <p:nvPr/>
+      </p:nvGrpSpPr>
+      <p:grpSpPr>
+        <a:xfrm>
+          <a:off x="0" y="0"/>
+          <a:ext cx="0" cy="0"/>
+          <a:chOff x="0" y="0"/>
+          <a:chExt cx="0" cy="0"/>
+        </a:xfrm>
+      </p:grpSpPr>
+      <p:sp>
+        <p:nvSpPr>
+          <p:cNvPr id="2" name="Titre 1"/>
+          <p:cNvSpPr>
+            <a:spLocks noGrp="1"/>
+          </p:cNvSpPr>
+          <p:nvPr>
+            <p:ph type="title"/>
+          </p:nvPr>
+        </p:nvSpPr>
+        <p:spPr>
+          <a:xfrm>
+            <a:off x="0" y="0"/>
+            <a:ext cx="9144000" cy="6857999"/>
+          </a:xfrm>
+        </p:spPr>
+        <p:txBody>
+          <a:bodyPr anchor="ctr">
+            <a:normAutofit/>
+          </a:bodyPr>
+          <a:lstStyle/>
+          <a:p>
+            <a:pPr algn="ctr"/>
+            <a:r>
+              <a:rPr lang="fr-CA" dirty="0"/>
+              <a:t>Merci pour votre attention</a:t>
+            </a:r>
+          </a:p>
+        </p:txBody>
+      </p:sp>
+    </p:spTree>
+    <p:extLst>
+      <p:ext uri="{BB962C8B-B14F-4D97-AF65-F5344CB8AC3E}">
+        <p14:creationId xmlns:p14="http://schemas.microsoft.com/office/powerpoint/2010/main" val="367846843"/>
       </p:ext>
     </p:extLst>
   </p:cSld>
@@ -7451,7 +7659,6 @@
               <a:rPr lang="fr-CA" sz="3000" dirty="0"/>
               <a:t>Introduction</a:t>
             </a:r>
-            <a:endParaRPr lang="fr-CA" sz="3000" dirty="0"/>
           </a:p>
         </p:txBody>
       </p:sp>
@@ -7472,14 +7679,24 @@
           <a:p>
             <a:r>
               <a:rPr lang="fr-CA" dirty="0" smtClean="0"/>
-              <a:t>Notre Mandat</a:t>
-            </a:r>
-          </a:p>
-          <a:p>
+              <a:t>Notre </a:t>
+            </a:r>
             <a:r>
               <a:rPr lang="fr-CA" dirty="0" smtClean="0"/>
-              <a:t>Contexte du projet</a:t>
-            </a:r>
+              <a:t>Mandat</a:t>
+            </a:r>
+            <a:endParaRPr lang="fr-CA" dirty="0" smtClean="0"/>
+          </a:p>
+          <a:p>
+            <a:r>
+              <a:rPr lang="fr-CA" dirty="0" smtClean="0"/>
+              <a:t>Contexte du </a:t>
+            </a:r>
+            <a:r>
+              <a:rPr lang="fr-CA" dirty="0" smtClean="0"/>
+              <a:t>projet</a:t>
+            </a:r>
+            <a:endParaRPr lang="fr-CA" dirty="0" smtClean="0"/>
           </a:p>
           <a:p>
             <a:r>
@@ -7547,7 +7764,6 @@
               <a:rPr lang="fr-CA" sz="3000" dirty="0"/>
               <a:t>Application console</a:t>
             </a:r>
-            <a:endParaRPr lang="fr-CA" sz="3000" dirty="0"/>
           </a:p>
         </p:txBody>
       </p:sp>
@@ -7659,7 +7875,6 @@
               <a:rPr lang="fr-CA" sz="3000" dirty="0"/>
               <a:t>Menu</a:t>
             </a:r>
-            <a:endParaRPr lang="fr-CA" sz="3000" dirty="0"/>
           </a:p>
         </p:txBody>
       </p:sp>
@@ -7751,11 +7966,7 @@
           <a:p>
             <a:r>
               <a:rPr lang="fr-CA" sz="3000" dirty="0"/>
-              <a:t>A</a:t>
-            </a:r>
-            <a:r>
-              <a:rPr lang="fr-CA" sz="3000" dirty="0"/>
-              <a:t>gences </a:t>
+              <a:t>Agences </a:t>
             </a:r>
             <a:r>
               <a:rPr lang="fr-CA" sz="3000" dirty="0" smtClean="0"/>
@@ -7765,7 +7976,6 @@
               <a:rPr lang="fr-CA" sz="3000" dirty="0"/>
               <a:t>)</a:t>
             </a:r>
-            <a:endParaRPr lang="fr-CA" sz="3000" dirty="0"/>
           </a:p>
         </p:txBody>
       </p:sp>
@@ -7793,8 +8003,8 @@
         </p:blipFill>
         <p:spPr>
           <a:xfrm>
-            <a:off x="575845" y="2323896"/>
-            <a:ext cx="7289231" cy="2840978"/>
+            <a:off x="163952" y="2266231"/>
+            <a:ext cx="8224148" cy="2173963"/>
           </a:xfrm>
         </p:spPr>
       </p:pic>
@@ -7856,15 +8066,7 @@
             </a:r>
             <a:r>
               <a:rPr lang="fr-CA" dirty="0" smtClean="0"/>
-              <a:t>gences </a:t>
-            </a:r>
-            <a:r>
-              <a:rPr lang="fr-CA" dirty="0" smtClean="0"/>
-              <a:t>d’artistes(Détail</a:t>
-            </a:r>
-            <a:r>
-              <a:rPr lang="fr-CA" dirty="0" smtClean="0"/>
-              <a:t>)</a:t>
+              <a:t>gences d’artistes(Détail)</a:t>
             </a:r>
             <a:endParaRPr lang="fr-CA" dirty="0"/>
           </a:p>
@@ -7948,27 +8150,25 @@
         </p:nvSpPr>
         <p:spPr>
           <a:xfrm>
-            <a:off x="580768" y="1131570"/>
-            <a:ext cx="7635116" cy="994172"/>
+            <a:off x="946404" y="939114"/>
+            <a:ext cx="7269480" cy="752208"/>
           </a:xfrm>
         </p:spPr>
         <p:txBody>
-          <a:bodyPr>
-            <a:normAutofit/>
-          </a:bodyPr>
-          <a:lstStyle/>
-          <a:p>
-            <a:r>
-              <a:rPr lang="fr-CA" sz="3000" dirty="0"/>
-              <a:t>Gestion des catégorie d’artiste(Sommaire)</a:t>
-            </a:r>
-            <a:endParaRPr lang="fr-CA" sz="3000" dirty="0"/>
+          <a:bodyPr/>
+          <a:lstStyle/>
+          <a:p>
+            <a:r>
+              <a:rPr lang="fr-CA" dirty="0" smtClean="0"/>
+              <a:t>Suppression d’une agence)</a:t>
+            </a:r>
+            <a:endParaRPr lang="fr-CA" dirty="0"/>
           </a:p>
         </p:txBody>
       </p:sp>
       <p:pic>
         <p:nvPicPr>
-          <p:cNvPr id="4" name="Espace réservé du contenu 3"/>
+          <p:cNvPr id="5" name="Espace réservé du contenu 4"/>
           <p:cNvPicPr>
             <a:picLocks noGrp="1" noChangeAspect="1"/>
           </p:cNvPicPr>
@@ -7990,15 +8190,15 @@
         </p:blipFill>
         <p:spPr>
           <a:xfrm>
-            <a:off x="753763" y="2391858"/>
-            <a:ext cx="6945159" cy="2706751"/>
+            <a:off x="946150" y="2840077"/>
+            <a:ext cx="6446838" cy="2328783"/>
           </a:xfrm>
         </p:spPr>
       </p:pic>
     </p:spTree>
     <p:extLst>
       <p:ext uri="{BB962C8B-B14F-4D97-AF65-F5344CB8AC3E}">
-        <p14:creationId xmlns:p14="http://schemas.microsoft.com/office/powerpoint/2010/main" val="1011138271"/>
+        <p14:creationId xmlns:p14="http://schemas.microsoft.com/office/powerpoint/2010/main" val="2918400531"/>
       </p:ext>
     </p:extLst>
   </p:cSld>
@@ -8042,7 +8242,12 @@
             <p:ph type="title"/>
           </p:nvPr>
         </p:nvSpPr>
-        <p:spPr/>
+        <p:spPr>
+          <a:xfrm>
+            <a:off x="580768" y="1131570"/>
+            <a:ext cx="7635116" cy="994172"/>
+          </a:xfrm>
+        </p:spPr>
         <p:txBody>
           <a:bodyPr>
             <a:normAutofit/>
@@ -8051,13 +8256,8 @@
           <a:p>
             <a:r>
               <a:rPr lang="fr-CA" sz="3000" dirty="0"/>
-              <a:t>Gestion des catégorie </a:t>
-            </a:r>
-            <a:r>
-              <a:rPr lang="fr-CA" sz="3000" dirty="0"/>
-              <a:t>d’artiste(Détail)</a:t>
-            </a:r>
-            <a:endParaRPr lang="fr-CA" sz="3000" dirty="0"/>
+              <a:t>Gestion des catégorie d’artiste(Sommaire)</a:t>
+            </a:r>
           </a:p>
         </p:txBody>
       </p:sp>
@@ -8085,15 +8285,15 @@
         </p:blipFill>
         <p:spPr>
           <a:xfrm>
-            <a:off x="1418841" y="2231599"/>
-            <a:ext cx="5501456" cy="3258005"/>
+            <a:off x="580769" y="2391858"/>
+            <a:ext cx="7118154" cy="2320185"/>
           </a:xfrm>
         </p:spPr>
       </p:pic>
     </p:spTree>
     <p:extLst>
       <p:ext uri="{BB962C8B-B14F-4D97-AF65-F5344CB8AC3E}">
-        <p14:creationId xmlns:p14="http://schemas.microsoft.com/office/powerpoint/2010/main" val="4244561636"/>
+        <p14:creationId xmlns:p14="http://schemas.microsoft.com/office/powerpoint/2010/main" val="1011138271"/>
       </p:ext>
     </p:extLst>
   </p:cSld>

</xml_diff>

<commit_message>
Finaliser le powerPoint, Ajouter l'Ajout de 2 appels d'offres dans le sript de démo et dans le Excel à donneé
</commit_message>
<xml_diff>
--- a/Gestion de projet/Présentations/PowerPoint.pptx
+++ b/Gestion de projet/Présentations/PowerPoint.pptx
@@ -24,9 +24,11 @@
     <p:sldId id="270" r:id="rId18"/>
     <p:sldId id="271" r:id="rId19"/>
     <p:sldId id="272" r:id="rId20"/>
-    <p:sldId id="273" r:id="rId21"/>
-    <p:sldId id="275" r:id="rId22"/>
-    <p:sldId id="276" r:id="rId23"/>
+    <p:sldId id="277" r:id="rId21"/>
+    <p:sldId id="278" r:id="rId22"/>
+    <p:sldId id="273" r:id="rId23"/>
+    <p:sldId id="275" r:id="rId24"/>
+    <p:sldId id="276" r:id="rId25"/>
   </p:sldIdLst>
   <p:sldSz cx="9144000" cy="6858000" type="screen4x3"/>
   <p:notesSz cx="6858000" cy="9144000"/>
@@ -286,7 +288,7 @@
           <a:p>
             <a:fld id="{A8224893-DBDA-4BFA-9CE1-4BFE7CD0F8CF}" type="datetime1">
               <a:rPr lang="en-US" smtClean="0"/>
-              <a:t>12/14/2016</a:t>
+              <a:t>12/16/2016</a:t>
             </a:fld>
             <a:endParaRPr lang="en-US"/>
           </a:p>
@@ -456,7 +458,7 @@
           <a:p>
             <a:fld id="{5F4E5243-F52A-4D37-9694-EB26C6C31910}" type="datetime1">
               <a:rPr lang="en-US" smtClean="0"/>
-              <a:t>12/14/2016</a:t>
+              <a:t>12/16/2016</a:t>
             </a:fld>
             <a:endParaRPr lang="en-US"/>
           </a:p>
@@ -636,7 +638,7 @@
           <a:p>
             <a:fld id="{3A77B6E1-634A-48DC-9E8B-D894023267EF}" type="datetime1">
               <a:rPr lang="en-US" smtClean="0"/>
-              <a:t>12/14/2016</a:t>
+              <a:t>12/16/2016</a:t>
             </a:fld>
             <a:endParaRPr lang="en-US"/>
           </a:p>
@@ -904,7 +906,7 @@
           <a:p>
             <a:fld id="{A8224893-DBDA-4BFA-9CE1-4BFE7CD0F8CF}" type="datetime1">
               <a:rPr lang="en-US" smtClean="0"/>
-              <a:t>12/14/2016</a:t>
+              <a:t>12/16/2016</a:t>
             </a:fld>
             <a:endParaRPr lang="en-US"/>
           </a:p>
@@ -1096,7 +1098,7 @@
           <a:p>
             <a:fld id="{7B2D3E9E-A95C-48F2-B4BF-A71542E0BE9A}" type="datetime1">
               <a:rPr lang="en-US" smtClean="0"/>
-              <a:t>12/14/2016</a:t>
+              <a:t>12/16/2016</a:t>
             </a:fld>
             <a:endParaRPr lang="en-US"/>
           </a:p>
@@ -1350,7 +1352,7 @@
           <a:p>
             <a:fld id="{A50F84E2-2D7A-43CF-AC90-352A289A783A}" type="datetime1">
               <a:rPr lang="en-US" smtClean="0"/>
-              <a:t>12/14/2016</a:t>
+              <a:t>12/16/2016</a:t>
             </a:fld>
             <a:endParaRPr lang="en-US"/>
           </a:p>
@@ -1676,7 +1678,7 @@
           <a:p>
             <a:fld id="{F12952B5-7A2F-4CC8-B7CE-9234E21C2837}" type="datetime1">
               <a:rPr lang="en-US" smtClean="0"/>
-              <a:t>12/14/2016</a:t>
+              <a:t>12/16/2016</a:t>
             </a:fld>
             <a:endParaRPr lang="en-US"/>
           </a:p>
@@ -2096,7 +2098,7 @@
           <a:p>
             <a:fld id="{CE1DA07A-9201-4B4B-BAF2-015AFA30F520}" type="datetime1">
               <a:rPr lang="en-US" smtClean="0"/>
-              <a:t>12/14/2016</a:t>
+              <a:t>12/16/2016</a:t>
             </a:fld>
             <a:endParaRPr lang="en-US"/>
           </a:p>
@@ -2214,7 +2216,7 @@
           <a:p>
             <a:fld id="{73D7E00A-486F-4252-8B1D-E32645521F49}" type="datetime1">
               <a:rPr lang="en-US" smtClean="0"/>
-              <a:t>12/14/2016</a:t>
+              <a:t>12/16/2016</a:t>
             </a:fld>
             <a:endParaRPr lang="en-US"/>
           </a:p>
@@ -2309,7 +2311,7 @@
           <a:p>
             <a:fld id="{8DDF5F92-E675-4B36-9A60-69A962A68675}" type="datetime1">
               <a:rPr lang="en-US" smtClean="0"/>
-              <a:t>12/14/2016</a:t>
+              <a:t>12/16/2016</a:t>
             </a:fld>
             <a:endParaRPr lang="en-US"/>
           </a:p>
@@ -2596,7 +2598,7 @@
           <a:p>
             <a:fld id="{AF6E2C9B-5FA2-460D-9BE7-B0812FC2A6FF}" type="datetime1">
               <a:rPr lang="en-US" smtClean="0"/>
-              <a:t>12/14/2016</a:t>
+              <a:t>12/16/2016</a:t>
             </a:fld>
             <a:endParaRPr lang="en-US"/>
           </a:p>
@@ -2766,7 +2768,7 @@
           <a:p>
             <a:fld id="{7B2D3E9E-A95C-48F2-B4BF-A71542E0BE9A}" type="datetime1">
               <a:rPr lang="en-US" smtClean="0"/>
-              <a:t>12/14/2016</a:t>
+              <a:t>12/16/2016</a:t>
             </a:fld>
             <a:endParaRPr lang="en-US"/>
           </a:p>
@@ -3091,7 +3093,7 @@
           <a:p>
             <a:fld id="{1D374940-A916-4C8B-9648-02A2D3898F9E}" type="datetime1">
               <a:rPr lang="en-US" smtClean="0"/>
-              <a:t>12/14/2016</a:t>
+              <a:t>12/16/2016</a:t>
             </a:fld>
             <a:endParaRPr lang="en-US"/>
           </a:p>
@@ -3261,7 +3263,7 @@
           <a:p>
             <a:fld id="{5F4E5243-F52A-4D37-9694-EB26C6C31910}" type="datetime1">
               <a:rPr lang="en-US" smtClean="0"/>
-              <a:t>12/14/2016</a:t>
+              <a:t>12/16/2016</a:t>
             </a:fld>
             <a:endParaRPr lang="en-US"/>
           </a:p>
@@ -3441,7 +3443,7 @@
           <a:p>
             <a:fld id="{3A77B6E1-634A-48DC-9E8B-D894023267EF}" type="datetime1">
               <a:rPr lang="en-US" smtClean="0"/>
-              <a:t>12/14/2016</a:t>
+              <a:t>12/16/2016</a:t>
             </a:fld>
             <a:endParaRPr lang="en-US"/>
           </a:p>
@@ -3692,7 +3694,7 @@
           <a:p>
             <a:fld id="{A50F84E2-2D7A-43CF-AC90-352A289A783A}" type="datetime1">
               <a:rPr lang="en-US" smtClean="0"/>
-              <a:t>12/14/2016</a:t>
+              <a:t>12/16/2016</a:t>
             </a:fld>
             <a:endParaRPr lang="en-US"/>
           </a:p>
@@ -3924,7 +3926,7 @@
           <a:p>
             <a:fld id="{F12952B5-7A2F-4CC8-B7CE-9234E21C2837}" type="datetime1">
               <a:rPr lang="en-US" smtClean="0"/>
-              <a:t>12/14/2016</a:t>
+              <a:t>12/16/2016</a:t>
             </a:fld>
             <a:endParaRPr lang="en-US"/>
           </a:p>
@@ -4266,7 +4268,7 @@
           <a:p>
             <a:fld id="{CE1DA07A-9201-4B4B-BAF2-015AFA30F520}" type="datetime1">
               <a:rPr lang="en-US" smtClean="0"/>
-              <a:t>12/14/2016</a:t>
+              <a:t>12/16/2016</a:t>
             </a:fld>
             <a:endParaRPr lang="en-US"/>
           </a:p>
@@ -4379,7 +4381,7 @@
           <a:p>
             <a:fld id="{73D7E00A-486F-4252-8B1D-E32645521F49}" type="datetime1">
               <a:rPr lang="en-US" smtClean="0"/>
-              <a:t>12/14/2016</a:t>
+              <a:t>12/16/2016</a:t>
             </a:fld>
             <a:endParaRPr lang="en-US"/>
           </a:p>
@@ -4497,7 +4499,7 @@
           <a:p>
             <a:fld id="{8DDF5F92-E675-4B36-9A60-69A962A68675}" type="datetime1">
               <a:rPr lang="en-US" smtClean="0"/>
-              <a:t>12/14/2016</a:t>
+              <a:t>12/16/2016</a:t>
             </a:fld>
             <a:endParaRPr lang="en-US"/>
           </a:p>
@@ -4781,7 +4783,7 @@
           <a:p>
             <a:fld id="{AF6E2C9B-5FA2-460D-9BE7-B0812FC2A6FF}" type="datetime1">
               <a:rPr lang="en-US" smtClean="0"/>
-              <a:t>12/14/2016</a:t>
+              <a:t>12/16/2016</a:t>
             </a:fld>
             <a:endParaRPr lang="en-US"/>
           </a:p>
@@ -5045,7 +5047,7 @@
           <a:p>
             <a:fld id="{1D374940-A916-4C8B-9648-02A2D3898F9E}" type="datetime1">
               <a:rPr lang="en-US" smtClean="0"/>
-              <a:t>12/14/2016</a:t>
+              <a:t>12/16/2016</a:t>
             </a:fld>
             <a:endParaRPr lang="en-US"/>
           </a:p>
@@ -5259,7 +5261,7 @@
           <a:p>
             <a:fld id="{5586B75A-687E-405C-8A0B-8D00578BA2C3}" type="datetime1">
               <a:rPr lang="en-US" smtClean="0"/>
-              <a:t>12/14/2016</a:t>
+              <a:t>12/16/2016</a:t>
             </a:fld>
             <a:endParaRPr lang="en-US"/>
           </a:p>
@@ -5825,7 +5827,7 @@
           <a:p>
             <a:fld id="{5586B75A-687E-405C-8A0B-8D00578BA2C3}" type="datetime1">
               <a:rPr lang="en-US" smtClean="0"/>
-              <a:t>12/14/2016</a:t>
+              <a:t>12/16/2016</a:t>
             </a:fld>
             <a:endParaRPr lang="en-US"/>
           </a:p>
@@ -6348,7 +6350,6 @@
               <a:rPr lang="fr-CA" dirty="0"/>
               <a:t>ECJ</a:t>
             </a:r>
-            <a:endParaRPr lang="fr-CA" dirty="0"/>
           </a:p>
         </p:txBody>
       </p:sp>
@@ -6377,7 +6378,6 @@
               <a:rPr lang="fr-CA" dirty="0"/>
               <a:t>Projet de fin études</a:t>
             </a:r>
-            <a:endParaRPr lang="fr-CA" dirty="0"/>
           </a:p>
         </p:txBody>
       </p:sp>
@@ -7311,59 +7311,327 @@
             <p:ph type="title"/>
           </p:nvPr>
         </p:nvSpPr>
-        <p:spPr/>
-        <p:txBody>
-          <a:bodyPr>
-            <a:normAutofit/>
-          </a:bodyPr>
-          <a:lstStyle/>
-          <a:p>
-            <a:r>
-              <a:rPr lang="fr-CA" sz="3000" dirty="0"/>
-              <a:t>Conclusion</a:t>
-            </a:r>
-          </a:p>
-        </p:txBody>
-      </p:sp>
-      <p:sp>
-        <p:nvSpPr>
-          <p:cNvPr id="3" name="Espace réservé du contenu 2"/>
-          <p:cNvSpPr>
-            <a:spLocks noGrp="1"/>
-          </p:cNvSpPr>
+        <p:spPr>
+          <a:xfrm>
+            <a:off x="707506" y="534305"/>
+            <a:ext cx="7269480" cy="743971"/>
+          </a:xfrm>
+        </p:spPr>
+        <p:txBody>
+          <a:bodyPr/>
+          <a:lstStyle/>
+          <a:p>
+            <a:r>
+              <a:rPr lang="fr-CA" dirty="0" smtClean="0"/>
+              <a:t>Technologies utilisées</a:t>
+            </a:r>
+            <a:endParaRPr lang="fr-CA" dirty="0"/>
+          </a:p>
+        </p:txBody>
+      </p:sp>
+      <p:pic>
+        <p:nvPicPr>
+          <p:cNvPr id="4" name="Espace réservé du contenu 3"/>
+          <p:cNvPicPr>
+            <a:picLocks noGrp="1" noChangeAspect="1"/>
+          </p:cNvPicPr>
           <p:nvPr>
             <p:ph idx="1"/>
           </p:nvPr>
-        </p:nvSpPr>
-        <p:spPr/>
-        <p:txBody>
-          <a:bodyPr/>
-          <a:lstStyle/>
-          <a:p>
-            <a:r>
-              <a:rPr lang="fr-CA" dirty="0" smtClean="0"/>
-              <a:t>Résumé de l’application </a:t>
-            </a:r>
-          </a:p>
-          <a:p>
-            <a:r>
-              <a:rPr lang="fr-CA" dirty="0" smtClean="0"/>
-              <a:t>Fonctionnement de de l’équipe</a:t>
-            </a:r>
-          </a:p>
-          <a:p>
-            <a:r>
-              <a:rPr lang="fr-CA" dirty="0" smtClean="0"/>
-              <a:t>Recommandations et suggestions </a:t>
-            </a:r>
-            <a:endParaRPr lang="fr-CA" dirty="0"/>
-          </a:p>
-        </p:txBody>
-      </p:sp>
+        </p:nvPicPr>
+        <p:blipFill>
+          <a:blip r:embed="rId2" cstate="print">
+            <a:extLst>
+              <a:ext uri="{28A0092B-C50C-407E-A947-70E740481C1C}">
+                <a14:useLocalDpi xmlns:a14="http://schemas.microsoft.com/office/drawing/2010/main" val="0"/>
+              </a:ext>
+            </a:extLst>
+          </a:blip>
+          <a:stretch>
+            <a:fillRect/>
+          </a:stretch>
+        </p:blipFill>
+        <p:spPr>
+          <a:xfrm>
+            <a:off x="877195" y="1301370"/>
+            <a:ext cx="1367138" cy="1367138"/>
+          </a:xfrm>
+        </p:spPr>
+      </p:pic>
+      <p:pic>
+        <p:nvPicPr>
+          <p:cNvPr id="5" name="Image 4"/>
+          <p:cNvPicPr>
+            <a:picLocks noChangeAspect="1"/>
+          </p:cNvPicPr>
+          <p:nvPr/>
+        </p:nvPicPr>
+        <p:blipFill>
+          <a:blip r:embed="rId3" cstate="print">
+            <a:extLst>
+              <a:ext uri="{28A0092B-C50C-407E-A947-70E740481C1C}">
+                <a14:useLocalDpi xmlns:a14="http://schemas.microsoft.com/office/drawing/2010/main" val="0"/>
+              </a:ext>
+            </a:extLst>
+          </a:blip>
+          <a:stretch>
+            <a:fillRect/>
+          </a:stretch>
+        </p:blipFill>
+        <p:spPr>
+          <a:xfrm>
+            <a:off x="2822924" y="1301370"/>
+            <a:ext cx="1868433" cy="1420862"/>
+          </a:xfrm>
+          <a:prstGeom prst="rect">
+            <a:avLst/>
+          </a:prstGeom>
+        </p:spPr>
+      </p:pic>
+      <p:pic>
+        <p:nvPicPr>
+          <p:cNvPr id="6" name="Image 5"/>
+          <p:cNvPicPr>
+            <a:picLocks noChangeAspect="1"/>
+          </p:cNvPicPr>
+          <p:nvPr/>
+        </p:nvPicPr>
+        <p:blipFill>
+          <a:blip r:embed="rId4" cstate="print">
+            <a:extLst>
+              <a:ext uri="{28A0092B-C50C-407E-A947-70E740481C1C}">
+                <a14:useLocalDpi xmlns:a14="http://schemas.microsoft.com/office/drawing/2010/main" val="0"/>
+              </a:ext>
+            </a:extLst>
+          </a:blip>
+          <a:stretch>
+            <a:fillRect/>
+          </a:stretch>
+        </p:blipFill>
+        <p:spPr>
+          <a:xfrm>
+            <a:off x="5117118" y="1447934"/>
+            <a:ext cx="1841157" cy="1074009"/>
+          </a:xfrm>
+          <a:prstGeom prst="rect">
+            <a:avLst/>
+          </a:prstGeom>
+        </p:spPr>
+      </p:pic>
+      <p:pic>
+        <p:nvPicPr>
+          <p:cNvPr id="9" name="Image 8"/>
+          <p:cNvPicPr>
+            <a:picLocks noChangeAspect="1"/>
+          </p:cNvPicPr>
+          <p:nvPr/>
+        </p:nvPicPr>
+        <p:blipFill>
+          <a:blip r:embed="rId5">
+            <a:extLst>
+              <a:ext uri="{28A0092B-C50C-407E-A947-70E740481C1C}">
+                <a14:useLocalDpi xmlns:a14="http://schemas.microsoft.com/office/drawing/2010/main" val="0"/>
+              </a:ext>
+            </a:extLst>
+          </a:blip>
+          <a:stretch>
+            <a:fillRect/>
+          </a:stretch>
+        </p:blipFill>
+        <p:spPr>
+          <a:xfrm>
+            <a:off x="5409320" y="2668508"/>
+            <a:ext cx="1761110" cy="1320833"/>
+          </a:xfrm>
+          <a:prstGeom prst="rect">
+            <a:avLst/>
+          </a:prstGeom>
+        </p:spPr>
+      </p:pic>
+      <p:pic>
+        <p:nvPicPr>
+          <p:cNvPr id="10" name="Image 9"/>
+          <p:cNvPicPr>
+            <a:picLocks noChangeAspect="1"/>
+          </p:cNvPicPr>
+          <p:nvPr/>
+        </p:nvPicPr>
+        <p:blipFill>
+          <a:blip r:embed="rId6" cstate="print">
+            <a:extLst>
+              <a:ext uri="{28A0092B-C50C-407E-A947-70E740481C1C}">
+                <a14:useLocalDpi xmlns:a14="http://schemas.microsoft.com/office/drawing/2010/main" val="0"/>
+              </a:ext>
+            </a:extLst>
+          </a:blip>
+          <a:stretch>
+            <a:fillRect/>
+          </a:stretch>
+        </p:blipFill>
+        <p:spPr>
+          <a:xfrm>
+            <a:off x="811828" y="4432405"/>
+            <a:ext cx="1970498" cy="1021375"/>
+          </a:xfrm>
+          <a:prstGeom prst="rect">
+            <a:avLst/>
+          </a:prstGeom>
+        </p:spPr>
+      </p:pic>
+      <p:pic>
+        <p:nvPicPr>
+          <p:cNvPr id="11" name="Image 10"/>
+          <p:cNvPicPr>
+            <a:picLocks noChangeAspect="1"/>
+          </p:cNvPicPr>
+          <p:nvPr/>
+        </p:nvPicPr>
+        <p:blipFill>
+          <a:blip r:embed="rId7">
+            <a:extLst>
+              <a:ext uri="{28A0092B-C50C-407E-A947-70E740481C1C}">
+                <a14:useLocalDpi xmlns:a14="http://schemas.microsoft.com/office/drawing/2010/main" val="0"/>
+              </a:ext>
+            </a:extLst>
+          </a:blip>
+          <a:stretch>
+            <a:fillRect/>
+          </a:stretch>
+        </p:blipFill>
+        <p:spPr>
+          <a:xfrm>
+            <a:off x="3066988" y="4303461"/>
+            <a:ext cx="2009283" cy="1000402"/>
+          </a:xfrm>
+          <a:prstGeom prst="rect">
+            <a:avLst/>
+          </a:prstGeom>
+        </p:spPr>
+      </p:pic>
+      <p:pic>
+        <p:nvPicPr>
+          <p:cNvPr id="12" name="Image 11"/>
+          <p:cNvPicPr>
+            <a:picLocks noChangeAspect="1"/>
+          </p:cNvPicPr>
+          <p:nvPr/>
+        </p:nvPicPr>
+        <p:blipFill>
+          <a:blip r:embed="rId8">
+            <a:extLst>
+              <a:ext uri="{28A0092B-C50C-407E-A947-70E740481C1C}">
+                <a14:useLocalDpi xmlns:a14="http://schemas.microsoft.com/office/drawing/2010/main" val="0"/>
+              </a:ext>
+            </a:extLst>
+          </a:blip>
+          <a:stretch>
+            <a:fillRect/>
+          </a:stretch>
+        </p:blipFill>
+        <p:spPr>
+          <a:xfrm>
+            <a:off x="5164252" y="4230169"/>
+            <a:ext cx="2251247" cy="1078062"/>
+          </a:xfrm>
+          <a:prstGeom prst="rect">
+            <a:avLst/>
+          </a:prstGeom>
+        </p:spPr>
+      </p:pic>
+      <p:pic>
+        <p:nvPicPr>
+          <p:cNvPr id="13" name="Image 12"/>
+          <p:cNvPicPr>
+            <a:picLocks noChangeAspect="1"/>
+          </p:cNvPicPr>
+          <p:nvPr/>
+        </p:nvPicPr>
+        <p:blipFill>
+          <a:blip r:embed="rId9" cstate="print">
+            <a:extLst>
+              <a:ext uri="{28A0092B-C50C-407E-A947-70E740481C1C}">
+                <a14:useLocalDpi xmlns:a14="http://schemas.microsoft.com/office/drawing/2010/main" val="0"/>
+              </a:ext>
+            </a:extLst>
+          </a:blip>
+          <a:stretch>
+            <a:fillRect/>
+          </a:stretch>
+        </p:blipFill>
+        <p:spPr>
+          <a:xfrm>
+            <a:off x="2978349" y="5303863"/>
+            <a:ext cx="1678185" cy="1379281"/>
+          </a:xfrm>
+          <a:prstGeom prst="rect">
+            <a:avLst/>
+          </a:prstGeom>
+        </p:spPr>
+      </p:pic>
+      <p:pic>
+        <p:nvPicPr>
+          <p:cNvPr id="14" name="Image 13"/>
+          <p:cNvPicPr>
+            <a:picLocks noChangeAspect="1"/>
+          </p:cNvPicPr>
+          <p:nvPr/>
+        </p:nvPicPr>
+        <p:blipFill>
+          <a:blip r:embed="rId10" cstate="print">
+            <a:extLst>
+              <a:ext uri="{28A0092B-C50C-407E-A947-70E740481C1C}">
+                <a14:useLocalDpi xmlns:a14="http://schemas.microsoft.com/office/drawing/2010/main" val="0"/>
+              </a:ext>
+            </a:extLst>
+          </a:blip>
+          <a:stretch>
+            <a:fillRect/>
+          </a:stretch>
+        </p:blipFill>
+        <p:spPr>
+          <a:xfrm>
+            <a:off x="685682" y="2598825"/>
+            <a:ext cx="1664347" cy="1664347"/>
+          </a:xfrm>
+          <a:prstGeom prst="rect">
+            <a:avLst/>
+          </a:prstGeom>
+        </p:spPr>
+      </p:pic>
+      <p:pic>
+        <p:nvPicPr>
+          <p:cNvPr id="15" name="Image 14"/>
+          <p:cNvPicPr>
+            <a:picLocks noChangeAspect="1"/>
+          </p:cNvPicPr>
+          <p:nvPr/>
+        </p:nvPicPr>
+        <p:blipFill>
+          <a:blip r:embed="rId11">
+            <a:extLst>
+              <a:ext uri="{28A0092B-C50C-407E-A947-70E740481C1C}">
+                <a14:useLocalDpi xmlns:a14="http://schemas.microsoft.com/office/drawing/2010/main" val="0"/>
+              </a:ext>
+            </a:extLst>
+          </a:blip>
+          <a:stretch>
+            <a:fillRect/>
+          </a:stretch>
+        </p:blipFill>
+        <p:spPr>
+          <a:xfrm>
+            <a:off x="3088379" y="2708194"/>
+            <a:ext cx="1559920" cy="1559920"/>
+          </a:xfrm>
+          <a:prstGeom prst="rect">
+            <a:avLst/>
+          </a:prstGeom>
+        </p:spPr>
+      </p:pic>
     </p:spTree>
     <p:extLst>
       <p:ext uri="{BB962C8B-B14F-4D97-AF65-F5344CB8AC3E}">
-        <p14:creationId xmlns:p14="http://schemas.microsoft.com/office/powerpoint/2010/main" val="2435794121"/>
+        <p14:creationId xmlns:p14="http://schemas.microsoft.com/office/powerpoint/2010/main" val="1624924645"/>
       </p:ext>
     </p:extLst>
   </p:cSld>
@@ -7456,8 +7724,25 @@
           <a:p>
             <a:r>
               <a:rPr lang="fr-CA" dirty="0" smtClean="0"/>
-              <a:t>Création d’un évènement au complet</a:t>
-            </a:r>
+              <a:t>Création d’un évènement au </a:t>
+            </a:r>
+            <a:r>
+              <a:rPr lang="fr-CA" dirty="0" smtClean="0"/>
+              <a:t>complet</a:t>
+            </a:r>
+          </a:p>
+          <a:p>
+            <a:r>
+              <a:rPr lang="fr-CA" dirty="0" smtClean="0"/>
+              <a:t>Technologies utilisées</a:t>
+            </a:r>
+          </a:p>
+          <a:p>
+            <a:r>
+              <a:rPr lang="fr-CA" dirty="0" smtClean="0"/>
+              <a:t>Volet technique de l’application</a:t>
+            </a:r>
+            <a:endParaRPr lang="fr-CA" dirty="0" smtClean="0"/>
           </a:p>
           <a:p>
             <a:r>
@@ -7519,6 +7804,506 @@
         </p:nvSpPr>
         <p:spPr>
           <a:xfrm>
+            <a:off x="864909" y="696063"/>
+            <a:ext cx="7243819" cy="757222"/>
+          </a:xfrm>
+        </p:spPr>
+        <p:txBody>
+          <a:bodyPr>
+            <a:normAutofit/>
+          </a:bodyPr>
+          <a:lstStyle/>
+          <a:p>
+            <a:r>
+              <a:rPr lang="fr-CA" dirty="0" smtClean="0"/>
+              <a:t>Déroulement du projet</a:t>
+            </a:r>
+            <a:endParaRPr lang="fr-CA" dirty="0"/>
+          </a:p>
+        </p:txBody>
+      </p:sp>
+      <p:pic>
+        <p:nvPicPr>
+          <p:cNvPr id="4" name="Espace réservé du contenu 3"/>
+          <p:cNvPicPr>
+            <a:picLocks noGrp="1" noChangeAspect="1"/>
+          </p:cNvPicPr>
+          <p:nvPr>
+            <p:ph idx="1"/>
+          </p:nvPr>
+        </p:nvPicPr>
+        <p:blipFill>
+          <a:blip r:embed="rId2">
+            <a:extLst>
+              <a:ext uri="{28A0092B-C50C-407E-A947-70E740481C1C}">
+                <a14:useLocalDpi xmlns:a14="http://schemas.microsoft.com/office/drawing/2010/main" val="0"/>
+              </a:ext>
+            </a:extLst>
+          </a:blip>
+          <a:stretch>
+            <a:fillRect/>
+          </a:stretch>
+        </p:blipFill>
+        <p:spPr>
+          <a:xfrm>
+            <a:off x="716628" y="1930218"/>
+            <a:ext cx="1688821" cy="1416093"/>
+          </a:xfrm>
+        </p:spPr>
+      </p:pic>
+      <p:pic>
+        <p:nvPicPr>
+          <p:cNvPr id="6" name="Image 5"/>
+          <p:cNvPicPr>
+            <a:picLocks noChangeAspect="1"/>
+          </p:cNvPicPr>
+          <p:nvPr/>
+        </p:nvPicPr>
+        <p:blipFill>
+          <a:blip r:embed="rId3" cstate="print">
+            <a:extLst>
+              <a:ext uri="{28A0092B-C50C-407E-A947-70E740481C1C}">
+                <a14:useLocalDpi xmlns:a14="http://schemas.microsoft.com/office/drawing/2010/main" val="0"/>
+              </a:ext>
+            </a:extLst>
+          </a:blip>
+          <a:stretch>
+            <a:fillRect/>
+          </a:stretch>
+        </p:blipFill>
+        <p:spPr>
+          <a:xfrm>
+            <a:off x="3513266" y="1921666"/>
+            <a:ext cx="1424611" cy="1388083"/>
+          </a:xfrm>
+          <a:prstGeom prst="rect">
+            <a:avLst/>
+          </a:prstGeom>
+        </p:spPr>
+      </p:pic>
+      <p:pic>
+        <p:nvPicPr>
+          <p:cNvPr id="8" name="Image 7"/>
+          <p:cNvPicPr>
+            <a:picLocks noChangeAspect="1"/>
+          </p:cNvPicPr>
+          <p:nvPr/>
+        </p:nvPicPr>
+        <p:blipFill>
+          <a:blip r:embed="rId4">
+            <a:extLst>
+              <a:ext uri="{28A0092B-C50C-407E-A947-70E740481C1C}">
+                <a14:useLocalDpi xmlns:a14="http://schemas.microsoft.com/office/drawing/2010/main" val="0"/>
+              </a:ext>
+            </a:extLst>
+          </a:blip>
+          <a:stretch>
+            <a:fillRect/>
+          </a:stretch>
+        </p:blipFill>
+        <p:spPr>
+          <a:xfrm>
+            <a:off x="2405449" y="2204816"/>
+            <a:ext cx="962159" cy="866896"/>
+          </a:xfrm>
+          <a:prstGeom prst="rect">
+            <a:avLst/>
+          </a:prstGeom>
+        </p:spPr>
+      </p:pic>
+      <p:pic>
+        <p:nvPicPr>
+          <p:cNvPr id="9" name="Image 8"/>
+          <p:cNvPicPr>
+            <a:picLocks noChangeAspect="1"/>
+          </p:cNvPicPr>
+          <p:nvPr/>
+        </p:nvPicPr>
+        <p:blipFill>
+          <a:blip r:embed="rId5">
+            <a:extLst>
+              <a:ext uri="{28A0092B-C50C-407E-A947-70E740481C1C}">
+                <a14:useLocalDpi xmlns:a14="http://schemas.microsoft.com/office/drawing/2010/main" val="0"/>
+              </a:ext>
+            </a:extLst>
+          </a:blip>
+          <a:stretch>
+            <a:fillRect/>
+          </a:stretch>
+        </p:blipFill>
+        <p:spPr>
+          <a:xfrm>
+            <a:off x="3658247" y="3381499"/>
+            <a:ext cx="1019317" cy="924054"/>
+          </a:xfrm>
+          <a:prstGeom prst="rect">
+            <a:avLst/>
+          </a:prstGeom>
+        </p:spPr>
+      </p:pic>
+      <p:pic>
+        <p:nvPicPr>
+          <p:cNvPr id="10" name="Image 9"/>
+          <p:cNvPicPr>
+            <a:picLocks noChangeAspect="1"/>
+          </p:cNvPicPr>
+          <p:nvPr/>
+        </p:nvPicPr>
+        <p:blipFill>
+          <a:blip r:embed="rId6">
+            <a:extLst>
+              <a:ext uri="{28A0092B-C50C-407E-A947-70E740481C1C}">
+                <a14:useLocalDpi xmlns:a14="http://schemas.microsoft.com/office/drawing/2010/main" val="0"/>
+              </a:ext>
+            </a:extLst>
+          </a:blip>
+          <a:stretch>
+            <a:fillRect/>
+          </a:stretch>
+        </p:blipFill>
+        <p:spPr>
+          <a:xfrm>
+            <a:off x="3309943" y="4305553"/>
+            <a:ext cx="1822622" cy="911311"/>
+          </a:xfrm>
+          <a:prstGeom prst="rect">
+            <a:avLst/>
+          </a:prstGeom>
+        </p:spPr>
+      </p:pic>
+      <p:pic>
+        <p:nvPicPr>
+          <p:cNvPr id="11" name="Image 10"/>
+          <p:cNvPicPr>
+            <a:picLocks noChangeAspect="1"/>
+          </p:cNvPicPr>
+          <p:nvPr/>
+        </p:nvPicPr>
+        <p:blipFill>
+          <a:blip r:embed="rId4">
+            <a:extLst>
+              <a:ext uri="{28A0092B-C50C-407E-A947-70E740481C1C}">
+                <a14:useLocalDpi xmlns:a14="http://schemas.microsoft.com/office/drawing/2010/main" val="0"/>
+              </a:ext>
+            </a:extLst>
+          </a:blip>
+          <a:stretch>
+            <a:fillRect/>
+          </a:stretch>
+        </p:blipFill>
+        <p:spPr>
+          <a:xfrm>
+            <a:off x="4937877" y="2216861"/>
+            <a:ext cx="962159" cy="866896"/>
+          </a:xfrm>
+          <a:prstGeom prst="rect">
+            <a:avLst/>
+          </a:prstGeom>
+        </p:spPr>
+      </p:pic>
+      <p:pic>
+        <p:nvPicPr>
+          <p:cNvPr id="13" name="Image 12"/>
+          <p:cNvPicPr>
+            <a:picLocks noChangeAspect="1"/>
+          </p:cNvPicPr>
+          <p:nvPr/>
+        </p:nvPicPr>
+        <p:blipFill>
+          <a:blip r:embed="rId7" cstate="print">
+            <a:extLst>
+              <a:ext uri="{28A0092B-C50C-407E-A947-70E740481C1C}">
+                <a14:useLocalDpi xmlns:a14="http://schemas.microsoft.com/office/drawing/2010/main" val="0"/>
+              </a:ext>
+            </a:extLst>
+          </a:blip>
+          <a:stretch>
+            <a:fillRect/>
+          </a:stretch>
+        </p:blipFill>
+        <p:spPr>
+          <a:xfrm>
+            <a:off x="6246757" y="1697733"/>
+            <a:ext cx="1192012" cy="1612016"/>
+          </a:xfrm>
+          <a:prstGeom prst="rect">
+            <a:avLst/>
+          </a:prstGeom>
+        </p:spPr>
+      </p:pic>
+      <p:pic>
+        <p:nvPicPr>
+          <p:cNvPr id="17" name="Image 16"/>
+          <p:cNvPicPr>
+            <a:picLocks noChangeAspect="1"/>
+          </p:cNvPicPr>
+          <p:nvPr/>
+        </p:nvPicPr>
+        <p:blipFill>
+          <a:blip r:embed="rId4">
+            <a:extLst>
+              <a:ext uri="{28A0092B-C50C-407E-A947-70E740481C1C}">
+                <a14:useLocalDpi xmlns:a14="http://schemas.microsoft.com/office/drawing/2010/main" val="0"/>
+              </a:ext>
+            </a:extLst>
+          </a:blip>
+          <a:stretch>
+            <a:fillRect/>
+          </a:stretch>
+        </p:blipFill>
+        <p:spPr>
+          <a:xfrm>
+            <a:off x="714326" y="5605861"/>
+            <a:ext cx="962159" cy="866896"/>
+          </a:xfrm>
+          <a:prstGeom prst="rect">
+            <a:avLst/>
+          </a:prstGeom>
+        </p:spPr>
+      </p:pic>
+      <p:pic>
+        <p:nvPicPr>
+          <p:cNvPr id="19" name="Image 18"/>
+          <p:cNvPicPr>
+            <a:picLocks noChangeAspect="1"/>
+          </p:cNvPicPr>
+          <p:nvPr/>
+        </p:nvPicPr>
+        <p:blipFill>
+          <a:blip r:embed="rId8" cstate="print">
+            <a:extLst>
+              <a:ext uri="{28A0092B-C50C-407E-A947-70E740481C1C}">
+                <a14:useLocalDpi xmlns:a14="http://schemas.microsoft.com/office/drawing/2010/main" val="0"/>
+              </a:ext>
+            </a:extLst>
+          </a:blip>
+          <a:stretch>
+            <a:fillRect/>
+          </a:stretch>
+        </p:blipFill>
+        <p:spPr>
+          <a:xfrm>
+            <a:off x="1908563" y="5027332"/>
+            <a:ext cx="1831415" cy="1831415"/>
+          </a:xfrm>
+          <a:prstGeom prst="rect">
+            <a:avLst/>
+          </a:prstGeom>
+        </p:spPr>
+      </p:pic>
+      <p:pic>
+        <p:nvPicPr>
+          <p:cNvPr id="20" name="Image 19"/>
+          <p:cNvPicPr>
+            <a:picLocks noChangeAspect="1"/>
+          </p:cNvPicPr>
+          <p:nvPr/>
+        </p:nvPicPr>
+        <p:blipFill>
+          <a:blip r:embed="rId4">
+            <a:extLst>
+              <a:ext uri="{28A0092B-C50C-407E-A947-70E740481C1C}">
+                <a14:useLocalDpi xmlns:a14="http://schemas.microsoft.com/office/drawing/2010/main" val="0"/>
+              </a:ext>
+            </a:extLst>
+          </a:blip>
+          <a:stretch>
+            <a:fillRect/>
+          </a:stretch>
+        </p:blipFill>
+        <p:spPr>
+          <a:xfrm>
+            <a:off x="3929070" y="5498770"/>
+            <a:ext cx="962159" cy="866896"/>
+          </a:xfrm>
+          <a:prstGeom prst="rect">
+            <a:avLst/>
+          </a:prstGeom>
+        </p:spPr>
+      </p:pic>
+      <p:pic>
+        <p:nvPicPr>
+          <p:cNvPr id="21" name="Image 20"/>
+          <p:cNvPicPr>
+            <a:picLocks noChangeAspect="1"/>
+          </p:cNvPicPr>
+          <p:nvPr/>
+        </p:nvPicPr>
+        <p:blipFill>
+          <a:blip r:embed="rId9" cstate="print">
+            <a:extLst>
+              <a:ext uri="{28A0092B-C50C-407E-A947-70E740481C1C}">
+                <a14:useLocalDpi xmlns:a14="http://schemas.microsoft.com/office/drawing/2010/main" val="0"/>
+              </a:ext>
+            </a:extLst>
+          </a:blip>
+          <a:stretch>
+            <a:fillRect/>
+          </a:stretch>
+        </p:blipFill>
+        <p:spPr>
+          <a:xfrm>
+            <a:off x="5132565" y="5019094"/>
+            <a:ext cx="3064149" cy="1661478"/>
+          </a:xfrm>
+          <a:prstGeom prst="rect">
+            <a:avLst/>
+          </a:prstGeom>
+        </p:spPr>
+      </p:pic>
+    </p:spTree>
+    <p:extLst>
+      <p:ext uri="{BB962C8B-B14F-4D97-AF65-F5344CB8AC3E}">
+        <p14:creationId xmlns:p14="http://schemas.microsoft.com/office/powerpoint/2010/main" val="2383702726"/>
+      </p:ext>
+    </p:extLst>
+  </p:cSld>
+  <p:clrMapOvr>
+    <a:masterClrMapping/>
+  </p:clrMapOvr>
+  <mc:AlternateContent xmlns:mc="http://schemas.openxmlformats.org/markup-compatibility/2006">
+    <mc:Choice xmlns:p14="http://schemas.microsoft.com/office/powerpoint/2010/main" Requires="p14">
+      <p:transition p14:dur="10"/>
+    </mc:Choice>
+    <mc:Fallback>
+      <p:transition/>
+    </mc:Fallback>
+  </mc:AlternateContent>
+  <p:timing>
+    <p:tnLst>
+      <p:par>
+        <p:cTn id="1" dur="indefinite" restart="never" nodeType="tmRoot"/>
+      </p:par>
+    </p:tnLst>
+  </p:timing>
+</p:sld>
+</file>
+
+<file path=ppt/slides/slide21.xml><?xml version="1.0" encoding="utf-8"?>
+<p:sld xmlns:a="http://schemas.openxmlformats.org/drawingml/2006/main" xmlns:r="http://schemas.openxmlformats.org/officeDocument/2006/relationships" xmlns:p="http://schemas.openxmlformats.org/presentationml/2006/main">
+  <p:cSld>
+    <p:spTree>
+      <p:nvGrpSpPr>
+        <p:cNvPr id="1" name=""/>
+        <p:cNvGrpSpPr/>
+        <p:nvPr/>
+      </p:nvGrpSpPr>
+      <p:grpSpPr>
+        <a:xfrm>
+          <a:off x="0" y="0"/>
+          <a:ext cx="0" cy="0"/>
+          <a:chOff x="0" y="0"/>
+          <a:chExt cx="0" cy="0"/>
+        </a:xfrm>
+      </p:grpSpPr>
+      <p:sp>
+        <p:nvSpPr>
+          <p:cNvPr id="2" name="Titre 1"/>
+          <p:cNvSpPr>
+            <a:spLocks noGrp="1"/>
+          </p:cNvSpPr>
+          <p:nvPr>
+            <p:ph type="title"/>
+          </p:nvPr>
+        </p:nvSpPr>
+        <p:spPr/>
+        <p:txBody>
+          <a:bodyPr>
+            <a:normAutofit/>
+          </a:bodyPr>
+          <a:lstStyle/>
+          <a:p>
+            <a:r>
+              <a:rPr lang="fr-CA" sz="3000" dirty="0"/>
+              <a:t>Conclusion</a:t>
+            </a:r>
+          </a:p>
+        </p:txBody>
+      </p:sp>
+      <p:sp>
+        <p:nvSpPr>
+          <p:cNvPr id="3" name="Espace réservé du contenu 2"/>
+          <p:cNvSpPr>
+            <a:spLocks noGrp="1"/>
+          </p:cNvSpPr>
+          <p:nvPr>
+            <p:ph idx="1"/>
+          </p:nvPr>
+        </p:nvSpPr>
+        <p:spPr/>
+        <p:txBody>
+          <a:bodyPr/>
+          <a:lstStyle/>
+          <a:p>
+            <a:r>
+              <a:rPr lang="fr-CA" dirty="0" smtClean="0"/>
+              <a:t>Résumé de l’application </a:t>
+            </a:r>
+          </a:p>
+          <a:p>
+            <a:r>
+              <a:rPr lang="fr-CA" dirty="0" smtClean="0"/>
+              <a:t>Fonctionnement de de l’équipe</a:t>
+            </a:r>
+          </a:p>
+          <a:p>
+            <a:r>
+              <a:rPr lang="fr-CA" dirty="0" smtClean="0"/>
+              <a:t>Recommandations et suggestions </a:t>
+            </a:r>
+            <a:endParaRPr lang="fr-CA" dirty="0"/>
+          </a:p>
+        </p:txBody>
+      </p:sp>
+    </p:spTree>
+    <p:extLst>
+      <p:ext uri="{BB962C8B-B14F-4D97-AF65-F5344CB8AC3E}">
+        <p14:creationId xmlns:p14="http://schemas.microsoft.com/office/powerpoint/2010/main" val="2435794121"/>
+      </p:ext>
+    </p:extLst>
+  </p:cSld>
+  <p:clrMapOvr>
+    <a:masterClrMapping/>
+  </p:clrMapOvr>
+  <p:timing>
+    <p:tnLst>
+      <p:par>
+        <p:cTn id="1" dur="indefinite" restart="never" nodeType="tmRoot"/>
+      </p:par>
+    </p:tnLst>
+  </p:timing>
+</p:sld>
+</file>
+
+<file path=ppt/slides/slide22.xml><?xml version="1.0" encoding="utf-8"?>
+<p:sld xmlns:a="http://schemas.openxmlformats.org/drawingml/2006/main" xmlns:r="http://schemas.openxmlformats.org/officeDocument/2006/relationships" xmlns:p="http://schemas.openxmlformats.org/presentationml/2006/main">
+  <p:cSld>
+    <p:spTree>
+      <p:nvGrpSpPr>
+        <p:cNvPr id="1" name=""/>
+        <p:cNvGrpSpPr/>
+        <p:nvPr/>
+      </p:nvGrpSpPr>
+      <p:grpSpPr>
+        <a:xfrm>
+          <a:off x="0" y="0"/>
+          <a:ext cx="0" cy="0"/>
+          <a:chOff x="0" y="0"/>
+          <a:chExt cx="0" cy="0"/>
+        </a:xfrm>
+      </p:grpSpPr>
+      <p:sp>
+        <p:nvSpPr>
+          <p:cNvPr id="2" name="Titre 1"/>
+          <p:cNvSpPr>
+            <a:spLocks noGrp="1"/>
+          </p:cNvSpPr>
+          <p:nvPr>
+            <p:ph type="title"/>
+          </p:nvPr>
+        </p:nvSpPr>
+        <p:spPr>
+          <a:xfrm>
             <a:off x="0" y="0"/>
             <a:ext cx="9144000" cy="6858000"/>
           </a:xfrm>
@@ -7532,7 +8317,6 @@
               <a:rPr lang="fr-CA" dirty="0"/>
               <a:t>Questions</a:t>
             </a:r>
-            <a:endParaRPr lang="fr-CA" dirty="0"/>
           </a:p>
         </p:txBody>
       </p:sp>
@@ -7556,7 +8340,7 @@
 </p:sld>
 </file>
 
-<file path=ppt/slides/slide21.xml><?xml version="1.0" encoding="utf-8"?>
+<file path=ppt/slides/slide23.xml><?xml version="1.0" encoding="utf-8"?>
 <p:sld xmlns:a="http://schemas.openxmlformats.org/drawingml/2006/main" xmlns:r="http://schemas.openxmlformats.org/officeDocument/2006/relationships" xmlns:p="http://schemas.openxmlformats.org/presentationml/2006/main">
   <p:cSld>
     <p:spTree>
@@ -7679,24 +8463,14 @@
           <a:p>
             <a:r>
               <a:rPr lang="fr-CA" dirty="0" smtClean="0"/>
-              <a:t>Notre </a:t>
-            </a:r>
+              <a:t>Notre Mandat</a:t>
+            </a:r>
+          </a:p>
+          <a:p>
             <a:r>
               <a:rPr lang="fr-CA" dirty="0" smtClean="0"/>
-              <a:t>Mandat</a:t>
-            </a:r>
-            <a:endParaRPr lang="fr-CA" dirty="0" smtClean="0"/>
-          </a:p>
-          <a:p>
-            <a:r>
-              <a:rPr lang="fr-CA" dirty="0" smtClean="0"/>
-              <a:t>Contexte du </a:t>
-            </a:r>
-            <a:r>
-              <a:rPr lang="fr-CA" dirty="0" smtClean="0"/>
-              <a:t>projet</a:t>
-            </a:r>
-            <a:endParaRPr lang="fr-CA" dirty="0" smtClean="0"/>
+              <a:t>Contexte du projet</a:t>
+            </a:r>
           </a:p>
           <a:p>
             <a:r>

</xml_diff>

<commit_message>
Fusion de 2 étapes et correction de fautes
</commit_message>
<xml_diff>
--- a/Gestion de projet/Présentations/PowerPoint.pptx
+++ b/Gestion de projet/Présentations/PowerPoint.pptx
@@ -23,12 +23,11 @@
     <p:sldId id="269" r:id="rId17"/>
     <p:sldId id="270" r:id="rId18"/>
     <p:sldId id="271" r:id="rId19"/>
-    <p:sldId id="272" r:id="rId20"/>
-    <p:sldId id="277" r:id="rId21"/>
-    <p:sldId id="278" r:id="rId22"/>
-    <p:sldId id="273" r:id="rId23"/>
-    <p:sldId id="275" r:id="rId24"/>
-    <p:sldId id="276" r:id="rId25"/>
+    <p:sldId id="277" r:id="rId20"/>
+    <p:sldId id="278" r:id="rId21"/>
+    <p:sldId id="273" r:id="rId22"/>
+    <p:sldId id="275" r:id="rId23"/>
+    <p:sldId id="276" r:id="rId24"/>
   </p:sldIdLst>
   <p:sldSz cx="9144000" cy="6858000" type="screen4x3"/>
   <p:notesSz cx="6858000" cy="9144000"/>
@@ -288,7 +287,7 @@
           <a:p>
             <a:fld id="{A8224893-DBDA-4BFA-9CE1-4BFE7CD0F8CF}" type="datetime1">
               <a:rPr lang="en-US" smtClean="0"/>
-              <a:t>12/16/2016</a:t>
+              <a:t>12/17/2016</a:t>
             </a:fld>
             <a:endParaRPr lang="en-US"/>
           </a:p>
@@ -458,7 +457,7 @@
           <a:p>
             <a:fld id="{5F4E5243-F52A-4D37-9694-EB26C6C31910}" type="datetime1">
               <a:rPr lang="en-US" smtClean="0"/>
-              <a:t>12/16/2016</a:t>
+              <a:t>12/17/2016</a:t>
             </a:fld>
             <a:endParaRPr lang="en-US"/>
           </a:p>
@@ -638,7 +637,7 @@
           <a:p>
             <a:fld id="{3A77B6E1-634A-48DC-9E8B-D894023267EF}" type="datetime1">
               <a:rPr lang="en-US" smtClean="0"/>
-              <a:t>12/16/2016</a:t>
+              <a:t>12/17/2016</a:t>
             </a:fld>
             <a:endParaRPr lang="en-US"/>
           </a:p>
@@ -906,7 +905,7 @@
           <a:p>
             <a:fld id="{A8224893-DBDA-4BFA-9CE1-4BFE7CD0F8CF}" type="datetime1">
               <a:rPr lang="en-US" smtClean="0"/>
-              <a:t>12/16/2016</a:t>
+              <a:t>12/17/2016</a:t>
             </a:fld>
             <a:endParaRPr lang="en-US"/>
           </a:p>
@@ -1098,7 +1097,7 @@
           <a:p>
             <a:fld id="{7B2D3E9E-A95C-48F2-B4BF-A71542E0BE9A}" type="datetime1">
               <a:rPr lang="en-US" smtClean="0"/>
-              <a:t>12/16/2016</a:t>
+              <a:t>12/17/2016</a:t>
             </a:fld>
             <a:endParaRPr lang="en-US"/>
           </a:p>
@@ -1352,7 +1351,7 @@
           <a:p>
             <a:fld id="{A50F84E2-2D7A-43CF-AC90-352A289A783A}" type="datetime1">
               <a:rPr lang="en-US" smtClean="0"/>
-              <a:t>12/16/2016</a:t>
+              <a:t>12/17/2016</a:t>
             </a:fld>
             <a:endParaRPr lang="en-US"/>
           </a:p>
@@ -1678,7 +1677,7 @@
           <a:p>
             <a:fld id="{F12952B5-7A2F-4CC8-B7CE-9234E21C2837}" type="datetime1">
               <a:rPr lang="en-US" smtClean="0"/>
-              <a:t>12/16/2016</a:t>
+              <a:t>12/17/2016</a:t>
             </a:fld>
             <a:endParaRPr lang="en-US"/>
           </a:p>
@@ -2098,7 +2097,7 @@
           <a:p>
             <a:fld id="{CE1DA07A-9201-4B4B-BAF2-015AFA30F520}" type="datetime1">
               <a:rPr lang="en-US" smtClean="0"/>
-              <a:t>12/16/2016</a:t>
+              <a:t>12/17/2016</a:t>
             </a:fld>
             <a:endParaRPr lang="en-US"/>
           </a:p>
@@ -2216,7 +2215,7 @@
           <a:p>
             <a:fld id="{73D7E00A-486F-4252-8B1D-E32645521F49}" type="datetime1">
               <a:rPr lang="en-US" smtClean="0"/>
-              <a:t>12/16/2016</a:t>
+              <a:t>12/17/2016</a:t>
             </a:fld>
             <a:endParaRPr lang="en-US"/>
           </a:p>
@@ -2311,7 +2310,7 @@
           <a:p>
             <a:fld id="{8DDF5F92-E675-4B36-9A60-69A962A68675}" type="datetime1">
               <a:rPr lang="en-US" smtClean="0"/>
-              <a:t>12/16/2016</a:t>
+              <a:t>12/17/2016</a:t>
             </a:fld>
             <a:endParaRPr lang="en-US"/>
           </a:p>
@@ -2598,7 +2597,7 @@
           <a:p>
             <a:fld id="{AF6E2C9B-5FA2-460D-9BE7-B0812FC2A6FF}" type="datetime1">
               <a:rPr lang="en-US" smtClean="0"/>
-              <a:t>12/16/2016</a:t>
+              <a:t>12/17/2016</a:t>
             </a:fld>
             <a:endParaRPr lang="en-US"/>
           </a:p>
@@ -2768,7 +2767,7 @@
           <a:p>
             <a:fld id="{7B2D3E9E-A95C-48F2-B4BF-A71542E0BE9A}" type="datetime1">
               <a:rPr lang="en-US" smtClean="0"/>
-              <a:t>12/16/2016</a:t>
+              <a:t>12/17/2016</a:t>
             </a:fld>
             <a:endParaRPr lang="en-US"/>
           </a:p>
@@ -3093,7 +3092,7 @@
           <a:p>
             <a:fld id="{1D374940-A916-4C8B-9648-02A2D3898F9E}" type="datetime1">
               <a:rPr lang="en-US" smtClean="0"/>
-              <a:t>12/16/2016</a:t>
+              <a:t>12/17/2016</a:t>
             </a:fld>
             <a:endParaRPr lang="en-US"/>
           </a:p>
@@ -3263,7 +3262,7 @@
           <a:p>
             <a:fld id="{5F4E5243-F52A-4D37-9694-EB26C6C31910}" type="datetime1">
               <a:rPr lang="en-US" smtClean="0"/>
-              <a:t>12/16/2016</a:t>
+              <a:t>12/17/2016</a:t>
             </a:fld>
             <a:endParaRPr lang="en-US"/>
           </a:p>
@@ -3443,7 +3442,7 @@
           <a:p>
             <a:fld id="{3A77B6E1-634A-48DC-9E8B-D894023267EF}" type="datetime1">
               <a:rPr lang="en-US" smtClean="0"/>
-              <a:t>12/16/2016</a:t>
+              <a:t>12/17/2016</a:t>
             </a:fld>
             <a:endParaRPr lang="en-US"/>
           </a:p>
@@ -3694,7 +3693,7 @@
           <a:p>
             <a:fld id="{A50F84E2-2D7A-43CF-AC90-352A289A783A}" type="datetime1">
               <a:rPr lang="en-US" smtClean="0"/>
-              <a:t>12/16/2016</a:t>
+              <a:t>12/17/2016</a:t>
             </a:fld>
             <a:endParaRPr lang="en-US"/>
           </a:p>
@@ -3926,7 +3925,7 @@
           <a:p>
             <a:fld id="{F12952B5-7A2F-4CC8-B7CE-9234E21C2837}" type="datetime1">
               <a:rPr lang="en-US" smtClean="0"/>
-              <a:t>12/16/2016</a:t>
+              <a:t>12/17/2016</a:t>
             </a:fld>
             <a:endParaRPr lang="en-US"/>
           </a:p>
@@ -4268,7 +4267,7 @@
           <a:p>
             <a:fld id="{CE1DA07A-9201-4B4B-BAF2-015AFA30F520}" type="datetime1">
               <a:rPr lang="en-US" smtClean="0"/>
-              <a:t>12/16/2016</a:t>
+              <a:t>12/17/2016</a:t>
             </a:fld>
             <a:endParaRPr lang="en-US"/>
           </a:p>
@@ -4381,7 +4380,7 @@
           <a:p>
             <a:fld id="{73D7E00A-486F-4252-8B1D-E32645521F49}" type="datetime1">
               <a:rPr lang="en-US" smtClean="0"/>
-              <a:t>12/16/2016</a:t>
+              <a:t>12/17/2016</a:t>
             </a:fld>
             <a:endParaRPr lang="en-US"/>
           </a:p>
@@ -4499,7 +4498,7 @@
           <a:p>
             <a:fld id="{8DDF5F92-E675-4B36-9A60-69A962A68675}" type="datetime1">
               <a:rPr lang="en-US" smtClean="0"/>
-              <a:t>12/16/2016</a:t>
+              <a:t>12/17/2016</a:t>
             </a:fld>
             <a:endParaRPr lang="en-US"/>
           </a:p>
@@ -4783,7 +4782,7 @@
           <a:p>
             <a:fld id="{AF6E2C9B-5FA2-460D-9BE7-B0812FC2A6FF}" type="datetime1">
               <a:rPr lang="en-US" smtClean="0"/>
-              <a:t>12/16/2016</a:t>
+              <a:t>12/17/2016</a:t>
             </a:fld>
             <a:endParaRPr lang="en-US"/>
           </a:p>
@@ -5047,7 +5046,7 @@
           <a:p>
             <a:fld id="{1D374940-A916-4C8B-9648-02A2D3898F9E}" type="datetime1">
               <a:rPr lang="en-US" smtClean="0"/>
-              <a:t>12/16/2016</a:t>
+              <a:t>12/17/2016</a:t>
             </a:fld>
             <a:endParaRPr lang="en-US"/>
           </a:p>
@@ -5261,7 +5260,7 @@
           <a:p>
             <a:fld id="{5586B75A-687E-405C-8A0B-8D00578BA2C3}" type="datetime1">
               <a:rPr lang="en-US" smtClean="0"/>
-              <a:t>12/16/2016</a:t>
+              <a:t>12/17/2016</a:t>
             </a:fld>
             <a:endParaRPr lang="en-US"/>
           </a:p>
@@ -5827,7 +5826,7 @@
           <a:p>
             <a:fld id="{5586B75A-687E-405C-8A0B-8D00578BA2C3}" type="datetime1">
               <a:rPr lang="en-US" smtClean="0"/>
-              <a:t>12/16/2016</a:t>
+              <a:t>12/17/2016</a:t>
             </a:fld>
             <a:endParaRPr lang="en-US"/>
           </a:p>
@@ -7129,12 +7128,8 @@
               <a:t>Démonstration </a:t>
             </a:r>
             <a:r>
-              <a:rPr lang="fr-CA" sz="3000" dirty="0"/>
-              <a:t>de l’application </a:t>
-            </a:r>
-            <a:r>
               <a:rPr lang="fr-CA" sz="3000" dirty="0" smtClean="0"/>
-              <a:t>Web</a:t>
+              <a:t>d’ECJ</a:t>
             </a:r>
             <a:endParaRPr lang="fr-CA" sz="3000" dirty="0"/>
           </a:p>
@@ -7142,7 +7137,7 @@
       </p:sp>
       <p:pic>
         <p:nvPicPr>
-          <p:cNvPr id="6" name="Espace réservé du contenu 5"/>
+          <p:cNvPr id="7" name="Espace réservé du contenu 3"/>
           <p:cNvPicPr>
             <a:picLocks noGrp="1" noChangeAspect="1"/>
           </p:cNvPicPr>
@@ -7151,7 +7146,7 @@
           </p:nvPr>
         </p:nvPicPr>
         <p:blipFill>
-          <a:blip r:embed="rId2" cstate="print">
+          <a:blip r:embed="rId2">
             <a:extLst>
               <a:ext uri="{28A0092B-C50C-407E-A947-70E740481C1C}">
                 <a14:useLocalDpi xmlns:a14="http://schemas.microsoft.com/office/drawing/2010/main" val="0"/>
@@ -7164,14 +7159,9 @@
         </p:blipFill>
         <p:spPr>
           <a:xfrm>
-            <a:off x="946548" y="2493367"/>
-            <a:ext cx="6638104" cy="2832911"/>
+            <a:off x="1129904" y="2735461"/>
+            <a:ext cx="6079331" cy="2250281"/>
           </a:xfrm>
-          <a:ln>
-            <a:solidFill>
-              <a:schemeClr val="tx1"/>
-            </a:solidFill>
-          </a:ln>
         </p:spPr>
       </p:pic>
     </p:spTree>
@@ -7195,96 +7185,6 @@
 </file>
 
 <file path=ppt/slides/slide18.xml><?xml version="1.0" encoding="utf-8"?>
-<p:sld xmlns:a="http://schemas.openxmlformats.org/drawingml/2006/main" xmlns:r="http://schemas.openxmlformats.org/officeDocument/2006/relationships" xmlns:p="http://schemas.openxmlformats.org/presentationml/2006/main">
-  <p:cSld>
-    <p:spTree>
-      <p:nvGrpSpPr>
-        <p:cNvPr id="1" name=""/>
-        <p:cNvGrpSpPr/>
-        <p:nvPr/>
-      </p:nvGrpSpPr>
-      <p:grpSpPr>
-        <a:xfrm>
-          <a:off x="0" y="0"/>
-          <a:ext cx="0" cy="0"/>
-          <a:chOff x="0" y="0"/>
-          <a:chExt cx="0" cy="0"/>
-        </a:xfrm>
-      </p:grpSpPr>
-      <p:sp>
-        <p:nvSpPr>
-          <p:cNvPr id="2" name="Titre 1"/>
-          <p:cNvSpPr>
-            <a:spLocks noGrp="1"/>
-          </p:cNvSpPr>
-          <p:nvPr>
-            <p:ph type="title"/>
-          </p:nvPr>
-        </p:nvSpPr>
-        <p:spPr/>
-        <p:txBody>
-          <a:bodyPr>
-            <a:normAutofit/>
-          </a:bodyPr>
-          <a:lstStyle/>
-          <a:p>
-            <a:r>
-              <a:rPr lang="fr-CA" sz="3000" dirty="0"/>
-              <a:t>Création d’un évènement au complet</a:t>
-            </a:r>
-          </a:p>
-        </p:txBody>
-      </p:sp>
-      <p:pic>
-        <p:nvPicPr>
-          <p:cNvPr id="4" name="Espace réservé du contenu 3"/>
-          <p:cNvPicPr>
-            <a:picLocks noGrp="1" noChangeAspect="1"/>
-          </p:cNvPicPr>
-          <p:nvPr>
-            <p:ph idx="1"/>
-          </p:nvPr>
-        </p:nvPicPr>
-        <p:blipFill>
-          <a:blip r:embed="rId2">
-            <a:extLst>
-              <a:ext uri="{28A0092B-C50C-407E-A947-70E740481C1C}">
-                <a14:useLocalDpi xmlns:a14="http://schemas.microsoft.com/office/drawing/2010/main" val="0"/>
-              </a:ext>
-            </a:extLst>
-          </a:blip>
-          <a:stretch>
-            <a:fillRect/>
-          </a:stretch>
-        </p:blipFill>
-        <p:spPr>
-          <a:xfrm>
-            <a:off x="1129904" y="2735461"/>
-            <a:ext cx="6079331" cy="2250281"/>
-          </a:xfrm>
-        </p:spPr>
-      </p:pic>
-    </p:spTree>
-    <p:extLst>
-      <p:ext uri="{BB962C8B-B14F-4D97-AF65-F5344CB8AC3E}">
-        <p14:creationId xmlns:p14="http://schemas.microsoft.com/office/powerpoint/2010/main" val="4031654824"/>
-      </p:ext>
-    </p:extLst>
-  </p:cSld>
-  <p:clrMapOvr>
-    <a:masterClrMapping/>
-  </p:clrMapOvr>
-  <p:timing>
-    <p:tnLst>
-      <p:par>
-        <p:cTn id="1" dur="indefinite" restart="never" nodeType="tmRoot"/>
-      </p:par>
-    </p:tnLst>
-  </p:timing>
-</p:sld>
-</file>
-
-<file path=ppt/slides/slide19.xml><?xml version="1.0" encoding="utf-8"?>
 <p:sld xmlns:a="http://schemas.openxmlformats.org/drawingml/2006/main" xmlns:r="http://schemas.openxmlformats.org/officeDocument/2006/relationships" xmlns:p="http://schemas.openxmlformats.org/presentationml/2006/main">
   <p:cSld>
     <p:spTree>
@@ -7648,134 +7548,7 @@
 </p:sld>
 </file>
 
-<file path=ppt/slides/slide2.xml><?xml version="1.0" encoding="utf-8"?>
-<p:sld xmlns:a="http://schemas.openxmlformats.org/drawingml/2006/main" xmlns:r="http://schemas.openxmlformats.org/officeDocument/2006/relationships" xmlns:p="http://schemas.openxmlformats.org/presentationml/2006/main">
-  <p:cSld>
-    <p:spTree>
-      <p:nvGrpSpPr>
-        <p:cNvPr id="1" name=""/>
-        <p:cNvGrpSpPr/>
-        <p:nvPr/>
-      </p:nvGrpSpPr>
-      <p:grpSpPr>
-        <a:xfrm>
-          <a:off x="0" y="0"/>
-          <a:ext cx="0" cy="0"/>
-          <a:chOff x="0" y="0"/>
-          <a:chExt cx="0" cy="0"/>
-        </a:xfrm>
-      </p:grpSpPr>
-      <p:sp>
-        <p:nvSpPr>
-          <p:cNvPr id="2" name="Titre 1"/>
-          <p:cNvSpPr>
-            <a:spLocks noGrp="1"/>
-          </p:cNvSpPr>
-          <p:nvPr>
-            <p:ph type="title"/>
-          </p:nvPr>
-        </p:nvSpPr>
-        <p:spPr/>
-        <p:txBody>
-          <a:bodyPr/>
-          <a:lstStyle/>
-          <a:p>
-            <a:r>
-              <a:rPr lang="fr-CA" sz="3000" dirty="0" smtClean="0"/>
-              <a:t>Contenu de la présentation</a:t>
-            </a:r>
-            <a:endParaRPr lang="fr-CA" sz="3000" dirty="0"/>
-          </a:p>
-        </p:txBody>
-      </p:sp>
-      <p:sp>
-        <p:nvSpPr>
-          <p:cNvPr id="3" name="Espace réservé du contenu 2"/>
-          <p:cNvSpPr>
-            <a:spLocks noGrp="1"/>
-          </p:cNvSpPr>
-          <p:nvPr>
-            <p:ph idx="1"/>
-          </p:nvPr>
-        </p:nvSpPr>
-        <p:spPr/>
-        <p:txBody>
-          <a:bodyPr/>
-          <a:lstStyle/>
-          <a:p>
-            <a:r>
-              <a:rPr lang="fr-CA" dirty="0" smtClean="0"/>
-              <a:t>Introduction</a:t>
-            </a:r>
-          </a:p>
-          <a:p>
-            <a:r>
-              <a:rPr lang="fr-CA" dirty="0" smtClean="0"/>
-              <a:t>Présentation de la console d’administration</a:t>
-            </a:r>
-            <a:endParaRPr lang="fr-CA" dirty="0"/>
-          </a:p>
-          <a:p>
-            <a:r>
-              <a:rPr lang="fr-CA" dirty="0" smtClean="0"/>
-              <a:t>Démonstration de l’application Web</a:t>
-            </a:r>
-          </a:p>
-          <a:p>
-            <a:r>
-              <a:rPr lang="fr-CA" dirty="0" smtClean="0"/>
-              <a:t>Création d’un évènement au </a:t>
-            </a:r>
-            <a:r>
-              <a:rPr lang="fr-CA" dirty="0" smtClean="0"/>
-              <a:t>complet</a:t>
-            </a:r>
-          </a:p>
-          <a:p>
-            <a:r>
-              <a:rPr lang="fr-CA" dirty="0" smtClean="0"/>
-              <a:t>Technologies utilisées</a:t>
-            </a:r>
-          </a:p>
-          <a:p>
-            <a:r>
-              <a:rPr lang="fr-CA" dirty="0" smtClean="0"/>
-              <a:t>Volet technique de l’application</a:t>
-            </a:r>
-            <a:endParaRPr lang="fr-CA" dirty="0" smtClean="0"/>
-          </a:p>
-          <a:p>
-            <a:r>
-              <a:rPr lang="fr-CA" dirty="0" smtClean="0"/>
-              <a:t>Conclusion</a:t>
-            </a:r>
-          </a:p>
-          <a:p>
-            <a:endParaRPr lang="fr-CA" dirty="0"/>
-          </a:p>
-        </p:txBody>
-      </p:sp>
-    </p:spTree>
-    <p:extLst>
-      <p:ext uri="{BB962C8B-B14F-4D97-AF65-F5344CB8AC3E}">
-        <p14:creationId xmlns:p14="http://schemas.microsoft.com/office/powerpoint/2010/main" val="3365026024"/>
-      </p:ext>
-    </p:extLst>
-  </p:cSld>
-  <p:clrMapOvr>
-    <a:masterClrMapping/>
-  </p:clrMapOvr>
-  <p:timing>
-    <p:tnLst>
-      <p:par>
-        <p:cTn id="1" dur="indefinite" restart="never" nodeType="tmRoot"/>
-      </p:par>
-    </p:tnLst>
-  </p:timing>
-</p:sld>
-</file>
-
-<file path=ppt/slides/slide20.xml><?xml version="1.0" encoding="utf-8"?>
+<file path=ppt/slides/slide19.xml><?xml version="1.0" encoding="utf-8"?>
 <p:sld xmlns:a="http://schemas.openxmlformats.org/drawingml/2006/main" xmlns:r="http://schemas.openxmlformats.org/officeDocument/2006/relationships" xmlns:p="http://schemas.openxmlformats.org/presentationml/2006/main">
   <p:cSld>
     <p:spTree>
@@ -8161,14 +7934,242 @@
   <p:clrMapOvr>
     <a:masterClrMapping/>
   </p:clrMapOvr>
-  <mc:AlternateContent xmlns:mc="http://schemas.openxmlformats.org/markup-compatibility/2006">
-    <mc:Choice xmlns:p14="http://schemas.microsoft.com/office/powerpoint/2010/main" Requires="p14">
+  <mc:AlternateContent xmlns:mc="http://schemas.openxmlformats.org/markup-compatibility/2006" xmlns:p14="http://schemas.microsoft.com/office/powerpoint/2010/main">
+    <mc:Choice Requires="p14">
       <p:transition p14:dur="10"/>
     </mc:Choice>
-    <mc:Fallback>
+    <mc:Fallback xmlns="">
       <p:transition/>
     </mc:Fallback>
   </mc:AlternateContent>
+  <p:timing>
+    <p:tnLst>
+      <p:par>
+        <p:cTn id="1" dur="indefinite" restart="never" nodeType="tmRoot"/>
+      </p:par>
+    </p:tnLst>
+  </p:timing>
+</p:sld>
+</file>
+
+<file path=ppt/slides/slide2.xml><?xml version="1.0" encoding="utf-8"?>
+<p:sld xmlns:a="http://schemas.openxmlformats.org/drawingml/2006/main" xmlns:r="http://schemas.openxmlformats.org/officeDocument/2006/relationships" xmlns:p="http://schemas.openxmlformats.org/presentationml/2006/main">
+  <p:cSld>
+    <p:spTree>
+      <p:nvGrpSpPr>
+        <p:cNvPr id="1" name=""/>
+        <p:cNvGrpSpPr/>
+        <p:nvPr/>
+      </p:nvGrpSpPr>
+      <p:grpSpPr>
+        <a:xfrm>
+          <a:off x="0" y="0"/>
+          <a:ext cx="0" cy="0"/>
+          <a:chOff x="0" y="0"/>
+          <a:chExt cx="0" cy="0"/>
+        </a:xfrm>
+      </p:grpSpPr>
+      <p:sp>
+        <p:nvSpPr>
+          <p:cNvPr id="2" name="Titre 1"/>
+          <p:cNvSpPr>
+            <a:spLocks noGrp="1"/>
+          </p:cNvSpPr>
+          <p:nvPr>
+            <p:ph type="title"/>
+          </p:nvPr>
+        </p:nvSpPr>
+        <p:spPr/>
+        <p:txBody>
+          <a:bodyPr/>
+          <a:lstStyle/>
+          <a:p>
+            <a:r>
+              <a:rPr lang="fr-CA" sz="3000" dirty="0" smtClean="0"/>
+              <a:t>Contenu de la présentation</a:t>
+            </a:r>
+            <a:endParaRPr lang="fr-CA" sz="3000" dirty="0"/>
+          </a:p>
+        </p:txBody>
+      </p:sp>
+      <p:sp>
+        <p:nvSpPr>
+          <p:cNvPr id="3" name="Espace réservé du contenu 2"/>
+          <p:cNvSpPr>
+            <a:spLocks noGrp="1"/>
+          </p:cNvSpPr>
+          <p:nvPr>
+            <p:ph idx="1"/>
+          </p:nvPr>
+        </p:nvSpPr>
+        <p:spPr/>
+        <p:txBody>
+          <a:bodyPr/>
+          <a:lstStyle/>
+          <a:p>
+            <a:r>
+              <a:rPr lang="fr-CA" dirty="0" smtClean="0"/>
+              <a:t>Introduction</a:t>
+            </a:r>
+          </a:p>
+          <a:p>
+            <a:r>
+              <a:rPr lang="fr-CA" dirty="0" smtClean="0"/>
+              <a:t>Présentation de la console d’administration</a:t>
+            </a:r>
+            <a:endParaRPr lang="fr-CA" dirty="0"/>
+          </a:p>
+          <a:p>
+            <a:r>
+              <a:rPr lang="fr-CA" dirty="0" smtClean="0"/>
+              <a:t>Démonstration </a:t>
+            </a:r>
+            <a:r>
+              <a:rPr lang="fr-CA" dirty="0" smtClean="0"/>
+              <a:t>d’ECJ</a:t>
+            </a:r>
+          </a:p>
+          <a:p>
+            <a:r>
+              <a:rPr lang="fr-CA" dirty="0" smtClean="0"/>
+              <a:t>Technologies </a:t>
+            </a:r>
+            <a:r>
+              <a:rPr lang="fr-CA" dirty="0" smtClean="0"/>
+              <a:t>utilisées</a:t>
+            </a:r>
+          </a:p>
+          <a:p>
+            <a:r>
+              <a:rPr lang="fr-CA" dirty="0" smtClean="0"/>
+              <a:t>Volet technique de l’application</a:t>
+            </a:r>
+          </a:p>
+          <a:p>
+            <a:r>
+              <a:rPr lang="fr-CA" dirty="0" smtClean="0"/>
+              <a:t>Conclusion</a:t>
+            </a:r>
+          </a:p>
+          <a:p>
+            <a:endParaRPr lang="fr-CA" dirty="0"/>
+          </a:p>
+        </p:txBody>
+      </p:sp>
+    </p:spTree>
+    <p:extLst>
+      <p:ext uri="{BB962C8B-B14F-4D97-AF65-F5344CB8AC3E}">
+        <p14:creationId xmlns:p14="http://schemas.microsoft.com/office/powerpoint/2010/main" val="3365026024"/>
+      </p:ext>
+    </p:extLst>
+  </p:cSld>
+  <p:clrMapOvr>
+    <a:masterClrMapping/>
+  </p:clrMapOvr>
+  <p:timing>
+    <p:tnLst>
+      <p:par>
+        <p:cTn id="1" dur="indefinite" restart="never" nodeType="tmRoot"/>
+      </p:par>
+    </p:tnLst>
+  </p:timing>
+</p:sld>
+</file>
+
+<file path=ppt/slides/slide20.xml><?xml version="1.0" encoding="utf-8"?>
+<p:sld xmlns:a="http://schemas.openxmlformats.org/drawingml/2006/main" xmlns:r="http://schemas.openxmlformats.org/officeDocument/2006/relationships" xmlns:p="http://schemas.openxmlformats.org/presentationml/2006/main">
+  <p:cSld>
+    <p:spTree>
+      <p:nvGrpSpPr>
+        <p:cNvPr id="1" name=""/>
+        <p:cNvGrpSpPr/>
+        <p:nvPr/>
+      </p:nvGrpSpPr>
+      <p:grpSpPr>
+        <a:xfrm>
+          <a:off x="0" y="0"/>
+          <a:ext cx="0" cy="0"/>
+          <a:chOff x="0" y="0"/>
+          <a:chExt cx="0" cy="0"/>
+        </a:xfrm>
+      </p:grpSpPr>
+      <p:sp>
+        <p:nvSpPr>
+          <p:cNvPr id="2" name="Titre 1"/>
+          <p:cNvSpPr>
+            <a:spLocks noGrp="1"/>
+          </p:cNvSpPr>
+          <p:nvPr>
+            <p:ph type="title"/>
+          </p:nvPr>
+        </p:nvSpPr>
+        <p:spPr/>
+        <p:txBody>
+          <a:bodyPr>
+            <a:normAutofit/>
+          </a:bodyPr>
+          <a:lstStyle/>
+          <a:p>
+            <a:r>
+              <a:rPr lang="fr-CA" sz="3000" dirty="0"/>
+              <a:t>Conclusion</a:t>
+            </a:r>
+          </a:p>
+        </p:txBody>
+      </p:sp>
+      <p:sp>
+        <p:nvSpPr>
+          <p:cNvPr id="3" name="Espace réservé du contenu 2"/>
+          <p:cNvSpPr>
+            <a:spLocks noGrp="1"/>
+          </p:cNvSpPr>
+          <p:nvPr>
+            <p:ph idx="1"/>
+          </p:nvPr>
+        </p:nvSpPr>
+        <p:spPr/>
+        <p:txBody>
+          <a:bodyPr/>
+          <a:lstStyle/>
+          <a:p>
+            <a:r>
+              <a:rPr lang="fr-CA" dirty="0" smtClean="0"/>
+              <a:t>Résumé de l’application </a:t>
+            </a:r>
+          </a:p>
+          <a:p>
+            <a:r>
+              <a:rPr lang="fr-CA" dirty="0" smtClean="0"/>
+              <a:t>Fonctionnement </a:t>
+            </a:r>
+            <a:r>
+              <a:rPr lang="fr-CA" dirty="0" smtClean="0"/>
+              <a:t>de </a:t>
+            </a:r>
+            <a:r>
+              <a:rPr lang="fr-CA" dirty="0" smtClean="0"/>
+              <a:t>l’équipe</a:t>
+            </a:r>
+          </a:p>
+          <a:p>
+            <a:r>
+              <a:rPr lang="fr-CA" dirty="0" smtClean="0"/>
+              <a:t>Recommandations et suggestions </a:t>
+            </a:r>
+            <a:endParaRPr lang="fr-CA" dirty="0"/>
+          </a:p>
+        </p:txBody>
+      </p:sp>
+    </p:spTree>
+    <p:extLst>
+      <p:ext uri="{BB962C8B-B14F-4D97-AF65-F5344CB8AC3E}">
+        <p14:creationId xmlns:p14="http://schemas.microsoft.com/office/powerpoint/2010/main" val="2435794121"/>
+      </p:ext>
+    </p:extLst>
+  </p:cSld>
+  <p:clrMapOvr>
+    <a:masterClrMapping/>
+  </p:clrMapOvr>
   <p:timing>
     <p:tnLst>
       <p:par>
@@ -8206,59 +8207,28 @@
             <p:ph type="title"/>
           </p:nvPr>
         </p:nvSpPr>
-        <p:spPr/>
-        <p:txBody>
-          <a:bodyPr>
-            <a:normAutofit/>
-          </a:bodyPr>
-          <a:lstStyle/>
-          <a:p>
-            <a:r>
-              <a:rPr lang="fr-CA" sz="3000" dirty="0"/>
-              <a:t>Conclusion</a:t>
-            </a:r>
-          </a:p>
-        </p:txBody>
-      </p:sp>
-      <p:sp>
-        <p:nvSpPr>
-          <p:cNvPr id="3" name="Espace réservé du contenu 2"/>
-          <p:cNvSpPr>
-            <a:spLocks noGrp="1"/>
-          </p:cNvSpPr>
-          <p:nvPr>
-            <p:ph idx="1"/>
-          </p:nvPr>
-        </p:nvSpPr>
-        <p:spPr/>
-        <p:txBody>
-          <a:bodyPr/>
-          <a:lstStyle/>
-          <a:p>
-            <a:r>
-              <a:rPr lang="fr-CA" dirty="0" smtClean="0"/>
-              <a:t>Résumé de l’application </a:t>
-            </a:r>
-          </a:p>
-          <a:p>
-            <a:r>
-              <a:rPr lang="fr-CA" dirty="0" smtClean="0"/>
-              <a:t>Fonctionnement de de l’équipe</a:t>
-            </a:r>
-          </a:p>
-          <a:p>
-            <a:r>
-              <a:rPr lang="fr-CA" dirty="0" smtClean="0"/>
-              <a:t>Recommandations et suggestions </a:t>
-            </a:r>
-            <a:endParaRPr lang="fr-CA" dirty="0"/>
+        <p:spPr>
+          <a:xfrm>
+            <a:off x="0" y="0"/>
+            <a:ext cx="8410832" cy="6858000"/>
+          </a:xfrm>
+        </p:spPr>
+        <p:txBody>
+          <a:bodyPr anchor="ctr"/>
+          <a:lstStyle/>
+          <a:p>
+            <a:pPr algn="ctr"/>
+            <a:r>
+              <a:rPr lang="fr-CA" dirty="0"/>
+              <a:t>Questions</a:t>
+            </a:r>
           </a:p>
         </p:txBody>
       </p:sp>
     </p:spTree>
     <p:extLst>
       <p:ext uri="{BB962C8B-B14F-4D97-AF65-F5344CB8AC3E}">
-        <p14:creationId xmlns:p14="http://schemas.microsoft.com/office/powerpoint/2010/main" val="2435794121"/>
+        <p14:creationId xmlns:p14="http://schemas.microsoft.com/office/powerpoint/2010/main" val="912246389"/>
       </p:ext>
     </p:extLst>
   </p:cSld>
@@ -8305,72 +8275,7 @@
         <p:spPr>
           <a:xfrm>
             <a:off x="0" y="0"/>
-            <a:ext cx="9144000" cy="6858000"/>
-          </a:xfrm>
-        </p:spPr>
-        <p:txBody>
-          <a:bodyPr anchor="ctr"/>
-          <a:lstStyle/>
-          <a:p>
-            <a:pPr algn="ctr"/>
-            <a:r>
-              <a:rPr lang="fr-CA" dirty="0"/>
-              <a:t>Questions</a:t>
-            </a:r>
-          </a:p>
-        </p:txBody>
-      </p:sp>
-    </p:spTree>
-    <p:extLst>
-      <p:ext uri="{BB962C8B-B14F-4D97-AF65-F5344CB8AC3E}">
-        <p14:creationId xmlns:p14="http://schemas.microsoft.com/office/powerpoint/2010/main" val="912246389"/>
-      </p:ext>
-    </p:extLst>
-  </p:cSld>
-  <p:clrMapOvr>
-    <a:masterClrMapping/>
-  </p:clrMapOvr>
-  <p:timing>
-    <p:tnLst>
-      <p:par>
-        <p:cTn id="1" dur="indefinite" restart="never" nodeType="tmRoot"/>
-      </p:par>
-    </p:tnLst>
-  </p:timing>
-</p:sld>
-</file>
-
-<file path=ppt/slides/slide23.xml><?xml version="1.0" encoding="utf-8"?>
-<p:sld xmlns:a="http://schemas.openxmlformats.org/drawingml/2006/main" xmlns:r="http://schemas.openxmlformats.org/officeDocument/2006/relationships" xmlns:p="http://schemas.openxmlformats.org/presentationml/2006/main">
-  <p:cSld>
-    <p:spTree>
-      <p:nvGrpSpPr>
-        <p:cNvPr id="1" name=""/>
-        <p:cNvGrpSpPr/>
-        <p:nvPr/>
-      </p:nvGrpSpPr>
-      <p:grpSpPr>
-        <a:xfrm>
-          <a:off x="0" y="0"/>
-          <a:ext cx="0" cy="0"/>
-          <a:chOff x="0" y="0"/>
-          <a:chExt cx="0" cy="0"/>
-        </a:xfrm>
-      </p:grpSpPr>
-      <p:sp>
-        <p:nvSpPr>
-          <p:cNvPr id="2" name="Titre 1"/>
-          <p:cNvSpPr>
-            <a:spLocks noGrp="1"/>
-          </p:cNvSpPr>
-          <p:nvPr>
-            <p:ph type="title"/>
-          </p:nvPr>
-        </p:nvSpPr>
-        <p:spPr>
-          <a:xfrm>
-            <a:off x="0" y="0"/>
-            <a:ext cx="9144000" cy="6857999"/>
+            <a:ext cx="8419070" cy="6857999"/>
           </a:xfrm>
         </p:spPr>
         <p:txBody>

</xml_diff>

<commit_message>
PPT augmenter un diapo sur les difficultés rencontrées
</commit_message>
<xml_diff>
--- a/Gestion de projet/Présentations/PowerPoint.pptx
+++ b/Gestion de projet/Présentations/PowerPoint.pptx
@@ -25,9 +25,10 @@
     <p:sldId id="271" r:id="rId19"/>
     <p:sldId id="277" r:id="rId20"/>
     <p:sldId id="278" r:id="rId21"/>
-    <p:sldId id="273" r:id="rId22"/>
-    <p:sldId id="275" r:id="rId23"/>
-    <p:sldId id="276" r:id="rId24"/>
+    <p:sldId id="279" r:id="rId22"/>
+    <p:sldId id="273" r:id="rId23"/>
+    <p:sldId id="275" r:id="rId24"/>
+    <p:sldId id="276" r:id="rId25"/>
   </p:sldIdLst>
   <p:sldSz cx="9144000" cy="6858000" type="screen4x3"/>
   <p:notesSz cx="6858000" cy="9144000"/>
@@ -287,7 +288,7 @@
           <a:p>
             <a:fld id="{A8224893-DBDA-4BFA-9CE1-4BFE7CD0F8CF}" type="datetime1">
               <a:rPr lang="en-US" smtClean="0"/>
-              <a:t>12/17/2016</a:t>
+              <a:t>12/18/2016</a:t>
             </a:fld>
             <a:endParaRPr lang="en-US"/>
           </a:p>
@@ -457,7 +458,7 @@
           <a:p>
             <a:fld id="{5F4E5243-F52A-4D37-9694-EB26C6C31910}" type="datetime1">
               <a:rPr lang="en-US" smtClean="0"/>
-              <a:t>12/17/2016</a:t>
+              <a:t>12/18/2016</a:t>
             </a:fld>
             <a:endParaRPr lang="en-US"/>
           </a:p>
@@ -637,7 +638,7 @@
           <a:p>
             <a:fld id="{3A77B6E1-634A-48DC-9E8B-D894023267EF}" type="datetime1">
               <a:rPr lang="en-US" smtClean="0"/>
-              <a:t>12/17/2016</a:t>
+              <a:t>12/18/2016</a:t>
             </a:fld>
             <a:endParaRPr lang="en-US"/>
           </a:p>
@@ -905,7 +906,7 @@
           <a:p>
             <a:fld id="{A8224893-DBDA-4BFA-9CE1-4BFE7CD0F8CF}" type="datetime1">
               <a:rPr lang="en-US" smtClean="0"/>
-              <a:t>12/17/2016</a:t>
+              <a:t>12/18/2016</a:t>
             </a:fld>
             <a:endParaRPr lang="en-US"/>
           </a:p>
@@ -1097,7 +1098,7 @@
           <a:p>
             <a:fld id="{7B2D3E9E-A95C-48F2-B4BF-A71542E0BE9A}" type="datetime1">
               <a:rPr lang="en-US" smtClean="0"/>
-              <a:t>12/17/2016</a:t>
+              <a:t>12/18/2016</a:t>
             </a:fld>
             <a:endParaRPr lang="en-US"/>
           </a:p>
@@ -1351,7 +1352,7 @@
           <a:p>
             <a:fld id="{A50F84E2-2D7A-43CF-AC90-352A289A783A}" type="datetime1">
               <a:rPr lang="en-US" smtClean="0"/>
-              <a:t>12/17/2016</a:t>
+              <a:t>12/18/2016</a:t>
             </a:fld>
             <a:endParaRPr lang="en-US"/>
           </a:p>
@@ -1677,7 +1678,7 @@
           <a:p>
             <a:fld id="{F12952B5-7A2F-4CC8-B7CE-9234E21C2837}" type="datetime1">
               <a:rPr lang="en-US" smtClean="0"/>
-              <a:t>12/17/2016</a:t>
+              <a:t>12/18/2016</a:t>
             </a:fld>
             <a:endParaRPr lang="en-US"/>
           </a:p>
@@ -2097,7 +2098,7 @@
           <a:p>
             <a:fld id="{CE1DA07A-9201-4B4B-BAF2-015AFA30F520}" type="datetime1">
               <a:rPr lang="en-US" smtClean="0"/>
-              <a:t>12/17/2016</a:t>
+              <a:t>12/18/2016</a:t>
             </a:fld>
             <a:endParaRPr lang="en-US"/>
           </a:p>
@@ -2215,7 +2216,7 @@
           <a:p>
             <a:fld id="{73D7E00A-486F-4252-8B1D-E32645521F49}" type="datetime1">
               <a:rPr lang="en-US" smtClean="0"/>
-              <a:t>12/17/2016</a:t>
+              <a:t>12/18/2016</a:t>
             </a:fld>
             <a:endParaRPr lang="en-US"/>
           </a:p>
@@ -2310,7 +2311,7 @@
           <a:p>
             <a:fld id="{8DDF5F92-E675-4B36-9A60-69A962A68675}" type="datetime1">
               <a:rPr lang="en-US" smtClean="0"/>
-              <a:t>12/17/2016</a:t>
+              <a:t>12/18/2016</a:t>
             </a:fld>
             <a:endParaRPr lang="en-US"/>
           </a:p>
@@ -2597,7 +2598,7 @@
           <a:p>
             <a:fld id="{AF6E2C9B-5FA2-460D-9BE7-B0812FC2A6FF}" type="datetime1">
               <a:rPr lang="en-US" smtClean="0"/>
-              <a:t>12/17/2016</a:t>
+              <a:t>12/18/2016</a:t>
             </a:fld>
             <a:endParaRPr lang="en-US"/>
           </a:p>
@@ -2767,7 +2768,7 @@
           <a:p>
             <a:fld id="{7B2D3E9E-A95C-48F2-B4BF-A71542E0BE9A}" type="datetime1">
               <a:rPr lang="en-US" smtClean="0"/>
-              <a:t>12/17/2016</a:t>
+              <a:t>12/18/2016</a:t>
             </a:fld>
             <a:endParaRPr lang="en-US"/>
           </a:p>
@@ -3092,7 +3093,7 @@
           <a:p>
             <a:fld id="{1D374940-A916-4C8B-9648-02A2D3898F9E}" type="datetime1">
               <a:rPr lang="en-US" smtClean="0"/>
-              <a:t>12/17/2016</a:t>
+              <a:t>12/18/2016</a:t>
             </a:fld>
             <a:endParaRPr lang="en-US"/>
           </a:p>
@@ -3262,7 +3263,7 @@
           <a:p>
             <a:fld id="{5F4E5243-F52A-4D37-9694-EB26C6C31910}" type="datetime1">
               <a:rPr lang="en-US" smtClean="0"/>
-              <a:t>12/17/2016</a:t>
+              <a:t>12/18/2016</a:t>
             </a:fld>
             <a:endParaRPr lang="en-US"/>
           </a:p>
@@ -3442,7 +3443,7 @@
           <a:p>
             <a:fld id="{3A77B6E1-634A-48DC-9E8B-D894023267EF}" type="datetime1">
               <a:rPr lang="en-US" smtClean="0"/>
-              <a:t>12/17/2016</a:t>
+              <a:t>12/18/2016</a:t>
             </a:fld>
             <a:endParaRPr lang="en-US"/>
           </a:p>
@@ -3693,7 +3694,7 @@
           <a:p>
             <a:fld id="{A50F84E2-2D7A-43CF-AC90-352A289A783A}" type="datetime1">
               <a:rPr lang="en-US" smtClean="0"/>
-              <a:t>12/17/2016</a:t>
+              <a:t>12/18/2016</a:t>
             </a:fld>
             <a:endParaRPr lang="en-US"/>
           </a:p>
@@ -3925,7 +3926,7 @@
           <a:p>
             <a:fld id="{F12952B5-7A2F-4CC8-B7CE-9234E21C2837}" type="datetime1">
               <a:rPr lang="en-US" smtClean="0"/>
-              <a:t>12/17/2016</a:t>
+              <a:t>12/18/2016</a:t>
             </a:fld>
             <a:endParaRPr lang="en-US"/>
           </a:p>
@@ -4267,7 +4268,7 @@
           <a:p>
             <a:fld id="{CE1DA07A-9201-4B4B-BAF2-015AFA30F520}" type="datetime1">
               <a:rPr lang="en-US" smtClean="0"/>
-              <a:t>12/17/2016</a:t>
+              <a:t>12/18/2016</a:t>
             </a:fld>
             <a:endParaRPr lang="en-US"/>
           </a:p>
@@ -4380,7 +4381,7 @@
           <a:p>
             <a:fld id="{73D7E00A-486F-4252-8B1D-E32645521F49}" type="datetime1">
               <a:rPr lang="en-US" smtClean="0"/>
-              <a:t>12/17/2016</a:t>
+              <a:t>12/18/2016</a:t>
             </a:fld>
             <a:endParaRPr lang="en-US"/>
           </a:p>
@@ -4498,7 +4499,7 @@
           <a:p>
             <a:fld id="{8DDF5F92-E675-4B36-9A60-69A962A68675}" type="datetime1">
               <a:rPr lang="en-US" smtClean="0"/>
-              <a:t>12/17/2016</a:t>
+              <a:t>12/18/2016</a:t>
             </a:fld>
             <a:endParaRPr lang="en-US"/>
           </a:p>
@@ -4782,7 +4783,7 @@
           <a:p>
             <a:fld id="{AF6E2C9B-5FA2-460D-9BE7-B0812FC2A6FF}" type="datetime1">
               <a:rPr lang="en-US" smtClean="0"/>
-              <a:t>12/17/2016</a:t>
+              <a:t>12/18/2016</a:t>
             </a:fld>
             <a:endParaRPr lang="en-US"/>
           </a:p>
@@ -5046,7 +5047,7 @@
           <a:p>
             <a:fld id="{1D374940-A916-4C8B-9648-02A2D3898F9E}" type="datetime1">
               <a:rPr lang="en-US" smtClean="0"/>
-              <a:t>12/17/2016</a:t>
+              <a:t>12/18/2016</a:t>
             </a:fld>
             <a:endParaRPr lang="en-US"/>
           </a:p>
@@ -5260,7 +5261,7 @@
           <a:p>
             <a:fld id="{5586B75A-687E-405C-8A0B-8D00578BA2C3}" type="datetime1">
               <a:rPr lang="en-US" smtClean="0"/>
-              <a:t>12/17/2016</a:t>
+              <a:t>12/18/2016</a:t>
             </a:fld>
             <a:endParaRPr lang="en-US"/>
           </a:p>
@@ -5826,7 +5827,7 @@
           <a:p>
             <a:fld id="{5586B75A-687E-405C-8A0B-8D00578BA2C3}" type="datetime1">
               <a:rPr lang="en-US" smtClean="0"/>
-              <a:t>12/17/2016</a:t>
+              <a:t>12/18/2016</a:t>
             </a:fld>
             <a:endParaRPr lang="en-US"/>
           </a:p>
@@ -7125,11 +7126,7 @@
             </a:br>
             <a:r>
               <a:rPr lang="fr-CA" sz="3000" dirty="0" smtClean="0"/>
-              <a:t>Démonstration </a:t>
-            </a:r>
-            <a:r>
-              <a:rPr lang="fr-CA" sz="3000" dirty="0" smtClean="0"/>
-              <a:t>d’ECJ</a:t>
+              <a:t>Démonstration d’ECJ</a:t>
             </a:r>
             <a:endParaRPr lang="fr-CA" sz="3000" dirty="0"/>
           </a:p>
@@ -7577,7 +7574,7 @@
         </p:nvSpPr>
         <p:spPr>
           <a:xfrm>
-            <a:off x="864909" y="696063"/>
+            <a:off x="788239" y="407811"/>
             <a:ext cx="7243819" cy="757222"/>
           </a:xfrm>
         </p:spPr>
@@ -7619,7 +7616,7 @@
         </p:blipFill>
         <p:spPr>
           <a:xfrm>
-            <a:off x="716628" y="1930218"/>
+            <a:off x="649859" y="1188702"/>
             <a:ext cx="1688821" cy="1416093"/>
           </a:xfrm>
         </p:spPr>
@@ -7646,7 +7643,7 @@
         </p:blipFill>
         <p:spPr>
           <a:xfrm>
-            <a:off x="3513266" y="1921666"/>
+            <a:off x="3446497" y="1165033"/>
             <a:ext cx="1424611" cy="1388083"/>
           </a:xfrm>
           <a:prstGeom prst="rect">
@@ -7676,7 +7673,7 @@
         </p:blipFill>
         <p:spPr>
           <a:xfrm>
-            <a:off x="2405449" y="2204816"/>
+            <a:off x="2318740" y="1536641"/>
             <a:ext cx="962159" cy="866896"/>
           </a:xfrm>
           <a:prstGeom prst="rect">
@@ -7706,7 +7703,7 @@
         </p:blipFill>
         <p:spPr>
           <a:xfrm>
-            <a:off x="3658247" y="3381499"/>
+            <a:off x="3575002" y="2628465"/>
             <a:ext cx="1019317" cy="924054"/>
           </a:xfrm>
           <a:prstGeom prst="rect">
@@ -7736,7 +7733,7 @@
         </p:blipFill>
         <p:spPr>
           <a:xfrm>
-            <a:off x="3309943" y="4305553"/>
+            <a:off x="3173349" y="3709503"/>
             <a:ext cx="1822622" cy="911311"/>
           </a:xfrm>
           <a:prstGeom prst="rect">
@@ -7766,7 +7763,7 @@
         </p:blipFill>
         <p:spPr>
           <a:xfrm>
-            <a:off x="4937877" y="2216861"/>
+            <a:off x="4871108" y="1536641"/>
             <a:ext cx="962159" cy="866896"/>
           </a:xfrm>
           <a:prstGeom prst="rect">
@@ -7796,7 +7793,7 @@
         </p:blipFill>
         <p:spPr>
           <a:xfrm>
-            <a:off x="6246757" y="1697733"/>
+            <a:off x="6164463" y="1016449"/>
             <a:ext cx="1192012" cy="1612016"/>
           </a:xfrm>
           <a:prstGeom prst="rect">
@@ -7826,7 +7823,7 @@
         </p:blipFill>
         <p:spPr>
           <a:xfrm>
-            <a:off x="714326" y="5605861"/>
+            <a:off x="495855" y="5553242"/>
             <a:ext cx="962159" cy="866896"/>
           </a:xfrm>
           <a:prstGeom prst="rect">
@@ -7856,7 +7853,7 @@
         </p:blipFill>
         <p:spPr>
           <a:xfrm>
-            <a:off x="1908563" y="5027332"/>
+            <a:off x="1888442" y="5081804"/>
             <a:ext cx="1831415" cy="1831415"/>
           </a:xfrm>
           <a:prstGeom prst="rect">
@@ -7886,7 +7883,7 @@
         </p:blipFill>
         <p:spPr>
           <a:xfrm>
-            <a:off x="3929070" y="5498770"/>
+            <a:off x="3908949" y="5553242"/>
             <a:ext cx="962159" cy="866896"/>
           </a:xfrm>
           <a:prstGeom prst="rect">
@@ -7916,8 +7913,68 @@
         </p:blipFill>
         <p:spPr>
           <a:xfrm>
-            <a:off x="5132565" y="5019094"/>
+            <a:off x="5112444" y="5073566"/>
             <a:ext cx="3064149" cy="1661478"/>
+          </a:xfrm>
+          <a:prstGeom prst="rect">
+            <a:avLst/>
+          </a:prstGeom>
+        </p:spPr>
+      </p:pic>
+      <p:pic>
+        <p:nvPicPr>
+          <p:cNvPr id="14" name="Image 13"/>
+          <p:cNvPicPr>
+            <a:picLocks noChangeAspect="1"/>
+          </p:cNvPicPr>
+          <p:nvPr/>
+        </p:nvPicPr>
+        <p:blipFill>
+          <a:blip r:embed="rId5">
+            <a:extLst>
+              <a:ext uri="{28A0092B-C50C-407E-A947-70E740481C1C}">
+                <a14:useLocalDpi xmlns:a14="http://schemas.microsoft.com/office/drawing/2010/main" val="0"/>
+              </a:ext>
+            </a:extLst>
+          </a:blip>
+          <a:stretch>
+            <a:fillRect/>
+          </a:stretch>
+        </p:blipFill>
+        <p:spPr>
+          <a:xfrm>
+            <a:off x="6351306" y="2607920"/>
+            <a:ext cx="991022" cy="898402"/>
+          </a:xfrm>
+          <a:prstGeom prst="rect">
+            <a:avLst/>
+          </a:prstGeom>
+        </p:spPr>
+      </p:pic>
+      <p:pic>
+        <p:nvPicPr>
+          <p:cNvPr id="3" name="Image 2"/>
+          <p:cNvPicPr>
+            <a:picLocks noChangeAspect="1"/>
+          </p:cNvPicPr>
+          <p:nvPr/>
+        </p:nvPicPr>
+        <p:blipFill>
+          <a:blip r:embed="rId10" cstate="print">
+            <a:extLst>
+              <a:ext uri="{28A0092B-C50C-407E-A947-70E740481C1C}">
+                <a14:useLocalDpi xmlns:a14="http://schemas.microsoft.com/office/drawing/2010/main" val="0"/>
+              </a:ext>
+            </a:extLst>
+          </a:blip>
+          <a:stretch>
+            <a:fillRect/>
+          </a:stretch>
+        </p:blipFill>
+        <p:spPr>
+          <a:xfrm>
+            <a:off x="5939481" y="3636347"/>
+            <a:ext cx="1626022" cy="1307194"/>
           </a:xfrm>
           <a:prstGeom prst="rect">
             <a:avLst/>
@@ -8022,21 +8079,13 @@
           <a:p>
             <a:r>
               <a:rPr lang="fr-CA" dirty="0" smtClean="0"/>
-              <a:t>Démonstration </a:t>
-            </a:r>
+              <a:t>Démonstration d’ECJ</a:t>
+            </a:r>
+          </a:p>
+          <a:p>
             <a:r>
               <a:rPr lang="fr-CA" dirty="0" smtClean="0"/>
-              <a:t>d’ECJ</a:t>
-            </a:r>
-          </a:p>
-          <a:p>
-            <a:r>
-              <a:rPr lang="fr-CA" dirty="0" smtClean="0"/>
-              <a:t>Technologies </a:t>
-            </a:r>
-            <a:r>
-              <a:rPr lang="fr-CA" dirty="0" smtClean="0"/>
-              <a:t>utilisées</a:t>
+              <a:t>Technologies utilisées</a:t>
             </a:r>
           </a:p>
           <a:p>
@@ -8103,67 +8152,243 @@
             <p:ph type="title"/>
           </p:nvPr>
         </p:nvSpPr>
-        <p:spPr/>
-        <p:txBody>
-          <a:bodyPr>
+        <p:spPr>
+          <a:xfrm>
+            <a:off x="914507" y="689300"/>
+            <a:ext cx="7269480" cy="678068"/>
+          </a:xfrm>
+        </p:spPr>
+        <p:txBody>
+          <a:bodyPr vert="horz" lIns="91440" tIns="45720" rIns="91440" bIns="45720" rtlCol="0" anchor="b">
             <a:normAutofit/>
           </a:bodyPr>
           <a:lstStyle/>
           <a:p>
             <a:r>
-              <a:rPr lang="fr-CA" sz="3000" dirty="0"/>
-              <a:t>Conclusion</a:t>
-            </a:r>
-          </a:p>
-        </p:txBody>
-      </p:sp>
-      <p:sp>
-        <p:nvSpPr>
-          <p:cNvPr id="3" name="Espace réservé du contenu 2"/>
-          <p:cNvSpPr>
-            <a:spLocks noGrp="1"/>
-          </p:cNvSpPr>
+              <a:rPr lang="fr-FR" dirty="0"/>
+              <a:t>Difficultés </a:t>
+            </a:r>
+            <a:r>
+              <a:rPr lang="fr-CA" dirty="0"/>
+              <a:t> rencontrées</a:t>
+            </a:r>
+            <a:endParaRPr lang="fr-CA" dirty="0"/>
+          </a:p>
+        </p:txBody>
+      </p:sp>
+      <p:pic>
+        <p:nvPicPr>
+          <p:cNvPr id="4" name="Espace réservé du contenu 3"/>
+          <p:cNvPicPr>
+            <a:picLocks noGrp="1" noChangeAspect="1"/>
+          </p:cNvPicPr>
           <p:nvPr>
             <p:ph idx="1"/>
           </p:nvPr>
-        </p:nvSpPr>
-        <p:spPr/>
-        <p:txBody>
-          <a:bodyPr/>
-          <a:lstStyle/>
-          <a:p>
-            <a:r>
-              <a:rPr lang="fr-CA" dirty="0" smtClean="0"/>
-              <a:t>Résumé de l’application </a:t>
-            </a:r>
-          </a:p>
-          <a:p>
-            <a:r>
-              <a:rPr lang="fr-CA" dirty="0" smtClean="0"/>
-              <a:t>Fonctionnement </a:t>
-            </a:r>
-            <a:r>
-              <a:rPr lang="fr-CA" dirty="0" smtClean="0"/>
-              <a:t>de </a:t>
-            </a:r>
-            <a:r>
-              <a:rPr lang="fr-CA" dirty="0" smtClean="0"/>
-              <a:t>l’équipe</a:t>
-            </a:r>
-          </a:p>
-          <a:p>
-            <a:r>
-              <a:rPr lang="fr-CA" dirty="0" smtClean="0"/>
-              <a:t>Recommandations et suggestions </a:t>
-            </a:r>
-            <a:endParaRPr lang="fr-CA" dirty="0"/>
-          </a:p>
-        </p:txBody>
-      </p:sp>
+        </p:nvPicPr>
+        <p:blipFill>
+          <a:blip r:embed="rId2">
+            <a:extLst>
+              <a:ext uri="{28A0092B-C50C-407E-A947-70E740481C1C}">
+                <a14:useLocalDpi xmlns:a14="http://schemas.microsoft.com/office/drawing/2010/main" val="0"/>
+              </a:ext>
+            </a:extLst>
+          </a:blip>
+          <a:stretch>
+            <a:fillRect/>
+          </a:stretch>
+        </p:blipFill>
+        <p:spPr>
+          <a:xfrm>
+            <a:off x="914508" y="1532631"/>
+            <a:ext cx="1673376" cy="1537504"/>
+          </a:xfrm>
+        </p:spPr>
+      </p:pic>
+      <p:pic>
+        <p:nvPicPr>
+          <p:cNvPr id="5" name="Image 4"/>
+          <p:cNvPicPr>
+            <a:picLocks noChangeAspect="1"/>
+          </p:cNvPicPr>
+          <p:nvPr/>
+        </p:nvPicPr>
+        <p:blipFill>
+          <a:blip r:embed="rId3">
+            <a:extLst>
+              <a:ext uri="{28A0092B-C50C-407E-A947-70E740481C1C}">
+                <a14:useLocalDpi xmlns:a14="http://schemas.microsoft.com/office/drawing/2010/main" val="0"/>
+              </a:ext>
+            </a:extLst>
+          </a:blip>
+          <a:stretch>
+            <a:fillRect/>
+          </a:stretch>
+        </p:blipFill>
+        <p:spPr>
+          <a:xfrm>
+            <a:off x="2818300" y="5244790"/>
+            <a:ext cx="1969356" cy="1050324"/>
+          </a:xfrm>
+          <a:prstGeom prst="rect">
+            <a:avLst/>
+          </a:prstGeom>
+        </p:spPr>
+      </p:pic>
+      <p:pic>
+        <p:nvPicPr>
+          <p:cNvPr id="3" name="Image 2"/>
+          <p:cNvPicPr>
+            <a:picLocks noChangeAspect="1"/>
+          </p:cNvPicPr>
+          <p:nvPr/>
+        </p:nvPicPr>
+        <p:blipFill>
+          <a:blip r:embed="rId4" cstate="print">
+            <a:extLst>
+              <a:ext uri="{28A0092B-C50C-407E-A947-70E740481C1C}">
+                <a14:useLocalDpi xmlns:a14="http://schemas.microsoft.com/office/drawing/2010/main" val="0"/>
+              </a:ext>
+            </a:extLst>
+          </a:blip>
+          <a:stretch>
+            <a:fillRect/>
+          </a:stretch>
+        </p:blipFill>
+        <p:spPr>
+          <a:xfrm>
+            <a:off x="5018073" y="1532631"/>
+            <a:ext cx="2020112" cy="1714279"/>
+          </a:xfrm>
+          <a:prstGeom prst="rect">
+            <a:avLst/>
+          </a:prstGeom>
+        </p:spPr>
+      </p:pic>
+      <p:pic>
+        <p:nvPicPr>
+          <p:cNvPr id="6" name="Image 5"/>
+          <p:cNvPicPr>
+            <a:picLocks noChangeAspect="1"/>
+          </p:cNvPicPr>
+          <p:nvPr/>
+        </p:nvPicPr>
+        <p:blipFill>
+          <a:blip r:embed="rId5">
+            <a:extLst>
+              <a:ext uri="{28A0092B-C50C-407E-A947-70E740481C1C}">
+                <a14:useLocalDpi xmlns:a14="http://schemas.microsoft.com/office/drawing/2010/main" val="0"/>
+              </a:ext>
+            </a:extLst>
+          </a:blip>
+          <a:stretch>
+            <a:fillRect/>
+          </a:stretch>
+        </p:blipFill>
+        <p:spPr>
+          <a:xfrm>
+            <a:off x="3166562" y="1680781"/>
+            <a:ext cx="1272833" cy="1146810"/>
+          </a:xfrm>
+          <a:prstGeom prst="rect">
+            <a:avLst/>
+          </a:prstGeom>
+        </p:spPr>
+      </p:pic>
+      <p:pic>
+        <p:nvPicPr>
+          <p:cNvPr id="8" name="Image 7"/>
+          <p:cNvPicPr>
+            <a:picLocks noChangeAspect="1"/>
+          </p:cNvPicPr>
+          <p:nvPr/>
+        </p:nvPicPr>
+        <p:blipFill>
+          <a:blip r:embed="rId6" cstate="print">
+            <a:extLst>
+              <a:ext uri="{28A0092B-C50C-407E-A947-70E740481C1C}">
+                <a14:useLocalDpi xmlns:a14="http://schemas.microsoft.com/office/drawing/2010/main" val="0"/>
+              </a:ext>
+            </a:extLst>
+          </a:blip>
+          <a:stretch>
+            <a:fillRect/>
+          </a:stretch>
+        </p:blipFill>
+        <p:spPr>
+          <a:xfrm>
+            <a:off x="561377" y="3469491"/>
+            <a:ext cx="2026507" cy="1346020"/>
+          </a:xfrm>
+          <a:prstGeom prst="rect">
+            <a:avLst/>
+          </a:prstGeom>
+        </p:spPr>
+      </p:pic>
+      <p:pic>
+        <p:nvPicPr>
+          <p:cNvPr id="9" name="Image 8"/>
+          <p:cNvPicPr>
+            <a:picLocks noChangeAspect="1"/>
+          </p:cNvPicPr>
+          <p:nvPr/>
+        </p:nvPicPr>
+        <p:blipFill>
+          <a:blip r:embed="rId5">
+            <a:extLst>
+              <a:ext uri="{28A0092B-C50C-407E-A947-70E740481C1C}">
+                <a14:useLocalDpi xmlns:a14="http://schemas.microsoft.com/office/drawing/2010/main" val="0"/>
+              </a:ext>
+            </a:extLst>
+          </a:blip>
+          <a:stretch>
+            <a:fillRect/>
+          </a:stretch>
+        </p:blipFill>
+        <p:spPr>
+          <a:xfrm>
+            <a:off x="3166562" y="3484848"/>
+            <a:ext cx="1272833" cy="1146810"/>
+          </a:xfrm>
+          <a:prstGeom prst="rect">
+            <a:avLst/>
+          </a:prstGeom>
+        </p:spPr>
+      </p:pic>
+      <p:pic>
+        <p:nvPicPr>
+          <p:cNvPr id="10" name="Image 9"/>
+          <p:cNvPicPr>
+            <a:picLocks noChangeAspect="1"/>
+          </p:cNvPicPr>
+          <p:nvPr/>
+        </p:nvPicPr>
+        <p:blipFill>
+          <a:blip r:embed="rId4" cstate="print">
+            <a:extLst>
+              <a:ext uri="{28A0092B-C50C-407E-A947-70E740481C1C}">
+                <a14:useLocalDpi xmlns:a14="http://schemas.microsoft.com/office/drawing/2010/main" val="0"/>
+              </a:ext>
+            </a:extLst>
+          </a:blip>
+          <a:stretch>
+            <a:fillRect/>
+          </a:stretch>
+        </p:blipFill>
+        <p:spPr>
+          <a:xfrm>
+            <a:off x="5186705" y="3412173"/>
+            <a:ext cx="2020112" cy="1714279"/>
+          </a:xfrm>
+          <a:prstGeom prst="rect">
+            <a:avLst/>
+          </a:prstGeom>
+        </p:spPr>
+      </p:pic>
     </p:spTree>
     <p:extLst>
       <p:ext uri="{BB962C8B-B14F-4D97-AF65-F5344CB8AC3E}">
-        <p14:creationId xmlns:p14="http://schemas.microsoft.com/office/powerpoint/2010/main" val="2435794121"/>
+        <p14:creationId xmlns:p14="http://schemas.microsoft.com/office/powerpoint/2010/main" val="4201472437"/>
       </p:ext>
     </p:extLst>
   </p:cSld>
@@ -8207,6 +8432,102 @@
             <p:ph type="title"/>
           </p:nvPr>
         </p:nvSpPr>
+        <p:spPr/>
+        <p:txBody>
+          <a:bodyPr>
+            <a:normAutofit/>
+          </a:bodyPr>
+          <a:lstStyle/>
+          <a:p>
+            <a:r>
+              <a:rPr lang="fr-CA" sz="3000" dirty="0"/>
+              <a:t>Conclusion</a:t>
+            </a:r>
+          </a:p>
+        </p:txBody>
+      </p:sp>
+      <p:sp>
+        <p:nvSpPr>
+          <p:cNvPr id="3" name="Espace réservé du contenu 2"/>
+          <p:cNvSpPr>
+            <a:spLocks noGrp="1"/>
+          </p:cNvSpPr>
+          <p:nvPr>
+            <p:ph idx="1"/>
+          </p:nvPr>
+        </p:nvSpPr>
+        <p:spPr/>
+        <p:txBody>
+          <a:bodyPr/>
+          <a:lstStyle/>
+          <a:p>
+            <a:r>
+              <a:rPr lang="fr-CA" dirty="0" smtClean="0"/>
+              <a:t>Résumé de l’application </a:t>
+            </a:r>
+          </a:p>
+          <a:p>
+            <a:r>
+              <a:rPr lang="fr-CA" dirty="0" smtClean="0"/>
+              <a:t>Fonctionnement de l’équipe</a:t>
+            </a:r>
+          </a:p>
+          <a:p>
+            <a:r>
+              <a:rPr lang="fr-CA" dirty="0" smtClean="0"/>
+              <a:t>Recommandations et suggestions </a:t>
+            </a:r>
+            <a:endParaRPr lang="fr-CA" dirty="0"/>
+          </a:p>
+        </p:txBody>
+      </p:sp>
+    </p:spTree>
+    <p:extLst>
+      <p:ext uri="{BB962C8B-B14F-4D97-AF65-F5344CB8AC3E}">
+        <p14:creationId xmlns:p14="http://schemas.microsoft.com/office/powerpoint/2010/main" val="2435794121"/>
+      </p:ext>
+    </p:extLst>
+  </p:cSld>
+  <p:clrMapOvr>
+    <a:masterClrMapping/>
+  </p:clrMapOvr>
+  <p:timing>
+    <p:tnLst>
+      <p:par>
+        <p:cTn id="1" dur="indefinite" restart="never" nodeType="tmRoot"/>
+      </p:par>
+    </p:tnLst>
+  </p:timing>
+</p:sld>
+</file>
+
+<file path=ppt/slides/slide22.xml><?xml version="1.0" encoding="utf-8"?>
+<p:sld xmlns:a="http://schemas.openxmlformats.org/drawingml/2006/main" xmlns:r="http://schemas.openxmlformats.org/officeDocument/2006/relationships" xmlns:p="http://schemas.openxmlformats.org/presentationml/2006/main">
+  <p:cSld>
+    <p:spTree>
+      <p:nvGrpSpPr>
+        <p:cNvPr id="1" name=""/>
+        <p:cNvGrpSpPr/>
+        <p:nvPr/>
+      </p:nvGrpSpPr>
+      <p:grpSpPr>
+        <a:xfrm>
+          <a:off x="0" y="0"/>
+          <a:ext cx="0" cy="0"/>
+          <a:chOff x="0" y="0"/>
+          <a:chExt cx="0" cy="0"/>
+        </a:xfrm>
+      </p:grpSpPr>
+      <p:sp>
+        <p:nvSpPr>
+          <p:cNvPr id="2" name="Titre 1"/>
+          <p:cNvSpPr>
+            <a:spLocks noGrp="1"/>
+          </p:cNvSpPr>
+          <p:nvPr>
+            <p:ph type="title"/>
+          </p:nvPr>
+        </p:nvSpPr>
         <p:spPr>
           <a:xfrm>
             <a:off x="0" y="0"/>
@@ -8245,7 +8566,7 @@
 </p:sld>
 </file>
 
-<file path=ppt/slides/slide22.xml><?xml version="1.0" encoding="utf-8"?>
+<file path=ppt/slides/slide23.xml><?xml version="1.0" encoding="utf-8"?>
 <p:sld xmlns:a="http://schemas.openxmlformats.org/drawingml/2006/main" xmlns:r="http://schemas.openxmlformats.org/officeDocument/2006/relationships" xmlns:p="http://schemas.openxmlformats.org/presentationml/2006/main">
   <p:cSld>
     <p:spTree>

</xml_diff>